<commit_message>
Deployed 9a75451 with MkDocs version: 1.0.4
</commit_message>
<xml_diff>
--- a/analysis/kc-eventstorming.pptx
+++ b/analysis/kc-eventstorming.pptx
@@ -216,7 +216,7 @@
           <a:p>
             <a:fld id="{96F7C937-84DD-4C7A-9F78-8F66F9E47283}" type="datetimeFigureOut">
               <a:rPr lang="en-US" smtClean="0"/>
-              <a:t>6/12/19</a:t>
+              <a:t>6/28/19</a:t>
             </a:fld>
             <a:endParaRPr lang="en-US"/>
           </a:p>
@@ -630,7 +630,7 @@
           <a:p>
             <a:fld id="{7B96480C-D4FF-4D5B-ABA4-4D6837D6C648}" type="datetime1">
               <a:rPr lang="en-US" smtClean="0"/>
-              <a:t>6/12/19</a:t>
+              <a:t>6/28/19</a:t>
             </a:fld>
             <a:endParaRPr lang="en-US"/>
           </a:p>
@@ -828,7 +828,7 @@
           <a:p>
             <a:fld id="{2B0CB159-0D74-4138-B60D-46734C7189CF}" type="datetime1">
               <a:rPr lang="en-US" smtClean="0"/>
-              <a:t>6/12/19</a:t>
+              <a:t>6/28/19</a:t>
             </a:fld>
             <a:endParaRPr lang="en-US"/>
           </a:p>
@@ -1036,7 +1036,7 @@
           <a:p>
             <a:fld id="{86F74E00-A3D9-49B2-92EE-F6E2B61C4694}" type="datetime1">
               <a:rPr lang="en-US" smtClean="0"/>
-              <a:t>6/12/19</a:t>
+              <a:t>6/28/19</a:t>
             </a:fld>
             <a:endParaRPr lang="en-US"/>
           </a:p>
@@ -1234,7 +1234,7 @@
           <a:p>
             <a:fld id="{A29C9B81-F5CF-4CDA-9CEC-028BA81B2A6E}" type="datetime1">
               <a:rPr lang="en-US" smtClean="0"/>
-              <a:t>6/12/19</a:t>
+              <a:t>6/28/19</a:t>
             </a:fld>
             <a:endParaRPr lang="en-US"/>
           </a:p>
@@ -1509,7 +1509,7 @@
           <a:p>
             <a:fld id="{52145163-3C70-466E-906B-2D77BA0C333D}" type="datetime1">
               <a:rPr lang="en-US" smtClean="0"/>
-              <a:t>6/12/19</a:t>
+              <a:t>6/28/19</a:t>
             </a:fld>
             <a:endParaRPr lang="en-US"/>
           </a:p>
@@ -1774,7 +1774,7 @@
           <a:p>
             <a:fld id="{9FB606A8-AA48-4381-B480-A7AEFF509F86}" type="datetime1">
               <a:rPr lang="en-US" smtClean="0"/>
-              <a:t>6/12/19</a:t>
+              <a:t>6/28/19</a:t>
             </a:fld>
             <a:endParaRPr lang="en-US"/>
           </a:p>
@@ -2186,7 +2186,7 @@
           <a:p>
             <a:fld id="{9BA70369-C48D-428A-89D3-F6AB96F8E2CB}" type="datetime1">
               <a:rPr lang="en-US" smtClean="0"/>
-              <a:t>6/12/19</a:t>
+              <a:t>6/28/19</a:t>
             </a:fld>
             <a:endParaRPr lang="en-US"/>
           </a:p>
@@ -2327,7 +2327,7 @@
           <a:p>
             <a:fld id="{E5C6C4CC-783D-487E-9A23-3CB2EC84C407}" type="datetime1">
               <a:rPr lang="en-US" smtClean="0"/>
-              <a:t>6/12/19</a:t>
+              <a:t>6/28/19</a:t>
             </a:fld>
             <a:endParaRPr lang="en-US"/>
           </a:p>
@@ -2440,7 +2440,7 @@
           <a:p>
             <a:fld id="{5FC39CF2-C652-4D61-A0C7-12EEBAD43262}" type="datetime1">
               <a:rPr lang="en-US" smtClean="0"/>
-              <a:t>6/12/19</a:t>
+              <a:t>6/28/19</a:t>
             </a:fld>
             <a:endParaRPr lang="en-US"/>
           </a:p>
@@ -2751,7 +2751,7 @@
           <a:p>
             <a:fld id="{D0117E5F-4046-4A29-BA38-71ADE6C0BF60}" type="datetime1">
               <a:rPr lang="en-US" smtClean="0"/>
-              <a:t>6/12/19</a:t>
+              <a:t>6/28/19</a:t>
             </a:fld>
             <a:endParaRPr lang="en-US"/>
           </a:p>
@@ -3039,7 +3039,7 @@
           <a:p>
             <a:fld id="{45A4B8E9-EDAD-4893-841E-969713864D5C}" type="datetime1">
               <a:rPr lang="en-US" smtClean="0"/>
-              <a:t>6/12/19</a:t>
+              <a:t>6/28/19</a:t>
             </a:fld>
             <a:endParaRPr lang="en-US"/>
           </a:p>
@@ -3280,7 +3280,7 @@
           <a:p>
             <a:fld id="{AE38EC32-B703-4DCD-92CB-6CEE84524E24}" type="datetime1">
               <a:rPr lang="en-US" smtClean="0"/>
-              <a:t>6/12/19</a:t>
+              <a:t>6/28/19</a:t>
             </a:fld>
             <a:endParaRPr lang="en-US"/>
           </a:p>
@@ -3824,10 +3824,10 @@
       </p:grpSpPr>
       <p:sp>
         <p:nvSpPr>
-          <p:cNvPr id="9" name="Rectangle 8">
-            <a:extLst>
-              <a:ext uri="{FF2B5EF4-FFF2-40B4-BE49-F238E27FC236}">
-                <a16:creationId xmlns:a16="http://schemas.microsoft.com/office/drawing/2014/main" id="{ECFB8556-363F-874E-A593-1914C244E70B}"/>
+          <p:cNvPr id="10" name="Rectangle 9">
+            <a:extLst>
+              <a:ext uri="{FF2B5EF4-FFF2-40B4-BE49-F238E27FC236}">
+                <a16:creationId xmlns:a16="http://schemas.microsoft.com/office/drawing/2014/main" id="{94BDEBB4-111D-DD44-BA6B-821921BFC98F}"/>
               </a:ext>
             </a:extLst>
           </p:cNvPr>
@@ -3836,77 +3836,7 @@
         </p:nvSpPr>
         <p:spPr>
           <a:xfrm>
-            <a:off x="1975936" y="910200"/>
-            <a:ext cx="1211339" cy="1041325"/>
-          </a:xfrm>
-          <a:prstGeom prst="rect">
-            <a:avLst/>
-          </a:prstGeom>
-          <a:solidFill>
-            <a:srgbClr val="FFC000"/>
-          </a:solidFill>
-          <a:ln>
-            <a:solidFill>
-              <a:srgbClr val="FFC000"/>
-            </a:solidFill>
-          </a:ln>
-          <a:effectLst>
-            <a:outerShdw blurRad="50800" dist="38100" dir="5400000" algn="t" rotWithShape="0">
-              <a:prstClr val="black">
-                <a:alpha val="40000"/>
-              </a:prstClr>
-            </a:outerShdw>
-          </a:effectLst>
-        </p:spPr>
-        <p:style>
-          <a:lnRef idx="2">
-            <a:schemeClr val="accent1">
-              <a:shade val="50000"/>
-            </a:schemeClr>
-          </a:lnRef>
-          <a:fillRef idx="1">
-            <a:schemeClr val="accent1"/>
-          </a:fillRef>
-          <a:effectRef idx="0">
-            <a:schemeClr val="accent1"/>
-          </a:effectRef>
-          <a:fontRef idx="minor">
-            <a:schemeClr val="lt1"/>
-          </a:fontRef>
-        </p:style>
-        <p:txBody>
-          <a:bodyPr rtlCol="0" anchor="ctr"/>
-          <a:lstStyle/>
-          <a:p>
-            <a:pPr algn="ctr"/>
-            <a:r>
-              <a:rPr lang="en-US" sz="1200" dirty="0">
-                <a:solidFill>
-                  <a:schemeClr val="accent1">
-                    <a:lumMod val="50000"/>
-                  </a:schemeClr>
-                </a:solidFill>
-              </a:rPr>
-              <a:t>Shipment Order Placed</a:t>
-            </a:r>
-          </a:p>
-        </p:txBody>
-      </p:sp>
-      <p:sp>
-        <p:nvSpPr>
-          <p:cNvPr id="10" name="Rectangle 9">
-            <a:extLst>
-              <a:ext uri="{FF2B5EF4-FFF2-40B4-BE49-F238E27FC236}">
-                <a16:creationId xmlns:a16="http://schemas.microsoft.com/office/drawing/2014/main" id="{94BDEBB4-111D-DD44-BA6B-821921BFC98F}"/>
-              </a:ext>
-            </a:extLst>
-          </p:cNvPr>
-          <p:cNvSpPr/>
-          <p:nvPr/>
-        </p:nvSpPr>
-        <p:spPr>
-          <a:xfrm>
-            <a:off x="1975937" y="2715650"/>
+            <a:off x="1792297" y="1216191"/>
             <a:ext cx="1211339" cy="1338973"/>
           </a:xfrm>
           <a:prstGeom prst="rect">
@@ -3989,7 +3919,7 @@
         </p:nvSpPr>
         <p:spPr>
           <a:xfrm>
-            <a:off x="4759945" y="2715639"/>
+            <a:off x="3790098" y="4491198"/>
             <a:ext cx="1094190" cy="1338989"/>
           </a:xfrm>
           <a:prstGeom prst="rect">
@@ -4094,7 +4024,7 @@
         </p:nvSpPr>
         <p:spPr>
           <a:xfrm>
-            <a:off x="3357087" y="2715639"/>
+            <a:off x="1123073" y="3821705"/>
             <a:ext cx="1211339" cy="1338988"/>
           </a:xfrm>
           <a:prstGeom prst="rect">
@@ -4750,8 +4680,8 @@
         </p:nvSpPr>
         <p:spPr>
           <a:xfrm>
-            <a:off x="1996013" y="4147614"/>
-            <a:ext cx="3062684" cy="1159443"/>
+            <a:off x="694291" y="2620440"/>
+            <a:ext cx="1640121" cy="1159443"/>
           </a:xfrm>
           <a:prstGeom prst="rect">
             <a:avLst/>
@@ -4794,7 +4724,70 @@
                   </a:schemeClr>
                 </a:solidFill>
               </a:rPr>
-              <a:t>Whenever shipment order placed, reserve voyage and container</a:t>
+              <a:t>Whenever shipment order placed, reserve voyage </a:t>
+            </a:r>
+          </a:p>
+        </p:txBody>
+      </p:sp>
+      <p:sp>
+        <p:nvSpPr>
+          <p:cNvPr id="17" name="Rectangle 16">
+            <a:extLst>
+              <a:ext uri="{FF2B5EF4-FFF2-40B4-BE49-F238E27FC236}">
+                <a16:creationId xmlns:a16="http://schemas.microsoft.com/office/drawing/2014/main" id="{C0071B95-AEC6-A34C-99D1-2772BEBDC131}"/>
+              </a:ext>
+            </a:extLst>
+          </p:cNvPr>
+          <p:cNvSpPr/>
+          <p:nvPr/>
+        </p:nvSpPr>
+        <p:spPr>
+          <a:xfrm>
+            <a:off x="2375551" y="3911476"/>
+            <a:ext cx="1373407" cy="1159443"/>
+          </a:xfrm>
+          <a:prstGeom prst="rect">
+            <a:avLst/>
+          </a:prstGeom>
+          <a:solidFill>
+            <a:srgbClr val="FFD1EC"/>
+          </a:solidFill>
+          <a:ln>
+            <a:solidFill>
+              <a:srgbClr val="FFD1EC"/>
+            </a:solidFill>
+          </a:ln>
+        </p:spPr>
+        <p:style>
+          <a:lnRef idx="2">
+            <a:schemeClr val="accent1">
+              <a:shade val="50000"/>
+            </a:schemeClr>
+          </a:lnRef>
+          <a:fillRef idx="1">
+            <a:schemeClr val="accent1"/>
+          </a:fillRef>
+          <a:effectRef idx="0">
+            <a:schemeClr val="accent1"/>
+          </a:effectRef>
+          <a:fontRef idx="minor">
+            <a:schemeClr val="lt1"/>
+          </a:fontRef>
+        </p:style>
+        <p:txBody>
+          <a:bodyPr rtlCol="0" anchor="ctr"/>
+          <a:lstStyle/>
+          <a:p>
+            <a:pPr algn="ctr"/>
+            <a:r>
+              <a:rPr lang="en-US" sz="1200" dirty="0">
+                <a:solidFill>
+                  <a:schemeClr val="accent1">
+                    <a:lumMod val="50000"/>
+                  </a:schemeClr>
+                </a:solidFill>
+              </a:rPr>
+              <a:t>Whenever a voyage is selected reserve container</a:t>
             </a:r>
           </a:p>
         </p:txBody>

</xml_diff>

<commit_message>
Deployed 00c68cd with MkDocs version: 1.0.4
</commit_message>
<xml_diff>
--- a/analysis/kc-eventstorming.pptx
+++ b/analysis/kc-eventstorming.pptx
@@ -5,7 +5,7 @@
     <p:sldMasterId id="2147483648" r:id="rId1"/>
   </p:sldMasterIdLst>
   <p:notesMasterIdLst>
-    <p:notesMasterId r:id="rId22"/>
+    <p:notesMasterId r:id="rId23"/>
   </p:notesMasterIdLst>
   <p:sldIdLst>
     <p:sldId id="256" r:id="rId2"/>
@@ -24,10 +24,11 @@
     <p:sldId id="2701" r:id="rId15"/>
     <p:sldId id="2729" r:id="rId16"/>
     <p:sldId id="2731" r:id="rId17"/>
-    <p:sldId id="2732" r:id="rId18"/>
-    <p:sldId id="2730" r:id="rId19"/>
-    <p:sldId id="2745" r:id="rId20"/>
-    <p:sldId id="2746" r:id="rId21"/>
+    <p:sldId id="2747" r:id="rId18"/>
+    <p:sldId id="2732" r:id="rId19"/>
+    <p:sldId id="2730" r:id="rId20"/>
+    <p:sldId id="2745" r:id="rId21"/>
+    <p:sldId id="2746" r:id="rId22"/>
   </p:sldIdLst>
   <p:sldSz cx="12192000" cy="6858000"/>
   <p:notesSz cx="6858000" cy="9144000"/>
@@ -216,7 +217,7 @@
           <a:p>
             <a:fld id="{96F7C937-84DD-4C7A-9F78-8F66F9E47283}" type="datetimeFigureOut">
               <a:rPr lang="en-US" smtClean="0"/>
-              <a:t>6/28/19</a:t>
+              <a:t>9/14/19</a:t>
             </a:fld>
             <a:endParaRPr lang="en-US"/>
           </a:p>
@@ -483,6 +484,175 @@
 </p:notesMaster>
 </file>
 
+<file path=ppt/notesSlides/notesSlide1.xml><?xml version="1.0" encoding="utf-8"?>
+<p:notes xmlns:a="http://schemas.openxmlformats.org/drawingml/2006/main" xmlns:r="http://schemas.openxmlformats.org/officeDocument/2006/relationships" xmlns:p="http://schemas.openxmlformats.org/presentationml/2006/main">
+  <p:cSld>
+    <p:spTree>
+      <p:nvGrpSpPr>
+        <p:cNvPr id="1" name=""/>
+        <p:cNvGrpSpPr/>
+        <p:nvPr/>
+      </p:nvGrpSpPr>
+      <p:grpSpPr>
+        <a:xfrm>
+          <a:off x="0" y="0"/>
+          <a:ext cx="0" cy="0"/>
+          <a:chOff x="0" y="0"/>
+          <a:chExt cx="0" cy="0"/>
+        </a:xfrm>
+      </p:grpSpPr>
+      <p:sp>
+        <p:nvSpPr>
+          <p:cNvPr id="2" name="Slide Image Placeholder 1"/>
+          <p:cNvSpPr>
+            <a:spLocks noGrp="1" noRot="1" noChangeAspect="1"/>
+          </p:cNvSpPr>
+          <p:nvPr>
+            <p:ph type="sldImg"/>
+          </p:nvPr>
+        </p:nvSpPr>
+        <p:spPr/>
+      </p:sp>
+      <p:sp>
+        <p:nvSpPr>
+          <p:cNvPr id="3" name="Notes Placeholder 2"/>
+          <p:cNvSpPr>
+            <a:spLocks noGrp="1"/>
+          </p:cNvSpPr>
+          <p:nvPr>
+            <p:ph type="body" idx="1"/>
+          </p:nvPr>
+        </p:nvSpPr>
+        <p:spPr/>
+        <p:txBody>
+          <a:bodyPr/>
+          <a:lstStyle/>
+          <a:p>
+            <a:r>
+              <a:rPr lang="en-AU" sz="7200" dirty="0">
+                <a:latin typeface="Arial" panose="020B0604020202020204" pitchFamily="34" charset="0"/>
+                <a:cs typeface="Arial" panose="020B0604020202020204" pitchFamily="34" charset="0"/>
+              </a:rPr>
+              <a:t>Core Domain</a:t>
+            </a:r>
+          </a:p>
+          <a:p>
+            <a:pPr lvl="1"/>
+            <a:r>
+              <a:rPr lang="en-AU" sz="5000" dirty="0">
+                <a:latin typeface="Arial" panose="020B0604020202020204" pitchFamily="34" charset="0"/>
+                <a:cs typeface="Arial" panose="020B0604020202020204" pitchFamily="34" charset="0"/>
+              </a:rPr>
+              <a:t>Core business, this is where your organization is earning its money</a:t>
+            </a:r>
+          </a:p>
+          <a:p>
+            <a:pPr lvl="1"/>
+            <a:r>
+              <a:rPr lang="en-AU" sz="5000" dirty="0">
+                <a:latin typeface="Arial" panose="020B0604020202020204" pitchFamily="34" charset="0"/>
+                <a:cs typeface="Arial" panose="020B0604020202020204" pitchFamily="34" charset="0"/>
+              </a:rPr>
+              <a:t>High degree of differentiation to competitors</a:t>
+            </a:r>
+          </a:p>
+          <a:p>
+            <a:pPr lvl="1"/>
+            <a:r>
+              <a:rPr lang="en-AU" sz="5000" dirty="0">
+                <a:latin typeface="Arial" panose="020B0604020202020204" pitchFamily="34" charset="0"/>
+                <a:cs typeface="Arial" panose="020B0604020202020204" pitchFamily="34" charset="0"/>
+              </a:rPr>
+              <a:t>Development: Inhouse with your best teams</a:t>
+            </a:r>
+          </a:p>
+          <a:p>
+            <a:r>
+              <a:rPr lang="en-AU" sz="7200" dirty="0">
+                <a:latin typeface="Arial" panose="020B0604020202020204" pitchFamily="34" charset="0"/>
+                <a:cs typeface="Arial" panose="020B0604020202020204" pitchFamily="34" charset="0"/>
+              </a:rPr>
+              <a:t>Supporting Subdomain:</a:t>
+            </a:r>
+          </a:p>
+          <a:p>
+            <a:pPr lvl="1"/>
+            <a:r>
+              <a:rPr lang="en-AU" sz="5000" dirty="0">
+                <a:latin typeface="Arial" panose="020B0604020202020204" pitchFamily="34" charset="0"/>
+                <a:cs typeface="Arial" panose="020B0604020202020204" pitchFamily="34" charset="0"/>
+              </a:rPr>
+              <a:t>Supporting functionality, that is not available as COTS-Software</a:t>
+            </a:r>
+          </a:p>
+          <a:p>
+            <a:pPr lvl="1"/>
+            <a:r>
+              <a:rPr lang="en-AU" sz="5000" dirty="0">
+                <a:latin typeface="Arial" panose="020B0604020202020204" pitchFamily="34" charset="0"/>
+                <a:cs typeface="Arial" panose="020B0604020202020204" pitchFamily="34" charset="0"/>
+              </a:rPr>
+              <a:t>Can be implemented with external support but inhouse teams should be in the lead</a:t>
+            </a:r>
+          </a:p>
+          <a:p>
+            <a:r>
+              <a:rPr lang="en-AU" sz="7200" dirty="0">
+                <a:latin typeface="Arial" panose="020B0604020202020204" pitchFamily="34" charset="0"/>
+                <a:cs typeface="Arial" panose="020B0604020202020204" pitchFamily="34" charset="0"/>
+              </a:rPr>
+              <a:t>Generic Subdomain:</a:t>
+            </a:r>
+          </a:p>
+          <a:p>
+            <a:pPr lvl="1"/>
+            <a:r>
+              <a:rPr lang="en-AU" sz="5000" dirty="0">
+                <a:latin typeface="Arial" panose="020B0604020202020204" pitchFamily="34" charset="0"/>
+                <a:cs typeface="Arial" panose="020B0604020202020204" pitchFamily="34" charset="0"/>
+              </a:rPr>
+              <a:t>Suitable for Outsourcing, COTS</a:t>
+            </a:r>
+            <a:endParaRPr lang="en-US" dirty="0"/>
+          </a:p>
+        </p:txBody>
+      </p:sp>
+      <p:sp>
+        <p:nvSpPr>
+          <p:cNvPr id="4" name="Slide Number Placeholder 3"/>
+          <p:cNvSpPr>
+            <a:spLocks noGrp="1"/>
+          </p:cNvSpPr>
+          <p:nvPr>
+            <p:ph type="sldNum" sz="quarter" idx="5"/>
+          </p:nvPr>
+        </p:nvSpPr>
+        <p:spPr/>
+        <p:txBody>
+          <a:bodyPr/>
+          <a:lstStyle/>
+          <a:p>
+            <a:fld id="{18D02FFD-07D4-5C4F-BD77-921008177348}" type="slidenum">
+              <a:rPr lang="en-US" smtClean="0"/>
+              <a:t>17</a:t>
+            </a:fld>
+            <a:endParaRPr lang="en-US"/>
+          </a:p>
+        </p:txBody>
+      </p:sp>
+    </p:spTree>
+    <p:extLst>
+      <p:ext uri="{BB962C8B-B14F-4D97-AF65-F5344CB8AC3E}">
+        <p14:creationId xmlns:p14="http://schemas.microsoft.com/office/powerpoint/2010/main" val="2868797028"/>
+      </p:ext>
+    </p:extLst>
+  </p:cSld>
+  <p:clrMapOvr>
+    <a:masterClrMapping/>
+  </p:clrMapOvr>
+</p:notes>
+</file>
+
 <file path=ppt/slideLayouts/slideLayout1.xml><?xml version="1.0" encoding="utf-8"?>
 <p:sldLayout xmlns:a="http://schemas.openxmlformats.org/drawingml/2006/main" xmlns:r="http://schemas.openxmlformats.org/officeDocument/2006/relationships" xmlns:p="http://schemas.openxmlformats.org/presentationml/2006/main" type="title" preserve="1">
   <p:cSld name="Title Slide">
@@ -630,7 +800,7 @@
           <a:p>
             <a:fld id="{7B96480C-D4FF-4D5B-ABA4-4D6837D6C648}" type="datetime1">
               <a:rPr lang="en-US" smtClean="0"/>
-              <a:t>6/28/19</a:t>
+              <a:t>9/14/19</a:t>
             </a:fld>
             <a:endParaRPr lang="en-US"/>
           </a:p>
@@ -828,7 +998,7 @@
           <a:p>
             <a:fld id="{2B0CB159-0D74-4138-B60D-46734C7189CF}" type="datetime1">
               <a:rPr lang="en-US" smtClean="0"/>
-              <a:t>6/28/19</a:t>
+              <a:t>9/14/19</a:t>
             </a:fld>
             <a:endParaRPr lang="en-US"/>
           </a:p>
@@ -1036,7 +1206,7 @@
           <a:p>
             <a:fld id="{86F74E00-A3D9-49B2-92EE-F6E2B61C4694}" type="datetime1">
               <a:rPr lang="en-US" smtClean="0"/>
-              <a:t>6/28/19</a:t>
+              <a:t>9/14/19</a:t>
             </a:fld>
             <a:endParaRPr lang="en-US"/>
           </a:p>
@@ -1234,7 +1404,7 @@
           <a:p>
             <a:fld id="{A29C9B81-F5CF-4CDA-9CEC-028BA81B2A6E}" type="datetime1">
               <a:rPr lang="en-US" smtClean="0"/>
-              <a:t>6/28/19</a:t>
+              <a:t>9/14/19</a:t>
             </a:fld>
             <a:endParaRPr lang="en-US"/>
           </a:p>
@@ -1509,7 +1679,7 @@
           <a:p>
             <a:fld id="{52145163-3C70-466E-906B-2D77BA0C333D}" type="datetime1">
               <a:rPr lang="en-US" smtClean="0"/>
-              <a:t>6/28/19</a:t>
+              <a:t>9/14/19</a:t>
             </a:fld>
             <a:endParaRPr lang="en-US"/>
           </a:p>
@@ -1774,7 +1944,7 @@
           <a:p>
             <a:fld id="{9FB606A8-AA48-4381-B480-A7AEFF509F86}" type="datetime1">
               <a:rPr lang="en-US" smtClean="0"/>
-              <a:t>6/28/19</a:t>
+              <a:t>9/14/19</a:t>
             </a:fld>
             <a:endParaRPr lang="en-US"/>
           </a:p>
@@ -2186,7 +2356,7 @@
           <a:p>
             <a:fld id="{9BA70369-C48D-428A-89D3-F6AB96F8E2CB}" type="datetime1">
               <a:rPr lang="en-US" smtClean="0"/>
-              <a:t>6/28/19</a:t>
+              <a:t>9/14/19</a:t>
             </a:fld>
             <a:endParaRPr lang="en-US"/>
           </a:p>
@@ -2327,7 +2497,7 @@
           <a:p>
             <a:fld id="{E5C6C4CC-783D-487E-9A23-3CB2EC84C407}" type="datetime1">
               <a:rPr lang="en-US" smtClean="0"/>
-              <a:t>6/28/19</a:t>
+              <a:t>9/14/19</a:t>
             </a:fld>
             <a:endParaRPr lang="en-US"/>
           </a:p>
@@ -2440,7 +2610,7 @@
           <a:p>
             <a:fld id="{5FC39CF2-C652-4D61-A0C7-12EEBAD43262}" type="datetime1">
               <a:rPr lang="en-US" smtClean="0"/>
-              <a:t>6/28/19</a:t>
+              <a:t>9/14/19</a:t>
             </a:fld>
             <a:endParaRPr lang="en-US"/>
           </a:p>
@@ -2751,7 +2921,7 @@
           <a:p>
             <a:fld id="{D0117E5F-4046-4A29-BA38-71ADE6C0BF60}" type="datetime1">
               <a:rPr lang="en-US" smtClean="0"/>
-              <a:t>6/28/19</a:t>
+              <a:t>9/14/19</a:t>
             </a:fld>
             <a:endParaRPr lang="en-US"/>
           </a:p>
@@ -3039,7 +3209,7 @@
           <a:p>
             <a:fld id="{45A4B8E9-EDAD-4893-841E-969713864D5C}" type="datetime1">
               <a:rPr lang="en-US" smtClean="0"/>
-              <a:t>6/28/19</a:t>
+              <a:t>9/14/19</a:t>
             </a:fld>
             <a:endParaRPr lang="en-US"/>
           </a:p>
@@ -3280,7 +3450,7 @@
           <a:p>
             <a:fld id="{AE38EC32-B703-4DCD-92CB-6CEE84524E24}" type="datetime1">
               <a:rPr lang="en-US" smtClean="0"/>
-              <a:t>6/28/19</a:t>
+              <a:t>9/14/19</a:t>
             </a:fld>
             <a:endParaRPr lang="en-US"/>
           </a:p>
@@ -11938,13 +12108,118 @@
             <p:ph type="sldNum" sz="quarter" idx="12"/>
           </p:nvPr>
         </p:nvSpPr>
-        <p:spPr/>
-        <p:txBody>
-          <a:bodyPr/>
-          <a:lstStyle/>
+        <p:spPr>
+          <a:xfrm>
+            <a:off x="11480800" y="8475133"/>
+            <a:ext cx="3657600" cy="486833"/>
+          </a:xfrm>
+          <a:prstGeom prst="rect">
+            <a:avLst/>
+          </a:prstGeom>
+        </p:spPr>
+        <p:txBody>
+          <a:bodyPr vert="horz" lIns="121920" tIns="60960" rIns="121920" bIns="60960" rtlCol="0" anchor="ctr"/>
+          <a:lstStyle>
+            <a:defPPr>
+              <a:defRPr lang="en-US"/>
+            </a:defPPr>
+            <a:lvl1pPr marL="0" algn="r" defTabSz="1219170" rtl="0" eaLnBrk="1" latinLnBrk="0" hangingPunct="1">
+              <a:defRPr sz="1600" kern="1200">
+                <a:solidFill>
+                  <a:schemeClr val="tx1">
+                    <a:tint val="75000"/>
+                  </a:schemeClr>
+                </a:solidFill>
+                <a:latin typeface="+mn-lt"/>
+                <a:ea typeface="+mn-ea"/>
+                <a:cs typeface="+mn-cs"/>
+              </a:defRPr>
+            </a:lvl1pPr>
+            <a:lvl2pPr marL="609585" algn="l" defTabSz="1219170" rtl="0" eaLnBrk="1" latinLnBrk="0" hangingPunct="1">
+              <a:defRPr sz="2400" kern="1200">
+                <a:solidFill>
+                  <a:schemeClr val="tx1"/>
+                </a:solidFill>
+                <a:latin typeface="+mn-lt"/>
+                <a:ea typeface="+mn-ea"/>
+                <a:cs typeface="+mn-cs"/>
+              </a:defRPr>
+            </a:lvl2pPr>
+            <a:lvl3pPr marL="1219170" algn="l" defTabSz="1219170" rtl="0" eaLnBrk="1" latinLnBrk="0" hangingPunct="1">
+              <a:defRPr sz="2400" kern="1200">
+                <a:solidFill>
+                  <a:schemeClr val="tx1"/>
+                </a:solidFill>
+                <a:latin typeface="+mn-lt"/>
+                <a:ea typeface="+mn-ea"/>
+                <a:cs typeface="+mn-cs"/>
+              </a:defRPr>
+            </a:lvl3pPr>
+            <a:lvl4pPr marL="1828754" algn="l" defTabSz="1219170" rtl="0" eaLnBrk="1" latinLnBrk="0" hangingPunct="1">
+              <a:defRPr sz="2400" kern="1200">
+                <a:solidFill>
+                  <a:schemeClr val="tx1"/>
+                </a:solidFill>
+                <a:latin typeface="+mn-lt"/>
+                <a:ea typeface="+mn-ea"/>
+                <a:cs typeface="+mn-cs"/>
+              </a:defRPr>
+            </a:lvl4pPr>
+            <a:lvl5pPr marL="2438339" algn="l" defTabSz="1219170" rtl="0" eaLnBrk="1" latinLnBrk="0" hangingPunct="1">
+              <a:defRPr sz="2400" kern="1200">
+                <a:solidFill>
+                  <a:schemeClr val="tx1"/>
+                </a:solidFill>
+                <a:latin typeface="+mn-lt"/>
+                <a:ea typeface="+mn-ea"/>
+                <a:cs typeface="+mn-cs"/>
+              </a:defRPr>
+            </a:lvl5pPr>
+            <a:lvl6pPr marL="3047924" algn="l" defTabSz="1219170" rtl="0" eaLnBrk="1" latinLnBrk="0" hangingPunct="1">
+              <a:defRPr sz="2400" kern="1200">
+                <a:solidFill>
+                  <a:schemeClr val="tx1"/>
+                </a:solidFill>
+                <a:latin typeface="+mn-lt"/>
+                <a:ea typeface="+mn-ea"/>
+                <a:cs typeface="+mn-cs"/>
+              </a:defRPr>
+            </a:lvl6pPr>
+            <a:lvl7pPr marL="3657509" algn="l" defTabSz="1219170" rtl="0" eaLnBrk="1" latinLnBrk="0" hangingPunct="1">
+              <a:defRPr sz="2400" kern="1200">
+                <a:solidFill>
+                  <a:schemeClr val="tx1"/>
+                </a:solidFill>
+                <a:latin typeface="+mn-lt"/>
+                <a:ea typeface="+mn-ea"/>
+                <a:cs typeface="+mn-cs"/>
+              </a:defRPr>
+            </a:lvl7pPr>
+            <a:lvl8pPr marL="4267093" algn="l" defTabSz="1219170" rtl="0" eaLnBrk="1" latinLnBrk="0" hangingPunct="1">
+              <a:defRPr sz="2400" kern="1200">
+                <a:solidFill>
+                  <a:schemeClr val="tx1"/>
+                </a:solidFill>
+                <a:latin typeface="+mn-lt"/>
+                <a:ea typeface="+mn-ea"/>
+                <a:cs typeface="+mn-cs"/>
+              </a:defRPr>
+            </a:lvl8pPr>
+            <a:lvl9pPr marL="4876678" algn="l" defTabSz="1219170" rtl="0" eaLnBrk="1" latinLnBrk="0" hangingPunct="1">
+              <a:defRPr sz="2400" kern="1200">
+                <a:solidFill>
+                  <a:schemeClr val="tx1"/>
+                </a:solidFill>
+                <a:latin typeface="+mn-lt"/>
+                <a:ea typeface="+mn-ea"/>
+                <a:cs typeface="+mn-cs"/>
+              </a:defRPr>
+            </a:lvl9pPr>
+          </a:lstStyle>
           <a:p>
             <a:fld id="{C565C23E-6D76-459C-BC14-A9049E4EE889}" type="slidenum">
               <a:rPr lang="en-US" smtClean="0"/>
+              <a:pPr/>
               <a:t>17</a:t>
             </a:fld>
             <a:endParaRPr lang="en-US"/>
@@ -11965,8 +12240,8 @@
         </p:nvSpPr>
         <p:spPr>
           <a:xfrm>
-            <a:off x="689113" y="450573"/>
-            <a:ext cx="8163057" cy="5736217"/>
+            <a:off x="318048" y="282827"/>
+            <a:ext cx="11274183" cy="5498541"/>
           </a:xfrm>
           <a:custGeom>
             <a:avLst/>
@@ -13878,7 +14153,7 @@
           <a:lstStyle/>
           <a:p>
             <a:pPr algn="ctr"/>
-            <a:endParaRPr lang="en-US"/>
+            <a:endParaRPr lang="en-US" sz="1351"/>
           </a:p>
         </p:txBody>
       </p:sp>
@@ -13896,8 +14171,8 @@
         </p:nvSpPr>
         <p:spPr>
           <a:xfrm>
-            <a:off x="4379843" y="450574"/>
-            <a:ext cx="3061416" cy="369332"/>
+            <a:off x="5429328" y="762595"/>
+            <a:ext cx="2898166" cy="379656"/>
           </a:xfrm>
           <a:prstGeom prst="rect">
             <a:avLst/>
@@ -13911,8 +14186,8 @@
           <a:lstStyle/>
           <a:p>
             <a:r>
-              <a:rPr lang="en-US" dirty="0"/>
-              <a:t>Kc-container-shipment context</a:t>
+              <a:rPr lang="en-US" sz="1867" dirty="0"/>
+              <a:t>container-shipment Domain</a:t>
             </a:r>
           </a:p>
         </p:txBody>
@@ -13931,8 +14206,8 @@
         </p:nvSpPr>
         <p:spPr>
           <a:xfrm>
-            <a:off x="1575880" y="1384022"/>
-            <a:ext cx="2803963" cy="3226889"/>
+            <a:off x="1170082" y="2333563"/>
+            <a:ext cx="3248901" cy="1188051"/>
           </a:xfrm>
           <a:custGeom>
             <a:avLst/>
@@ -15820,7 +16095,7 @@
           </a:custGeom>
           <a:noFill/>
           <a:ln w="22225">
-            <a:prstDash val="dashDot"/>
+            <a:prstDash val="solid"/>
           </a:ln>
         </p:spPr>
         <p:style>
@@ -15844,7 +16119,7 @@
           <a:lstStyle/>
           <a:p>
             <a:pPr algn="ctr"/>
-            <a:endParaRPr lang="en-US"/>
+            <a:endParaRPr lang="en-US" sz="1351"/>
           </a:p>
         </p:txBody>
       </p:sp>
@@ -15862,8 +16137,8 @@
         </p:nvSpPr>
         <p:spPr>
           <a:xfrm>
-            <a:off x="2245845" y="1772810"/>
-            <a:ext cx="1512658" cy="369332"/>
+            <a:off x="1545978" y="2772825"/>
+            <a:ext cx="2469330" cy="338554"/>
           </a:xfrm>
           <a:prstGeom prst="rect">
             <a:avLst/>
@@ -15877,8 +16152,8 @@
           <a:lstStyle/>
           <a:p>
             <a:r>
-              <a:rPr lang="en-US" dirty="0"/>
-              <a:t>Order Context</a:t>
+              <a:rPr lang="en-US" sz="1600" dirty="0"/>
+              <a:t>Order subdomain (support)</a:t>
             </a:r>
           </a:p>
         </p:txBody>
@@ -15897,8 +16172,8 @@
         </p:nvSpPr>
         <p:spPr>
           <a:xfrm>
-            <a:off x="4649821" y="1614791"/>
-            <a:ext cx="3949522" cy="3540869"/>
+            <a:off x="4765142" y="1440608"/>
+            <a:ext cx="2803964" cy="1160497"/>
           </a:xfrm>
           <a:custGeom>
             <a:avLst/>
@@ -16736,7 +17011,7 @@
           <a:lstStyle/>
           <a:p>
             <a:pPr algn="ctr"/>
-            <a:endParaRPr lang="en-US"/>
+            <a:endParaRPr lang="en-US" sz="1351"/>
           </a:p>
         </p:txBody>
       </p:sp>
@@ -16754,8 +17029,8 @@
         </p:nvSpPr>
         <p:spPr>
           <a:xfrm>
-            <a:off x="5928601" y="1984124"/>
-            <a:ext cx="1991764" cy="369332"/>
+            <a:off x="5207528" y="1780737"/>
+            <a:ext cx="1695079" cy="584775"/>
           </a:xfrm>
           <a:prstGeom prst="rect">
             <a:avLst/>
@@ -16769,18 +17044,24 @@
           <a:lstStyle/>
           <a:p>
             <a:r>
-              <a:rPr lang="en-US" dirty="0"/>
-              <a:t>Container  Context</a:t>
-            </a:r>
-          </a:p>
-        </p:txBody>
-      </p:sp>
-      <p:sp>
-        <p:nvSpPr>
-          <p:cNvPr id="10" name="Rectangle 9">
-            <a:extLst>
-              <a:ext uri="{FF2B5EF4-FFF2-40B4-BE49-F238E27FC236}">
-                <a16:creationId xmlns:a16="http://schemas.microsoft.com/office/drawing/2014/main" id="{C6FB49FE-0AC0-9240-8F38-7DD725E4E8AE}"/>
+              <a:rPr lang="en-US" sz="1600" dirty="0"/>
+              <a:t>Container </a:t>
+            </a:r>
+          </a:p>
+          <a:p>
+            <a:r>
+              <a:rPr lang="en-US" sz="1600" dirty="0"/>
+              <a:t> subdomain (core)</a:t>
+            </a:r>
+          </a:p>
+        </p:txBody>
+      </p:sp>
+      <p:sp>
+        <p:nvSpPr>
+          <p:cNvPr id="12" name="Freeform 11">
+            <a:extLst>
+              <a:ext uri="{FF2B5EF4-FFF2-40B4-BE49-F238E27FC236}">
+                <a16:creationId xmlns:a16="http://schemas.microsoft.com/office/drawing/2014/main" id="{AE9BBE00-EBB9-2F4F-8D55-F0F2278BFC34}"/>
               </a:ext>
             </a:extLst>
           </p:cNvPr>
@@ -16789,15 +17070,185 @@
         </p:nvSpPr>
         <p:spPr>
           <a:xfrm>
-            <a:off x="2520661" y="2610720"/>
-            <a:ext cx="914400" cy="468578"/>
+            <a:off x="5035827" y="4187687"/>
+            <a:ext cx="3304208" cy="1219200"/>
           </a:xfrm>
-          <a:prstGeom prst="rect">
+          <a:custGeom>
             <a:avLst/>
-          </a:prstGeom>
-          <a:solidFill>
-            <a:schemeClr val="accent6"/>
-          </a:solidFill>
+            <a:gdLst>
+              <a:gd name="connsiteX0" fmla="*/ 304800 w 2478156"/>
+              <a:gd name="connsiteY0" fmla="*/ 66261 h 914400"/>
+              <a:gd name="connsiteX1" fmla="*/ 304800 w 2478156"/>
+              <a:gd name="connsiteY1" fmla="*/ 66261 h 914400"/>
+              <a:gd name="connsiteX2" fmla="*/ 198782 w 2478156"/>
+              <a:gd name="connsiteY2" fmla="*/ 145774 h 914400"/>
+              <a:gd name="connsiteX3" fmla="*/ 145773 w 2478156"/>
+              <a:gd name="connsiteY3" fmla="*/ 198783 h 914400"/>
+              <a:gd name="connsiteX4" fmla="*/ 79513 w 2478156"/>
+              <a:gd name="connsiteY4" fmla="*/ 251792 h 914400"/>
+              <a:gd name="connsiteX5" fmla="*/ 66260 w 2478156"/>
+              <a:gd name="connsiteY5" fmla="*/ 318052 h 914400"/>
+              <a:gd name="connsiteX6" fmla="*/ 0 w 2478156"/>
+              <a:gd name="connsiteY6" fmla="*/ 649357 h 914400"/>
+              <a:gd name="connsiteX7" fmla="*/ 212034 w 2478156"/>
+              <a:gd name="connsiteY7" fmla="*/ 874644 h 914400"/>
+              <a:gd name="connsiteX8" fmla="*/ 662608 w 2478156"/>
+              <a:gd name="connsiteY8" fmla="*/ 914400 h 914400"/>
+              <a:gd name="connsiteX9" fmla="*/ 1815547 w 2478156"/>
+              <a:gd name="connsiteY9" fmla="*/ 834887 h 914400"/>
+              <a:gd name="connsiteX10" fmla="*/ 2345634 w 2478156"/>
+              <a:gd name="connsiteY10" fmla="*/ 781878 h 914400"/>
+              <a:gd name="connsiteX11" fmla="*/ 2478156 w 2478156"/>
+              <a:gd name="connsiteY11" fmla="*/ 556592 h 914400"/>
+              <a:gd name="connsiteX12" fmla="*/ 2305878 w 2478156"/>
+              <a:gd name="connsiteY12" fmla="*/ 304800 h 914400"/>
+              <a:gd name="connsiteX13" fmla="*/ 1987826 w 2478156"/>
+              <a:gd name="connsiteY13" fmla="*/ 159026 h 914400"/>
+              <a:gd name="connsiteX14" fmla="*/ 1643269 w 2478156"/>
+              <a:gd name="connsiteY14" fmla="*/ 53009 h 914400"/>
+              <a:gd name="connsiteX15" fmla="*/ 1245704 w 2478156"/>
+              <a:gd name="connsiteY15" fmla="*/ 39757 h 914400"/>
+              <a:gd name="connsiteX16" fmla="*/ 914400 w 2478156"/>
+              <a:gd name="connsiteY16" fmla="*/ 0 h 914400"/>
+              <a:gd name="connsiteX17" fmla="*/ 649356 w 2478156"/>
+              <a:gd name="connsiteY17" fmla="*/ 26505 h 914400"/>
+              <a:gd name="connsiteX18" fmla="*/ 304800 w 2478156"/>
+              <a:gd name="connsiteY18" fmla="*/ 66261 h 914400"/>
+            </a:gdLst>
+            <a:ahLst/>
+            <a:cxnLst>
+              <a:cxn ang="0">
+                <a:pos x="connsiteX0" y="connsiteY0"/>
+              </a:cxn>
+              <a:cxn ang="0">
+                <a:pos x="connsiteX1" y="connsiteY1"/>
+              </a:cxn>
+              <a:cxn ang="0">
+                <a:pos x="connsiteX2" y="connsiteY2"/>
+              </a:cxn>
+              <a:cxn ang="0">
+                <a:pos x="connsiteX3" y="connsiteY3"/>
+              </a:cxn>
+              <a:cxn ang="0">
+                <a:pos x="connsiteX4" y="connsiteY4"/>
+              </a:cxn>
+              <a:cxn ang="0">
+                <a:pos x="connsiteX5" y="connsiteY5"/>
+              </a:cxn>
+              <a:cxn ang="0">
+                <a:pos x="connsiteX6" y="connsiteY6"/>
+              </a:cxn>
+              <a:cxn ang="0">
+                <a:pos x="connsiteX7" y="connsiteY7"/>
+              </a:cxn>
+              <a:cxn ang="0">
+                <a:pos x="connsiteX8" y="connsiteY8"/>
+              </a:cxn>
+              <a:cxn ang="0">
+                <a:pos x="connsiteX9" y="connsiteY9"/>
+              </a:cxn>
+              <a:cxn ang="0">
+                <a:pos x="connsiteX10" y="connsiteY10"/>
+              </a:cxn>
+              <a:cxn ang="0">
+                <a:pos x="connsiteX11" y="connsiteY11"/>
+              </a:cxn>
+              <a:cxn ang="0">
+                <a:pos x="connsiteX12" y="connsiteY12"/>
+              </a:cxn>
+              <a:cxn ang="0">
+                <a:pos x="connsiteX13" y="connsiteY13"/>
+              </a:cxn>
+              <a:cxn ang="0">
+                <a:pos x="connsiteX14" y="connsiteY14"/>
+              </a:cxn>
+              <a:cxn ang="0">
+                <a:pos x="connsiteX15" y="connsiteY15"/>
+              </a:cxn>
+              <a:cxn ang="0">
+                <a:pos x="connsiteX16" y="connsiteY16"/>
+              </a:cxn>
+              <a:cxn ang="0">
+                <a:pos x="connsiteX17" y="connsiteY17"/>
+              </a:cxn>
+              <a:cxn ang="0">
+                <a:pos x="connsiteX18" y="connsiteY18"/>
+              </a:cxn>
+            </a:cxnLst>
+            <a:rect l="l" t="t" r="r" b="b"/>
+            <a:pathLst>
+              <a:path w="2478156" h="914400">
+                <a:moveTo>
+                  <a:pt x="304800" y="66261"/>
+                </a:moveTo>
+                <a:lnTo>
+                  <a:pt x="304800" y="66261"/>
+                </a:lnTo>
+                <a:cubicBezTo>
+                  <a:pt x="269461" y="92765"/>
+                  <a:pt x="232718" y="117495"/>
+                  <a:pt x="198782" y="145774"/>
+                </a:cubicBezTo>
+                <a:cubicBezTo>
+                  <a:pt x="179585" y="161771"/>
+                  <a:pt x="164746" y="182521"/>
+                  <a:pt x="145773" y="198783"/>
+                </a:cubicBezTo>
+                <a:cubicBezTo>
+                  <a:pt x="28768" y="299073"/>
+                  <a:pt x="169723" y="161578"/>
+                  <a:pt x="79513" y="251792"/>
+                </a:cubicBezTo>
+                <a:cubicBezTo>
+                  <a:pt x="63466" y="299929"/>
+                  <a:pt x="66260" y="277579"/>
+                  <a:pt x="66260" y="318052"/>
+                </a:cubicBezTo>
+                <a:lnTo>
+                  <a:pt x="0" y="649357"/>
+                </a:lnTo>
+                <a:lnTo>
+                  <a:pt x="212034" y="874644"/>
+                </a:lnTo>
+                <a:lnTo>
+                  <a:pt x="662608" y="914400"/>
+                </a:lnTo>
+                <a:lnTo>
+                  <a:pt x="1815547" y="834887"/>
+                </a:lnTo>
+                <a:lnTo>
+                  <a:pt x="2345634" y="781878"/>
+                </a:lnTo>
+                <a:lnTo>
+                  <a:pt x="2478156" y="556592"/>
+                </a:lnTo>
+                <a:lnTo>
+                  <a:pt x="2305878" y="304800"/>
+                </a:lnTo>
+                <a:lnTo>
+                  <a:pt x="1987826" y="159026"/>
+                </a:lnTo>
+                <a:lnTo>
+                  <a:pt x="1643269" y="53009"/>
+                </a:lnTo>
+                <a:lnTo>
+                  <a:pt x="1245704" y="39757"/>
+                </a:lnTo>
+                <a:lnTo>
+                  <a:pt x="914400" y="0"/>
+                </a:lnTo>
+                <a:lnTo>
+                  <a:pt x="649356" y="26505"/>
+                </a:lnTo>
+                <a:lnTo>
+                  <a:pt x="304800" y="66261"/>
+                </a:lnTo>
+                <a:close/>
+              </a:path>
+            </a:pathLst>
+          </a:custGeom>
+          <a:noFill/>
+          <a:ln w="19050"/>
         </p:spPr>
         <p:style>
           <a:lnRef idx="2">
@@ -16816,44 +17267,559 @@
           </a:fontRef>
         </p:style>
         <p:txBody>
-          <a:bodyPr rtlCol="0" anchor="ctr"/>
+          <a:bodyPr rtlCol="0" anchor="t"/>
           <a:lstStyle/>
           <a:p>
-            <a:pPr algn="ctr"/>
-            <a:r>
-              <a:rPr lang="en-US" b="1" dirty="0">
-                <a:solidFill>
-                  <a:schemeClr val="bg1"/>
-                </a:solidFill>
-              </a:rPr>
-              <a:t>Order</a:t>
-            </a:r>
-          </a:p>
-        </p:txBody>
-      </p:sp>
-      <p:sp>
-        <p:nvSpPr>
-          <p:cNvPr id="11" name="Rectangle 10">
-            <a:extLst>
-              <a:ext uri="{FF2B5EF4-FFF2-40B4-BE49-F238E27FC236}">
-                <a16:creationId xmlns:a16="http://schemas.microsoft.com/office/drawing/2014/main" id="{778DE887-D624-9D47-8F60-D56D3B1936E9}"/>
-              </a:ext>
-            </a:extLst>
-          </p:cNvPr>
-          <p:cNvSpPr/>
+            <a:pPr defTabSz="914377"/>
+            <a:endParaRPr lang="en-US" sz="1333" dirty="0">
+              <a:solidFill>
+                <a:prstClr val="white"/>
+              </a:solidFill>
+              <a:latin typeface="Arial"/>
+            </a:endParaRPr>
+          </a:p>
+        </p:txBody>
+      </p:sp>
+      <p:sp>
+        <p:nvSpPr>
+          <p:cNvPr id="13" name="TextBox 12">
+            <a:extLst>
+              <a:ext uri="{FF2B5EF4-FFF2-40B4-BE49-F238E27FC236}">
+                <a16:creationId xmlns:a16="http://schemas.microsoft.com/office/drawing/2014/main" id="{9785D5B5-1070-BA43-ADB5-7A3AC028C7AC}"/>
+              </a:ext>
+            </a:extLst>
+          </p:cNvPr>
+          <p:cNvSpPr txBox="1"/>
           <p:nvPr/>
         </p:nvSpPr>
         <p:spPr>
           <a:xfrm>
-            <a:off x="6167381" y="2916647"/>
-            <a:ext cx="1512657" cy="468578"/>
+            <a:off x="5366009" y="4585618"/>
+            <a:ext cx="2778068" cy="338554"/>
           </a:xfrm>
           <a:prstGeom prst="rect">
             <a:avLst/>
           </a:prstGeom>
-          <a:solidFill>
-            <a:schemeClr val="accent6"/>
-          </a:solidFill>
+          <a:noFill/>
+        </p:spPr>
+        <p:txBody>
+          <a:bodyPr wrap="none" rtlCol="0">
+            <a:spAutoFit/>
+          </a:bodyPr>
+          <a:lstStyle/>
+          <a:p>
+            <a:r>
+              <a:rPr lang="en-US" sz="1600" dirty="0"/>
+              <a:t>Inventory subdomain (support)</a:t>
+            </a:r>
+          </a:p>
+        </p:txBody>
+      </p:sp>
+      <p:sp>
+        <p:nvSpPr>
+          <p:cNvPr id="15" name="Freeform 14">
+            <a:extLst>
+              <a:ext uri="{FF2B5EF4-FFF2-40B4-BE49-F238E27FC236}">
+                <a16:creationId xmlns:a16="http://schemas.microsoft.com/office/drawing/2014/main" id="{D7B9623A-A792-DF46-B717-437C52E7542C}"/>
+              </a:ext>
+            </a:extLst>
+          </p:cNvPr>
+          <p:cNvSpPr/>
+          <p:nvPr/>
+        </p:nvSpPr>
+        <p:spPr>
+          <a:xfrm>
+            <a:off x="7872850" y="1718250"/>
+            <a:ext cx="2773172" cy="1067495"/>
+          </a:xfrm>
+          <a:custGeom>
+            <a:avLst/>
+            <a:gdLst>
+              <a:gd name="connsiteX0" fmla="*/ 132521 w 2346014"/>
+              <a:gd name="connsiteY0" fmla="*/ 331304 h 1113406"/>
+              <a:gd name="connsiteX1" fmla="*/ 0 w 2346014"/>
+              <a:gd name="connsiteY1" fmla="*/ 675861 h 1113406"/>
+              <a:gd name="connsiteX2" fmla="*/ 92765 w 2346014"/>
+              <a:gd name="connsiteY2" fmla="*/ 755374 h 1113406"/>
+              <a:gd name="connsiteX3" fmla="*/ 132521 w 2346014"/>
+              <a:gd name="connsiteY3" fmla="*/ 795130 h 1113406"/>
+              <a:gd name="connsiteX4" fmla="*/ 357808 w 2346014"/>
+              <a:gd name="connsiteY4" fmla="*/ 980661 h 1113406"/>
+              <a:gd name="connsiteX5" fmla="*/ 715617 w 2346014"/>
+              <a:gd name="connsiteY5" fmla="*/ 1099930 h 1113406"/>
+              <a:gd name="connsiteX6" fmla="*/ 1444487 w 2346014"/>
+              <a:gd name="connsiteY6" fmla="*/ 1099930 h 1113406"/>
+              <a:gd name="connsiteX7" fmla="*/ 1524000 w 2346014"/>
+              <a:gd name="connsiteY7" fmla="*/ 1073426 h 1113406"/>
+              <a:gd name="connsiteX8" fmla="*/ 1577008 w 2346014"/>
+              <a:gd name="connsiteY8" fmla="*/ 1060174 h 1113406"/>
+              <a:gd name="connsiteX9" fmla="*/ 1616765 w 2346014"/>
+              <a:gd name="connsiteY9" fmla="*/ 1046921 h 1113406"/>
+              <a:gd name="connsiteX10" fmla="*/ 1722782 w 2346014"/>
+              <a:gd name="connsiteY10" fmla="*/ 1020417 h 1113406"/>
+              <a:gd name="connsiteX11" fmla="*/ 1775791 w 2346014"/>
+              <a:gd name="connsiteY11" fmla="*/ 1007165 h 1113406"/>
+              <a:gd name="connsiteX12" fmla="*/ 1934817 w 2346014"/>
+              <a:gd name="connsiteY12" fmla="*/ 954156 h 1113406"/>
+              <a:gd name="connsiteX13" fmla="*/ 2027582 w 2346014"/>
+              <a:gd name="connsiteY13" fmla="*/ 940904 h 1113406"/>
+              <a:gd name="connsiteX14" fmla="*/ 2040834 w 2346014"/>
+              <a:gd name="connsiteY14" fmla="*/ 887895 h 1113406"/>
+              <a:gd name="connsiteX15" fmla="*/ 2067339 w 2346014"/>
+              <a:gd name="connsiteY15" fmla="*/ 861391 h 1113406"/>
+              <a:gd name="connsiteX16" fmla="*/ 2093843 w 2346014"/>
+              <a:gd name="connsiteY16" fmla="*/ 821634 h 1113406"/>
+              <a:gd name="connsiteX17" fmla="*/ 2173356 w 2346014"/>
+              <a:gd name="connsiteY17" fmla="*/ 742121 h 1113406"/>
+              <a:gd name="connsiteX18" fmla="*/ 2199860 w 2346014"/>
+              <a:gd name="connsiteY18" fmla="*/ 702365 h 1113406"/>
+              <a:gd name="connsiteX19" fmla="*/ 2239617 w 2346014"/>
+              <a:gd name="connsiteY19" fmla="*/ 675861 h 1113406"/>
+              <a:gd name="connsiteX20" fmla="*/ 2292626 w 2346014"/>
+              <a:gd name="connsiteY20" fmla="*/ 622852 h 1113406"/>
+              <a:gd name="connsiteX21" fmla="*/ 2305878 w 2346014"/>
+              <a:gd name="connsiteY21" fmla="*/ 583095 h 1113406"/>
+              <a:gd name="connsiteX22" fmla="*/ 2345634 w 2346014"/>
+              <a:gd name="connsiteY22" fmla="*/ 556591 h 1113406"/>
+              <a:gd name="connsiteX23" fmla="*/ 2319130 w 2346014"/>
+              <a:gd name="connsiteY23" fmla="*/ 477078 h 1113406"/>
+              <a:gd name="connsiteX24" fmla="*/ 2305878 w 2346014"/>
+              <a:gd name="connsiteY24" fmla="*/ 437321 h 1113406"/>
+              <a:gd name="connsiteX25" fmla="*/ 2239617 w 2346014"/>
+              <a:gd name="connsiteY25" fmla="*/ 318052 h 1113406"/>
+              <a:gd name="connsiteX26" fmla="*/ 2186608 w 2346014"/>
+              <a:gd name="connsiteY26" fmla="*/ 265043 h 1113406"/>
+              <a:gd name="connsiteX27" fmla="*/ 2160104 w 2346014"/>
+              <a:gd name="connsiteY27" fmla="*/ 225287 h 1113406"/>
+              <a:gd name="connsiteX28" fmla="*/ 2107095 w 2346014"/>
+              <a:gd name="connsiteY28" fmla="*/ 212034 h 1113406"/>
+              <a:gd name="connsiteX29" fmla="*/ 1961321 w 2346014"/>
+              <a:gd name="connsiteY29" fmla="*/ 132521 h 1113406"/>
+              <a:gd name="connsiteX30" fmla="*/ 1921565 w 2346014"/>
+              <a:gd name="connsiteY30" fmla="*/ 119269 h 1113406"/>
+              <a:gd name="connsiteX31" fmla="*/ 1881808 w 2346014"/>
+              <a:gd name="connsiteY31" fmla="*/ 79513 h 1113406"/>
+              <a:gd name="connsiteX32" fmla="*/ 1590260 w 2346014"/>
+              <a:gd name="connsiteY32" fmla="*/ 39756 h 1113406"/>
+              <a:gd name="connsiteX33" fmla="*/ 1550504 w 2346014"/>
+              <a:gd name="connsiteY33" fmla="*/ 26504 h 1113406"/>
+              <a:gd name="connsiteX34" fmla="*/ 1444487 w 2346014"/>
+              <a:gd name="connsiteY34" fmla="*/ 0 h 1113406"/>
+              <a:gd name="connsiteX35" fmla="*/ 742121 w 2346014"/>
+              <a:gd name="connsiteY35" fmla="*/ 26504 h 1113406"/>
+              <a:gd name="connsiteX36" fmla="*/ 702365 w 2346014"/>
+              <a:gd name="connsiteY36" fmla="*/ 39756 h 1113406"/>
+              <a:gd name="connsiteX37" fmla="*/ 649356 w 2346014"/>
+              <a:gd name="connsiteY37" fmla="*/ 53008 h 1113406"/>
+              <a:gd name="connsiteX38" fmla="*/ 583095 w 2346014"/>
+              <a:gd name="connsiteY38" fmla="*/ 66261 h 1113406"/>
+              <a:gd name="connsiteX39" fmla="*/ 543339 w 2346014"/>
+              <a:gd name="connsiteY39" fmla="*/ 79513 h 1113406"/>
+              <a:gd name="connsiteX40" fmla="*/ 477078 w 2346014"/>
+              <a:gd name="connsiteY40" fmla="*/ 92765 h 1113406"/>
+              <a:gd name="connsiteX41" fmla="*/ 397565 w 2346014"/>
+              <a:gd name="connsiteY41" fmla="*/ 119269 h 1113406"/>
+              <a:gd name="connsiteX42" fmla="*/ 357808 w 2346014"/>
+              <a:gd name="connsiteY42" fmla="*/ 132521 h 1113406"/>
+              <a:gd name="connsiteX43" fmla="*/ 318052 w 2346014"/>
+              <a:gd name="connsiteY43" fmla="*/ 159026 h 1113406"/>
+              <a:gd name="connsiteX44" fmla="*/ 278295 w 2346014"/>
+              <a:gd name="connsiteY44" fmla="*/ 172278 h 1113406"/>
+              <a:gd name="connsiteX45" fmla="*/ 212034 w 2346014"/>
+              <a:gd name="connsiteY45" fmla="*/ 238539 h 1113406"/>
+              <a:gd name="connsiteX46" fmla="*/ 172278 w 2346014"/>
+              <a:gd name="connsiteY46" fmla="*/ 278295 h 1113406"/>
+              <a:gd name="connsiteX47" fmla="*/ 145774 w 2346014"/>
+              <a:gd name="connsiteY47" fmla="*/ 304800 h 1113406"/>
+              <a:gd name="connsiteX48" fmla="*/ 132521 w 2346014"/>
+              <a:gd name="connsiteY48" fmla="*/ 331304 h 1113406"/>
+            </a:gdLst>
+            <a:ahLst/>
+            <a:cxnLst>
+              <a:cxn ang="0">
+                <a:pos x="connsiteX0" y="connsiteY0"/>
+              </a:cxn>
+              <a:cxn ang="0">
+                <a:pos x="connsiteX1" y="connsiteY1"/>
+              </a:cxn>
+              <a:cxn ang="0">
+                <a:pos x="connsiteX2" y="connsiteY2"/>
+              </a:cxn>
+              <a:cxn ang="0">
+                <a:pos x="connsiteX3" y="connsiteY3"/>
+              </a:cxn>
+              <a:cxn ang="0">
+                <a:pos x="connsiteX4" y="connsiteY4"/>
+              </a:cxn>
+              <a:cxn ang="0">
+                <a:pos x="connsiteX5" y="connsiteY5"/>
+              </a:cxn>
+              <a:cxn ang="0">
+                <a:pos x="connsiteX6" y="connsiteY6"/>
+              </a:cxn>
+              <a:cxn ang="0">
+                <a:pos x="connsiteX7" y="connsiteY7"/>
+              </a:cxn>
+              <a:cxn ang="0">
+                <a:pos x="connsiteX8" y="connsiteY8"/>
+              </a:cxn>
+              <a:cxn ang="0">
+                <a:pos x="connsiteX9" y="connsiteY9"/>
+              </a:cxn>
+              <a:cxn ang="0">
+                <a:pos x="connsiteX10" y="connsiteY10"/>
+              </a:cxn>
+              <a:cxn ang="0">
+                <a:pos x="connsiteX11" y="connsiteY11"/>
+              </a:cxn>
+              <a:cxn ang="0">
+                <a:pos x="connsiteX12" y="connsiteY12"/>
+              </a:cxn>
+              <a:cxn ang="0">
+                <a:pos x="connsiteX13" y="connsiteY13"/>
+              </a:cxn>
+              <a:cxn ang="0">
+                <a:pos x="connsiteX14" y="connsiteY14"/>
+              </a:cxn>
+              <a:cxn ang="0">
+                <a:pos x="connsiteX15" y="connsiteY15"/>
+              </a:cxn>
+              <a:cxn ang="0">
+                <a:pos x="connsiteX16" y="connsiteY16"/>
+              </a:cxn>
+              <a:cxn ang="0">
+                <a:pos x="connsiteX17" y="connsiteY17"/>
+              </a:cxn>
+              <a:cxn ang="0">
+                <a:pos x="connsiteX18" y="connsiteY18"/>
+              </a:cxn>
+              <a:cxn ang="0">
+                <a:pos x="connsiteX19" y="connsiteY19"/>
+              </a:cxn>
+              <a:cxn ang="0">
+                <a:pos x="connsiteX20" y="connsiteY20"/>
+              </a:cxn>
+              <a:cxn ang="0">
+                <a:pos x="connsiteX21" y="connsiteY21"/>
+              </a:cxn>
+              <a:cxn ang="0">
+                <a:pos x="connsiteX22" y="connsiteY22"/>
+              </a:cxn>
+              <a:cxn ang="0">
+                <a:pos x="connsiteX23" y="connsiteY23"/>
+              </a:cxn>
+              <a:cxn ang="0">
+                <a:pos x="connsiteX24" y="connsiteY24"/>
+              </a:cxn>
+              <a:cxn ang="0">
+                <a:pos x="connsiteX25" y="connsiteY25"/>
+              </a:cxn>
+              <a:cxn ang="0">
+                <a:pos x="connsiteX26" y="connsiteY26"/>
+              </a:cxn>
+              <a:cxn ang="0">
+                <a:pos x="connsiteX27" y="connsiteY27"/>
+              </a:cxn>
+              <a:cxn ang="0">
+                <a:pos x="connsiteX28" y="connsiteY28"/>
+              </a:cxn>
+              <a:cxn ang="0">
+                <a:pos x="connsiteX29" y="connsiteY29"/>
+              </a:cxn>
+              <a:cxn ang="0">
+                <a:pos x="connsiteX30" y="connsiteY30"/>
+              </a:cxn>
+              <a:cxn ang="0">
+                <a:pos x="connsiteX31" y="connsiteY31"/>
+              </a:cxn>
+              <a:cxn ang="0">
+                <a:pos x="connsiteX32" y="connsiteY32"/>
+              </a:cxn>
+              <a:cxn ang="0">
+                <a:pos x="connsiteX33" y="connsiteY33"/>
+              </a:cxn>
+              <a:cxn ang="0">
+                <a:pos x="connsiteX34" y="connsiteY34"/>
+              </a:cxn>
+              <a:cxn ang="0">
+                <a:pos x="connsiteX35" y="connsiteY35"/>
+              </a:cxn>
+              <a:cxn ang="0">
+                <a:pos x="connsiteX36" y="connsiteY36"/>
+              </a:cxn>
+              <a:cxn ang="0">
+                <a:pos x="connsiteX37" y="connsiteY37"/>
+              </a:cxn>
+              <a:cxn ang="0">
+                <a:pos x="connsiteX38" y="connsiteY38"/>
+              </a:cxn>
+              <a:cxn ang="0">
+                <a:pos x="connsiteX39" y="connsiteY39"/>
+              </a:cxn>
+              <a:cxn ang="0">
+                <a:pos x="connsiteX40" y="connsiteY40"/>
+              </a:cxn>
+              <a:cxn ang="0">
+                <a:pos x="connsiteX41" y="connsiteY41"/>
+              </a:cxn>
+              <a:cxn ang="0">
+                <a:pos x="connsiteX42" y="connsiteY42"/>
+              </a:cxn>
+              <a:cxn ang="0">
+                <a:pos x="connsiteX43" y="connsiteY43"/>
+              </a:cxn>
+              <a:cxn ang="0">
+                <a:pos x="connsiteX44" y="connsiteY44"/>
+              </a:cxn>
+              <a:cxn ang="0">
+                <a:pos x="connsiteX45" y="connsiteY45"/>
+              </a:cxn>
+              <a:cxn ang="0">
+                <a:pos x="connsiteX46" y="connsiteY46"/>
+              </a:cxn>
+              <a:cxn ang="0">
+                <a:pos x="connsiteX47" y="connsiteY47"/>
+              </a:cxn>
+              <a:cxn ang="0">
+                <a:pos x="connsiteX48" y="connsiteY48"/>
+              </a:cxn>
+            </a:cxnLst>
+            <a:rect l="l" t="t" r="r" b="b"/>
+            <a:pathLst>
+              <a:path w="2346014" h="1113406">
+                <a:moveTo>
+                  <a:pt x="132521" y="331304"/>
+                </a:moveTo>
+                <a:lnTo>
+                  <a:pt x="0" y="675861"/>
+                </a:lnTo>
+                <a:cubicBezTo>
+                  <a:pt x="30922" y="702365"/>
+                  <a:pt x="60963" y="729932"/>
+                  <a:pt x="92765" y="755374"/>
+                </a:cubicBezTo>
+                <a:cubicBezTo>
+                  <a:pt x="136196" y="790119"/>
+                  <a:pt x="132521" y="764345"/>
+                  <a:pt x="132521" y="795130"/>
+                </a:cubicBezTo>
+                <a:lnTo>
+                  <a:pt x="357808" y="980661"/>
+                </a:lnTo>
+                <a:lnTo>
+                  <a:pt x="715617" y="1099930"/>
+                </a:lnTo>
+                <a:cubicBezTo>
+                  <a:pt x="980844" y="1108771"/>
+                  <a:pt x="1183076" y="1125228"/>
+                  <a:pt x="1444487" y="1099930"/>
+                </a:cubicBezTo>
+                <a:cubicBezTo>
+                  <a:pt x="1472295" y="1097239"/>
+                  <a:pt x="1497240" y="1081454"/>
+                  <a:pt x="1524000" y="1073426"/>
+                </a:cubicBezTo>
+                <a:cubicBezTo>
+                  <a:pt x="1541445" y="1068193"/>
+                  <a:pt x="1559496" y="1065178"/>
+                  <a:pt x="1577008" y="1060174"/>
+                </a:cubicBezTo>
+                <a:cubicBezTo>
+                  <a:pt x="1590440" y="1056336"/>
+                  <a:pt x="1603288" y="1050597"/>
+                  <a:pt x="1616765" y="1046921"/>
+                </a:cubicBezTo>
+                <a:cubicBezTo>
+                  <a:pt x="1651908" y="1037336"/>
+                  <a:pt x="1687443" y="1029252"/>
+                  <a:pt x="1722782" y="1020417"/>
+                </a:cubicBezTo>
+                <a:cubicBezTo>
+                  <a:pt x="1740452" y="1016000"/>
+                  <a:pt x="1758880" y="1013929"/>
+                  <a:pt x="1775791" y="1007165"/>
+                </a:cubicBezTo>
+                <a:cubicBezTo>
+                  <a:pt x="1827865" y="986336"/>
+                  <a:pt x="1879264" y="964256"/>
+                  <a:pt x="1934817" y="954156"/>
+                </a:cubicBezTo>
+                <a:cubicBezTo>
+                  <a:pt x="1965549" y="948568"/>
+                  <a:pt x="1996660" y="945321"/>
+                  <a:pt x="2027582" y="940904"/>
+                </a:cubicBezTo>
+                <a:cubicBezTo>
+                  <a:pt x="2031999" y="923234"/>
+                  <a:pt x="2032689" y="904186"/>
+                  <a:pt x="2040834" y="887895"/>
+                </a:cubicBezTo>
+                <a:cubicBezTo>
+                  <a:pt x="2046422" y="876720"/>
+                  <a:pt x="2059534" y="871147"/>
+                  <a:pt x="2067339" y="861391"/>
+                </a:cubicBezTo>
+                <a:cubicBezTo>
+                  <a:pt x="2077289" y="848954"/>
+                  <a:pt x="2083262" y="833538"/>
+                  <a:pt x="2093843" y="821634"/>
+                </a:cubicBezTo>
+                <a:cubicBezTo>
+                  <a:pt x="2118745" y="793619"/>
+                  <a:pt x="2152564" y="773309"/>
+                  <a:pt x="2173356" y="742121"/>
+                </a:cubicBezTo>
+                <a:cubicBezTo>
+                  <a:pt x="2182191" y="728869"/>
+                  <a:pt x="2188598" y="713627"/>
+                  <a:pt x="2199860" y="702365"/>
+                </a:cubicBezTo>
+                <a:cubicBezTo>
+                  <a:pt x="2211122" y="691103"/>
+                  <a:pt x="2227524" y="686226"/>
+                  <a:pt x="2239617" y="675861"/>
+                </a:cubicBezTo>
+                <a:cubicBezTo>
+                  <a:pt x="2258590" y="659599"/>
+                  <a:pt x="2292626" y="622852"/>
+                  <a:pt x="2292626" y="622852"/>
+                </a:cubicBezTo>
+                <a:cubicBezTo>
+                  <a:pt x="2297043" y="609600"/>
+                  <a:pt x="2297152" y="594003"/>
+                  <a:pt x="2305878" y="583095"/>
+                </a:cubicBezTo>
+                <a:cubicBezTo>
+                  <a:pt x="2315827" y="570658"/>
+                  <a:pt x="2343659" y="572395"/>
+                  <a:pt x="2345634" y="556591"/>
+                </a:cubicBezTo>
+                <a:cubicBezTo>
+                  <a:pt x="2349099" y="528869"/>
+                  <a:pt x="2327965" y="503582"/>
+                  <a:pt x="2319130" y="477078"/>
+                </a:cubicBezTo>
+                <a:lnTo>
+                  <a:pt x="2305878" y="437321"/>
+                </a:lnTo>
+                <a:cubicBezTo>
+                  <a:pt x="2289214" y="387328"/>
+                  <a:pt x="2285185" y="363620"/>
+                  <a:pt x="2239617" y="318052"/>
+                </a:cubicBezTo>
+                <a:cubicBezTo>
+                  <a:pt x="2221947" y="300382"/>
+                  <a:pt x="2200469" y="285835"/>
+                  <a:pt x="2186608" y="265043"/>
+                </a:cubicBezTo>
+                <a:cubicBezTo>
+                  <a:pt x="2177773" y="251791"/>
+                  <a:pt x="2173356" y="234122"/>
+                  <a:pt x="2160104" y="225287"/>
+                </a:cubicBezTo>
+                <a:cubicBezTo>
+                  <a:pt x="2144949" y="215184"/>
+                  <a:pt x="2124765" y="216452"/>
+                  <a:pt x="2107095" y="212034"/>
+                </a:cubicBezTo>
+                <a:cubicBezTo>
+                  <a:pt x="2058704" y="179773"/>
+                  <a:pt x="2021453" y="152565"/>
+                  <a:pt x="1961321" y="132521"/>
+                </a:cubicBezTo>
+                <a:lnTo>
+                  <a:pt x="1921565" y="119269"/>
+                </a:lnTo>
+                <a:cubicBezTo>
+                  <a:pt x="1908313" y="106017"/>
+                  <a:pt x="1898191" y="88615"/>
+                  <a:pt x="1881808" y="79513"/>
+                </a:cubicBezTo>
+                <a:cubicBezTo>
+                  <a:pt x="1801226" y="34745"/>
+                  <a:pt x="1662598" y="44277"/>
+                  <a:pt x="1590260" y="39756"/>
+                </a:cubicBezTo>
+                <a:cubicBezTo>
+                  <a:pt x="1577008" y="35339"/>
+                  <a:pt x="1563981" y="30179"/>
+                  <a:pt x="1550504" y="26504"/>
+                </a:cubicBezTo>
+                <a:cubicBezTo>
+                  <a:pt x="1515361" y="16920"/>
+                  <a:pt x="1444487" y="0"/>
+                  <a:pt x="1444487" y="0"/>
+                </a:cubicBezTo>
+                <a:cubicBezTo>
+                  <a:pt x="1357053" y="2572"/>
+                  <a:pt x="893845" y="12711"/>
+                  <a:pt x="742121" y="26504"/>
+                </a:cubicBezTo>
+                <a:cubicBezTo>
+                  <a:pt x="728210" y="27769"/>
+                  <a:pt x="715796" y="35919"/>
+                  <a:pt x="702365" y="39756"/>
+                </a:cubicBezTo>
+                <a:cubicBezTo>
+                  <a:pt x="684852" y="44760"/>
+                  <a:pt x="667136" y="49057"/>
+                  <a:pt x="649356" y="53008"/>
+                </a:cubicBezTo>
+                <a:cubicBezTo>
+                  <a:pt x="627368" y="57894"/>
+                  <a:pt x="604947" y="60798"/>
+                  <a:pt x="583095" y="66261"/>
+                </a:cubicBezTo>
+                <a:cubicBezTo>
+                  <a:pt x="569543" y="69649"/>
+                  <a:pt x="556891" y="76125"/>
+                  <a:pt x="543339" y="79513"/>
+                </a:cubicBezTo>
+                <a:cubicBezTo>
+                  <a:pt x="521487" y="84976"/>
+                  <a:pt x="498809" y="86839"/>
+                  <a:pt x="477078" y="92765"/>
+                </a:cubicBezTo>
+                <a:cubicBezTo>
+                  <a:pt x="450124" y="100116"/>
+                  <a:pt x="424069" y="110434"/>
+                  <a:pt x="397565" y="119269"/>
+                </a:cubicBezTo>
+                <a:lnTo>
+                  <a:pt x="357808" y="132521"/>
+                </a:lnTo>
+                <a:cubicBezTo>
+                  <a:pt x="344556" y="141356"/>
+                  <a:pt x="332298" y="151903"/>
+                  <a:pt x="318052" y="159026"/>
+                </a:cubicBezTo>
+                <a:cubicBezTo>
+                  <a:pt x="305558" y="165273"/>
+                  <a:pt x="289470" y="163897"/>
+                  <a:pt x="278295" y="172278"/>
+                </a:cubicBezTo>
+                <a:cubicBezTo>
+                  <a:pt x="253306" y="191019"/>
+                  <a:pt x="234121" y="216452"/>
+                  <a:pt x="212034" y="238539"/>
+                </a:cubicBezTo>
+                <a:lnTo>
+                  <a:pt x="172278" y="278295"/>
+                </a:lnTo>
+                <a:cubicBezTo>
+                  <a:pt x="163443" y="287130"/>
+                  <a:pt x="145774" y="292306"/>
+                  <a:pt x="145774" y="304800"/>
+                </a:cubicBezTo>
+                <a:lnTo>
+                  <a:pt x="132521" y="331304"/>
+                </a:lnTo>
+                <a:close/>
+              </a:path>
+            </a:pathLst>
+          </a:custGeom>
+          <a:noFill/>
+          <a:ln w="15875"/>
         </p:spPr>
         <p:style>
           <a:lnRef idx="2">
@@ -16872,7 +17838,1684 @@
           </a:fontRef>
         </p:style>
         <p:txBody>
+          <a:bodyPr rtlCol="0" anchor="t"/>
+          <a:lstStyle/>
+          <a:p>
+            <a:pPr defTabSz="914377"/>
+            <a:endParaRPr lang="en-US" sz="1333" dirty="0">
+              <a:solidFill>
+                <a:prstClr val="white"/>
+              </a:solidFill>
+              <a:latin typeface="Arial"/>
+            </a:endParaRPr>
+          </a:p>
+        </p:txBody>
+      </p:sp>
+      <p:sp>
+        <p:nvSpPr>
+          <p:cNvPr id="16" name="TextBox 15">
+            <a:extLst>
+              <a:ext uri="{FF2B5EF4-FFF2-40B4-BE49-F238E27FC236}">
+                <a16:creationId xmlns:a16="http://schemas.microsoft.com/office/drawing/2014/main" id="{2412141F-F726-9645-A175-89D2A1A32DB8}"/>
+              </a:ext>
+            </a:extLst>
+          </p:cNvPr>
+          <p:cNvSpPr txBox="1"/>
+          <p:nvPr/>
+        </p:nvSpPr>
+        <p:spPr>
+          <a:xfrm>
+            <a:off x="8170291" y="1995009"/>
+            <a:ext cx="2408416" cy="338554"/>
+          </a:xfrm>
+          <a:prstGeom prst="rect">
+            <a:avLst/>
+          </a:prstGeom>
+          <a:noFill/>
+        </p:spPr>
+        <p:txBody>
+          <a:bodyPr wrap="none" rtlCol="0">
+            <a:spAutoFit/>
+          </a:bodyPr>
+          <a:lstStyle/>
+          <a:p>
+            <a:r>
+              <a:rPr lang="en-US" sz="1600" dirty="0"/>
+              <a:t>Shipping subdomain (core)</a:t>
+            </a:r>
+          </a:p>
+        </p:txBody>
+      </p:sp>
+      <p:sp>
+        <p:nvSpPr>
+          <p:cNvPr id="19" name="Oval 18">
+            <a:extLst>
+              <a:ext uri="{FF2B5EF4-FFF2-40B4-BE49-F238E27FC236}">
+                <a16:creationId xmlns:a16="http://schemas.microsoft.com/office/drawing/2014/main" id="{A23696DA-782F-EF4B-9D00-76E942ED6D6A}"/>
+              </a:ext>
+            </a:extLst>
+          </p:cNvPr>
+          <p:cNvSpPr/>
+          <p:nvPr/>
+        </p:nvSpPr>
+        <p:spPr>
+          <a:xfrm>
+            <a:off x="10368116" y="473522"/>
+            <a:ext cx="1651819" cy="915396"/>
+          </a:xfrm>
+          <a:prstGeom prst="ellipse">
+            <a:avLst/>
+          </a:prstGeom>
+          <a:noFill/>
+        </p:spPr>
+        <p:style>
+          <a:lnRef idx="2">
+            <a:schemeClr val="accent1">
+              <a:shade val="50000"/>
+            </a:schemeClr>
+          </a:lnRef>
+          <a:fillRef idx="1">
+            <a:schemeClr val="accent1"/>
+          </a:fillRef>
+          <a:effectRef idx="0">
+            <a:schemeClr val="accent1"/>
+          </a:effectRef>
+          <a:fontRef idx="minor">
+            <a:schemeClr val="lt1"/>
+          </a:fontRef>
+        </p:style>
+        <p:txBody>
+          <a:bodyPr rtlCol="0" anchor="t"/>
+          <a:lstStyle/>
+          <a:p>
+            <a:pPr algn="ctr" defTabSz="914377"/>
+            <a:r>
+              <a:rPr lang="en-US" sz="1333" dirty="0">
+                <a:solidFill>
+                  <a:schemeClr val="tx1">
+                    <a:lumMod val="95000"/>
+                    <a:lumOff val="5000"/>
+                  </a:schemeClr>
+                </a:solidFill>
+                <a:latin typeface="Arial"/>
+              </a:rPr>
+              <a:t>Weather</a:t>
+            </a:r>
+          </a:p>
+          <a:p>
+            <a:pPr algn="ctr" defTabSz="914377"/>
+            <a:r>
+              <a:rPr lang="en-US" sz="1333" dirty="0">
+                <a:solidFill>
+                  <a:schemeClr val="tx1">
+                    <a:lumMod val="95000"/>
+                    <a:lumOff val="5000"/>
+                  </a:schemeClr>
+                </a:solidFill>
+                <a:latin typeface="Arial"/>
+              </a:rPr>
+              <a:t>forecast system</a:t>
+            </a:r>
+          </a:p>
+        </p:txBody>
+      </p:sp>
+      <p:cxnSp>
+        <p:nvCxnSpPr>
+          <p:cNvPr id="21" name="Straight Connector 20">
+            <a:extLst>
+              <a:ext uri="{FF2B5EF4-FFF2-40B4-BE49-F238E27FC236}">
+                <a16:creationId xmlns:a16="http://schemas.microsoft.com/office/drawing/2014/main" id="{ED5E4529-B477-C548-AE30-A265EDDE37B4}"/>
+              </a:ext>
+            </a:extLst>
+          </p:cNvPr>
+          <p:cNvCxnSpPr>
+            <a:cxnSpLocks/>
+            <a:stCxn id="5" idx="140"/>
+            <a:endCxn id="8" idx="23"/>
+          </p:cNvCxnSpPr>
+          <p:nvPr/>
+        </p:nvCxnSpPr>
+        <p:spPr>
+          <a:xfrm flipV="1">
+            <a:off x="4343156" y="2333298"/>
+            <a:ext cx="435799" cy="396282"/>
+          </a:xfrm>
+          <a:prstGeom prst="line">
+            <a:avLst/>
+          </a:prstGeom>
+          <a:ln>
+            <a:solidFill>
+              <a:srgbClr val="0000FF"/>
+            </a:solidFill>
+          </a:ln>
+          <a:effectLst/>
+        </p:spPr>
+        <p:style>
+          <a:lnRef idx="2">
+            <a:schemeClr val="accent1"/>
+          </a:lnRef>
+          <a:fillRef idx="0">
+            <a:schemeClr val="accent1"/>
+          </a:fillRef>
+          <a:effectRef idx="1">
+            <a:schemeClr val="accent1"/>
+          </a:effectRef>
+          <a:fontRef idx="minor">
+            <a:schemeClr val="tx1"/>
+          </a:fontRef>
+        </p:style>
+      </p:cxnSp>
+      <p:cxnSp>
+        <p:nvCxnSpPr>
+          <p:cNvPr id="26" name="Straight Connector 25">
+            <a:extLst>
+              <a:ext uri="{FF2B5EF4-FFF2-40B4-BE49-F238E27FC236}">
+                <a16:creationId xmlns:a16="http://schemas.microsoft.com/office/drawing/2014/main" id="{599EA378-0BD2-6641-9A77-D76241DB412B}"/>
+              </a:ext>
+            </a:extLst>
+          </p:cNvPr>
+          <p:cNvCxnSpPr>
+            <a:cxnSpLocks/>
+            <a:stCxn id="5" idx="98"/>
+            <a:endCxn id="17" idx="14"/>
+          </p:cNvCxnSpPr>
+          <p:nvPr/>
+        </p:nvCxnSpPr>
+        <p:spPr>
+          <a:xfrm>
+            <a:off x="3649046" y="3432654"/>
+            <a:ext cx="60413" cy="881780"/>
+          </a:xfrm>
+          <a:prstGeom prst="line">
+            <a:avLst/>
+          </a:prstGeom>
+          <a:ln>
+            <a:solidFill>
+              <a:srgbClr val="0000FF"/>
+            </a:solidFill>
+          </a:ln>
+          <a:effectLst/>
+        </p:spPr>
+        <p:style>
+          <a:lnRef idx="2">
+            <a:schemeClr val="accent1"/>
+          </a:lnRef>
+          <a:fillRef idx="0">
+            <a:schemeClr val="accent1"/>
+          </a:fillRef>
+          <a:effectRef idx="1">
+            <a:schemeClr val="accent1"/>
+          </a:effectRef>
+          <a:fontRef idx="minor">
+            <a:schemeClr val="tx1"/>
+          </a:fontRef>
+        </p:style>
+      </p:cxnSp>
+      <p:cxnSp>
+        <p:nvCxnSpPr>
+          <p:cNvPr id="29" name="Straight Connector 28">
+            <a:extLst>
+              <a:ext uri="{FF2B5EF4-FFF2-40B4-BE49-F238E27FC236}">
+                <a16:creationId xmlns:a16="http://schemas.microsoft.com/office/drawing/2014/main" id="{B2B91E93-6F7B-7A43-B711-71EBF0C48DA3}"/>
+              </a:ext>
+            </a:extLst>
+          </p:cNvPr>
+          <p:cNvCxnSpPr>
+            <a:cxnSpLocks/>
+            <a:stCxn id="12" idx="16"/>
+            <a:endCxn id="8" idx="34"/>
+          </p:cNvCxnSpPr>
+          <p:nvPr/>
+        </p:nvCxnSpPr>
+        <p:spPr>
+          <a:xfrm flipH="1" flipV="1">
+            <a:off x="5497194" y="2601105"/>
+            <a:ext cx="757833" cy="1586582"/>
+          </a:xfrm>
+          <a:prstGeom prst="line">
+            <a:avLst/>
+          </a:prstGeom>
+          <a:ln>
+            <a:solidFill>
+              <a:srgbClr val="0000FF"/>
+            </a:solidFill>
+          </a:ln>
+          <a:effectLst/>
+        </p:spPr>
+        <p:style>
+          <a:lnRef idx="2">
+            <a:schemeClr val="accent1"/>
+          </a:lnRef>
+          <a:fillRef idx="0">
+            <a:schemeClr val="accent1"/>
+          </a:fillRef>
+          <a:effectRef idx="1">
+            <a:schemeClr val="accent1"/>
+          </a:effectRef>
+          <a:fontRef idx="minor">
+            <a:schemeClr val="tx1"/>
+          </a:fontRef>
+        </p:style>
+      </p:cxnSp>
+      <p:cxnSp>
+        <p:nvCxnSpPr>
+          <p:cNvPr id="33" name="Straight Connector 32">
+            <a:extLst>
+              <a:ext uri="{FF2B5EF4-FFF2-40B4-BE49-F238E27FC236}">
+                <a16:creationId xmlns:a16="http://schemas.microsoft.com/office/drawing/2014/main" id="{B595EE99-1679-A94F-B512-8EFEAD7C036C}"/>
+              </a:ext>
+            </a:extLst>
+          </p:cNvPr>
+          <p:cNvCxnSpPr>
+            <a:cxnSpLocks/>
+            <a:stCxn id="5" idx="109"/>
+            <a:endCxn id="15" idx="1"/>
+          </p:cNvCxnSpPr>
+          <p:nvPr/>
+        </p:nvCxnSpPr>
+        <p:spPr>
+          <a:xfrm flipV="1">
+            <a:off x="3929023" y="2366242"/>
+            <a:ext cx="3943827" cy="940145"/>
+          </a:xfrm>
+          <a:prstGeom prst="line">
+            <a:avLst/>
+          </a:prstGeom>
+          <a:ln>
+            <a:solidFill>
+              <a:srgbClr val="0000FF"/>
+            </a:solidFill>
+          </a:ln>
+          <a:effectLst/>
+        </p:spPr>
+        <p:style>
+          <a:lnRef idx="2">
+            <a:schemeClr val="accent1"/>
+          </a:lnRef>
+          <a:fillRef idx="0">
+            <a:schemeClr val="accent1"/>
+          </a:fillRef>
+          <a:effectRef idx="1">
+            <a:schemeClr val="accent1"/>
+          </a:effectRef>
+          <a:fontRef idx="minor">
+            <a:schemeClr val="tx1"/>
+          </a:fontRef>
+        </p:style>
+      </p:cxnSp>
+      <p:cxnSp>
+        <p:nvCxnSpPr>
+          <p:cNvPr id="38" name="Straight Connector 37">
+            <a:extLst>
+              <a:ext uri="{FF2B5EF4-FFF2-40B4-BE49-F238E27FC236}">
+                <a16:creationId xmlns:a16="http://schemas.microsoft.com/office/drawing/2014/main" id="{192B2169-E6F1-8E44-9CCE-04FF05CDC50D}"/>
+              </a:ext>
+            </a:extLst>
+          </p:cNvPr>
+          <p:cNvCxnSpPr>
+            <a:cxnSpLocks/>
+            <a:stCxn id="15" idx="0"/>
+            <a:endCxn id="8" idx="60"/>
+          </p:cNvCxnSpPr>
+          <p:nvPr/>
+        </p:nvCxnSpPr>
+        <p:spPr>
+          <a:xfrm flipH="1" flipV="1">
+            <a:off x="7569041" y="2027233"/>
+            <a:ext cx="460459" cy="8660"/>
+          </a:xfrm>
+          <a:prstGeom prst="line">
+            <a:avLst/>
+          </a:prstGeom>
+          <a:ln>
+            <a:solidFill>
+              <a:srgbClr val="0000FF"/>
+            </a:solidFill>
+          </a:ln>
+          <a:effectLst/>
+        </p:spPr>
+        <p:style>
+          <a:lnRef idx="2">
+            <a:schemeClr val="accent1"/>
+          </a:lnRef>
+          <a:fillRef idx="0">
+            <a:schemeClr val="accent1"/>
+          </a:fillRef>
+          <a:effectRef idx="1">
+            <a:schemeClr val="accent1"/>
+          </a:effectRef>
+          <a:fontRef idx="minor">
+            <a:schemeClr val="tx1"/>
+          </a:fontRef>
+        </p:style>
+      </p:cxnSp>
+      <p:cxnSp>
+        <p:nvCxnSpPr>
+          <p:cNvPr id="41" name="Straight Connector 40">
+            <a:extLst>
+              <a:ext uri="{FF2B5EF4-FFF2-40B4-BE49-F238E27FC236}">
+                <a16:creationId xmlns:a16="http://schemas.microsoft.com/office/drawing/2014/main" id="{AFD1FC88-CB62-8440-9899-86C4750E148D}"/>
+              </a:ext>
+            </a:extLst>
+          </p:cNvPr>
+          <p:cNvCxnSpPr>
+            <a:cxnSpLocks/>
+            <a:stCxn id="19" idx="4"/>
+            <a:endCxn id="15" idx="31"/>
+          </p:cNvCxnSpPr>
+          <p:nvPr/>
+        </p:nvCxnSpPr>
+        <p:spPr>
+          <a:xfrm flipH="1">
+            <a:off x="10097294" y="1388918"/>
+            <a:ext cx="1096732" cy="405566"/>
+          </a:xfrm>
+          <a:prstGeom prst="line">
+            <a:avLst/>
+          </a:prstGeom>
+          <a:ln>
+            <a:solidFill>
+              <a:srgbClr val="0000FF"/>
+            </a:solidFill>
+          </a:ln>
+          <a:effectLst/>
+        </p:spPr>
+        <p:style>
+          <a:lnRef idx="2">
+            <a:schemeClr val="accent1"/>
+          </a:lnRef>
+          <a:fillRef idx="0">
+            <a:schemeClr val="accent1"/>
+          </a:fillRef>
+          <a:effectRef idx="1">
+            <a:schemeClr val="accent1"/>
+          </a:effectRef>
+          <a:fontRef idx="minor">
+            <a:schemeClr val="tx1"/>
+          </a:fontRef>
+        </p:style>
+      </p:cxnSp>
+      <p:sp>
+        <p:nvSpPr>
+          <p:cNvPr id="23" name="Oval 22">
+            <a:extLst>
+              <a:ext uri="{FF2B5EF4-FFF2-40B4-BE49-F238E27FC236}">
+                <a16:creationId xmlns:a16="http://schemas.microsoft.com/office/drawing/2014/main" id="{3EB35474-0194-964C-999F-B13247ED590E}"/>
+              </a:ext>
+            </a:extLst>
+          </p:cNvPr>
+          <p:cNvSpPr/>
+          <p:nvPr/>
+        </p:nvSpPr>
+        <p:spPr>
+          <a:xfrm>
+            <a:off x="9682921" y="4754895"/>
+            <a:ext cx="2191031" cy="770026"/>
+          </a:xfrm>
+          <a:prstGeom prst="ellipse">
+            <a:avLst/>
+          </a:prstGeom>
+          <a:noFill/>
+        </p:spPr>
+        <p:style>
+          <a:lnRef idx="2">
+            <a:schemeClr val="accent1">
+              <a:shade val="50000"/>
+            </a:schemeClr>
+          </a:lnRef>
+          <a:fillRef idx="1">
+            <a:schemeClr val="accent1"/>
+          </a:fillRef>
+          <a:effectRef idx="0">
+            <a:schemeClr val="accent1"/>
+          </a:effectRef>
+          <a:fontRef idx="minor">
+            <a:schemeClr val="lt1"/>
+          </a:fontRef>
+        </p:style>
+        <p:txBody>
+          <a:bodyPr rtlCol="0" anchor="t"/>
+          <a:lstStyle/>
+          <a:p>
+            <a:pPr algn="ctr" defTabSz="914377"/>
+            <a:r>
+              <a:rPr lang="en-US" sz="1333" dirty="0">
+                <a:solidFill>
+                  <a:schemeClr val="tx1">
+                    <a:lumMod val="95000"/>
+                    <a:lumOff val="5000"/>
+                  </a:schemeClr>
+                </a:solidFill>
+                <a:latin typeface="Arial"/>
+              </a:rPr>
+              <a:t>Fleet monitoring</a:t>
+            </a:r>
+          </a:p>
+          <a:p>
+            <a:pPr algn="ctr" defTabSz="914377"/>
+            <a:r>
+              <a:rPr lang="en-US" sz="1333" dirty="0">
+                <a:solidFill>
+                  <a:schemeClr val="tx1">
+                    <a:lumMod val="95000"/>
+                    <a:lumOff val="5000"/>
+                  </a:schemeClr>
+                </a:solidFill>
+                <a:latin typeface="Arial"/>
+              </a:rPr>
+              <a:t> system</a:t>
+            </a:r>
+          </a:p>
+        </p:txBody>
+      </p:sp>
+      <p:cxnSp>
+        <p:nvCxnSpPr>
+          <p:cNvPr id="24" name="Straight Connector 23">
+            <a:extLst>
+              <a:ext uri="{FF2B5EF4-FFF2-40B4-BE49-F238E27FC236}">
+                <a16:creationId xmlns:a16="http://schemas.microsoft.com/office/drawing/2014/main" id="{D4A5F297-FB4E-C046-B65F-9DDB560C55AD}"/>
+              </a:ext>
+            </a:extLst>
+          </p:cNvPr>
+          <p:cNvCxnSpPr>
+            <a:cxnSpLocks/>
+            <a:stCxn id="23" idx="0"/>
+            <a:endCxn id="15" idx="13"/>
+          </p:cNvCxnSpPr>
+          <p:nvPr/>
+        </p:nvCxnSpPr>
+        <p:spPr>
+          <a:xfrm flipH="1" flipV="1">
+            <a:off x="10269610" y="2620356"/>
+            <a:ext cx="508827" cy="2134539"/>
+          </a:xfrm>
+          <a:prstGeom prst="line">
+            <a:avLst/>
+          </a:prstGeom>
+          <a:ln>
+            <a:solidFill>
+              <a:srgbClr val="0000FF"/>
+            </a:solidFill>
+          </a:ln>
+          <a:effectLst/>
+        </p:spPr>
+        <p:style>
+          <a:lnRef idx="2">
+            <a:schemeClr val="accent1"/>
+          </a:lnRef>
+          <a:fillRef idx="0">
+            <a:schemeClr val="accent1"/>
+          </a:fillRef>
+          <a:effectRef idx="1">
+            <a:schemeClr val="accent1"/>
+          </a:effectRef>
+          <a:fontRef idx="minor">
+            <a:schemeClr val="tx1"/>
+          </a:fontRef>
+        </p:style>
+      </p:cxnSp>
+      <p:sp>
+        <p:nvSpPr>
+          <p:cNvPr id="53" name="Freeform 52">
+            <a:extLst>
+              <a:ext uri="{FF2B5EF4-FFF2-40B4-BE49-F238E27FC236}">
+                <a16:creationId xmlns:a16="http://schemas.microsoft.com/office/drawing/2014/main" id="{A206BC11-434F-9B40-8A81-2443166EC4FB}"/>
+              </a:ext>
+            </a:extLst>
+          </p:cNvPr>
+          <p:cNvSpPr/>
+          <p:nvPr/>
+        </p:nvSpPr>
+        <p:spPr>
+          <a:xfrm>
+            <a:off x="8029499" y="3200475"/>
+            <a:ext cx="1893755" cy="1067495"/>
+          </a:xfrm>
+          <a:custGeom>
+            <a:avLst/>
+            <a:gdLst>
+              <a:gd name="connsiteX0" fmla="*/ 132521 w 2346014"/>
+              <a:gd name="connsiteY0" fmla="*/ 331304 h 1113406"/>
+              <a:gd name="connsiteX1" fmla="*/ 0 w 2346014"/>
+              <a:gd name="connsiteY1" fmla="*/ 675861 h 1113406"/>
+              <a:gd name="connsiteX2" fmla="*/ 92765 w 2346014"/>
+              <a:gd name="connsiteY2" fmla="*/ 755374 h 1113406"/>
+              <a:gd name="connsiteX3" fmla="*/ 132521 w 2346014"/>
+              <a:gd name="connsiteY3" fmla="*/ 795130 h 1113406"/>
+              <a:gd name="connsiteX4" fmla="*/ 357808 w 2346014"/>
+              <a:gd name="connsiteY4" fmla="*/ 980661 h 1113406"/>
+              <a:gd name="connsiteX5" fmla="*/ 715617 w 2346014"/>
+              <a:gd name="connsiteY5" fmla="*/ 1099930 h 1113406"/>
+              <a:gd name="connsiteX6" fmla="*/ 1444487 w 2346014"/>
+              <a:gd name="connsiteY6" fmla="*/ 1099930 h 1113406"/>
+              <a:gd name="connsiteX7" fmla="*/ 1524000 w 2346014"/>
+              <a:gd name="connsiteY7" fmla="*/ 1073426 h 1113406"/>
+              <a:gd name="connsiteX8" fmla="*/ 1577008 w 2346014"/>
+              <a:gd name="connsiteY8" fmla="*/ 1060174 h 1113406"/>
+              <a:gd name="connsiteX9" fmla="*/ 1616765 w 2346014"/>
+              <a:gd name="connsiteY9" fmla="*/ 1046921 h 1113406"/>
+              <a:gd name="connsiteX10" fmla="*/ 1722782 w 2346014"/>
+              <a:gd name="connsiteY10" fmla="*/ 1020417 h 1113406"/>
+              <a:gd name="connsiteX11" fmla="*/ 1775791 w 2346014"/>
+              <a:gd name="connsiteY11" fmla="*/ 1007165 h 1113406"/>
+              <a:gd name="connsiteX12" fmla="*/ 1934817 w 2346014"/>
+              <a:gd name="connsiteY12" fmla="*/ 954156 h 1113406"/>
+              <a:gd name="connsiteX13" fmla="*/ 2027582 w 2346014"/>
+              <a:gd name="connsiteY13" fmla="*/ 940904 h 1113406"/>
+              <a:gd name="connsiteX14" fmla="*/ 2040834 w 2346014"/>
+              <a:gd name="connsiteY14" fmla="*/ 887895 h 1113406"/>
+              <a:gd name="connsiteX15" fmla="*/ 2067339 w 2346014"/>
+              <a:gd name="connsiteY15" fmla="*/ 861391 h 1113406"/>
+              <a:gd name="connsiteX16" fmla="*/ 2093843 w 2346014"/>
+              <a:gd name="connsiteY16" fmla="*/ 821634 h 1113406"/>
+              <a:gd name="connsiteX17" fmla="*/ 2173356 w 2346014"/>
+              <a:gd name="connsiteY17" fmla="*/ 742121 h 1113406"/>
+              <a:gd name="connsiteX18" fmla="*/ 2199860 w 2346014"/>
+              <a:gd name="connsiteY18" fmla="*/ 702365 h 1113406"/>
+              <a:gd name="connsiteX19" fmla="*/ 2239617 w 2346014"/>
+              <a:gd name="connsiteY19" fmla="*/ 675861 h 1113406"/>
+              <a:gd name="connsiteX20" fmla="*/ 2292626 w 2346014"/>
+              <a:gd name="connsiteY20" fmla="*/ 622852 h 1113406"/>
+              <a:gd name="connsiteX21" fmla="*/ 2305878 w 2346014"/>
+              <a:gd name="connsiteY21" fmla="*/ 583095 h 1113406"/>
+              <a:gd name="connsiteX22" fmla="*/ 2345634 w 2346014"/>
+              <a:gd name="connsiteY22" fmla="*/ 556591 h 1113406"/>
+              <a:gd name="connsiteX23" fmla="*/ 2319130 w 2346014"/>
+              <a:gd name="connsiteY23" fmla="*/ 477078 h 1113406"/>
+              <a:gd name="connsiteX24" fmla="*/ 2305878 w 2346014"/>
+              <a:gd name="connsiteY24" fmla="*/ 437321 h 1113406"/>
+              <a:gd name="connsiteX25" fmla="*/ 2239617 w 2346014"/>
+              <a:gd name="connsiteY25" fmla="*/ 318052 h 1113406"/>
+              <a:gd name="connsiteX26" fmla="*/ 2186608 w 2346014"/>
+              <a:gd name="connsiteY26" fmla="*/ 265043 h 1113406"/>
+              <a:gd name="connsiteX27" fmla="*/ 2160104 w 2346014"/>
+              <a:gd name="connsiteY27" fmla="*/ 225287 h 1113406"/>
+              <a:gd name="connsiteX28" fmla="*/ 2107095 w 2346014"/>
+              <a:gd name="connsiteY28" fmla="*/ 212034 h 1113406"/>
+              <a:gd name="connsiteX29" fmla="*/ 1961321 w 2346014"/>
+              <a:gd name="connsiteY29" fmla="*/ 132521 h 1113406"/>
+              <a:gd name="connsiteX30" fmla="*/ 1921565 w 2346014"/>
+              <a:gd name="connsiteY30" fmla="*/ 119269 h 1113406"/>
+              <a:gd name="connsiteX31" fmla="*/ 1881808 w 2346014"/>
+              <a:gd name="connsiteY31" fmla="*/ 79513 h 1113406"/>
+              <a:gd name="connsiteX32" fmla="*/ 1590260 w 2346014"/>
+              <a:gd name="connsiteY32" fmla="*/ 39756 h 1113406"/>
+              <a:gd name="connsiteX33" fmla="*/ 1550504 w 2346014"/>
+              <a:gd name="connsiteY33" fmla="*/ 26504 h 1113406"/>
+              <a:gd name="connsiteX34" fmla="*/ 1444487 w 2346014"/>
+              <a:gd name="connsiteY34" fmla="*/ 0 h 1113406"/>
+              <a:gd name="connsiteX35" fmla="*/ 742121 w 2346014"/>
+              <a:gd name="connsiteY35" fmla="*/ 26504 h 1113406"/>
+              <a:gd name="connsiteX36" fmla="*/ 702365 w 2346014"/>
+              <a:gd name="connsiteY36" fmla="*/ 39756 h 1113406"/>
+              <a:gd name="connsiteX37" fmla="*/ 649356 w 2346014"/>
+              <a:gd name="connsiteY37" fmla="*/ 53008 h 1113406"/>
+              <a:gd name="connsiteX38" fmla="*/ 583095 w 2346014"/>
+              <a:gd name="connsiteY38" fmla="*/ 66261 h 1113406"/>
+              <a:gd name="connsiteX39" fmla="*/ 543339 w 2346014"/>
+              <a:gd name="connsiteY39" fmla="*/ 79513 h 1113406"/>
+              <a:gd name="connsiteX40" fmla="*/ 477078 w 2346014"/>
+              <a:gd name="connsiteY40" fmla="*/ 92765 h 1113406"/>
+              <a:gd name="connsiteX41" fmla="*/ 397565 w 2346014"/>
+              <a:gd name="connsiteY41" fmla="*/ 119269 h 1113406"/>
+              <a:gd name="connsiteX42" fmla="*/ 357808 w 2346014"/>
+              <a:gd name="connsiteY42" fmla="*/ 132521 h 1113406"/>
+              <a:gd name="connsiteX43" fmla="*/ 318052 w 2346014"/>
+              <a:gd name="connsiteY43" fmla="*/ 159026 h 1113406"/>
+              <a:gd name="connsiteX44" fmla="*/ 278295 w 2346014"/>
+              <a:gd name="connsiteY44" fmla="*/ 172278 h 1113406"/>
+              <a:gd name="connsiteX45" fmla="*/ 212034 w 2346014"/>
+              <a:gd name="connsiteY45" fmla="*/ 238539 h 1113406"/>
+              <a:gd name="connsiteX46" fmla="*/ 172278 w 2346014"/>
+              <a:gd name="connsiteY46" fmla="*/ 278295 h 1113406"/>
+              <a:gd name="connsiteX47" fmla="*/ 145774 w 2346014"/>
+              <a:gd name="connsiteY47" fmla="*/ 304800 h 1113406"/>
+              <a:gd name="connsiteX48" fmla="*/ 132521 w 2346014"/>
+              <a:gd name="connsiteY48" fmla="*/ 331304 h 1113406"/>
+            </a:gdLst>
+            <a:ahLst/>
+            <a:cxnLst>
+              <a:cxn ang="0">
+                <a:pos x="connsiteX0" y="connsiteY0"/>
+              </a:cxn>
+              <a:cxn ang="0">
+                <a:pos x="connsiteX1" y="connsiteY1"/>
+              </a:cxn>
+              <a:cxn ang="0">
+                <a:pos x="connsiteX2" y="connsiteY2"/>
+              </a:cxn>
+              <a:cxn ang="0">
+                <a:pos x="connsiteX3" y="connsiteY3"/>
+              </a:cxn>
+              <a:cxn ang="0">
+                <a:pos x="connsiteX4" y="connsiteY4"/>
+              </a:cxn>
+              <a:cxn ang="0">
+                <a:pos x="connsiteX5" y="connsiteY5"/>
+              </a:cxn>
+              <a:cxn ang="0">
+                <a:pos x="connsiteX6" y="connsiteY6"/>
+              </a:cxn>
+              <a:cxn ang="0">
+                <a:pos x="connsiteX7" y="connsiteY7"/>
+              </a:cxn>
+              <a:cxn ang="0">
+                <a:pos x="connsiteX8" y="connsiteY8"/>
+              </a:cxn>
+              <a:cxn ang="0">
+                <a:pos x="connsiteX9" y="connsiteY9"/>
+              </a:cxn>
+              <a:cxn ang="0">
+                <a:pos x="connsiteX10" y="connsiteY10"/>
+              </a:cxn>
+              <a:cxn ang="0">
+                <a:pos x="connsiteX11" y="connsiteY11"/>
+              </a:cxn>
+              <a:cxn ang="0">
+                <a:pos x="connsiteX12" y="connsiteY12"/>
+              </a:cxn>
+              <a:cxn ang="0">
+                <a:pos x="connsiteX13" y="connsiteY13"/>
+              </a:cxn>
+              <a:cxn ang="0">
+                <a:pos x="connsiteX14" y="connsiteY14"/>
+              </a:cxn>
+              <a:cxn ang="0">
+                <a:pos x="connsiteX15" y="connsiteY15"/>
+              </a:cxn>
+              <a:cxn ang="0">
+                <a:pos x="connsiteX16" y="connsiteY16"/>
+              </a:cxn>
+              <a:cxn ang="0">
+                <a:pos x="connsiteX17" y="connsiteY17"/>
+              </a:cxn>
+              <a:cxn ang="0">
+                <a:pos x="connsiteX18" y="connsiteY18"/>
+              </a:cxn>
+              <a:cxn ang="0">
+                <a:pos x="connsiteX19" y="connsiteY19"/>
+              </a:cxn>
+              <a:cxn ang="0">
+                <a:pos x="connsiteX20" y="connsiteY20"/>
+              </a:cxn>
+              <a:cxn ang="0">
+                <a:pos x="connsiteX21" y="connsiteY21"/>
+              </a:cxn>
+              <a:cxn ang="0">
+                <a:pos x="connsiteX22" y="connsiteY22"/>
+              </a:cxn>
+              <a:cxn ang="0">
+                <a:pos x="connsiteX23" y="connsiteY23"/>
+              </a:cxn>
+              <a:cxn ang="0">
+                <a:pos x="connsiteX24" y="connsiteY24"/>
+              </a:cxn>
+              <a:cxn ang="0">
+                <a:pos x="connsiteX25" y="connsiteY25"/>
+              </a:cxn>
+              <a:cxn ang="0">
+                <a:pos x="connsiteX26" y="connsiteY26"/>
+              </a:cxn>
+              <a:cxn ang="0">
+                <a:pos x="connsiteX27" y="connsiteY27"/>
+              </a:cxn>
+              <a:cxn ang="0">
+                <a:pos x="connsiteX28" y="connsiteY28"/>
+              </a:cxn>
+              <a:cxn ang="0">
+                <a:pos x="connsiteX29" y="connsiteY29"/>
+              </a:cxn>
+              <a:cxn ang="0">
+                <a:pos x="connsiteX30" y="connsiteY30"/>
+              </a:cxn>
+              <a:cxn ang="0">
+                <a:pos x="connsiteX31" y="connsiteY31"/>
+              </a:cxn>
+              <a:cxn ang="0">
+                <a:pos x="connsiteX32" y="connsiteY32"/>
+              </a:cxn>
+              <a:cxn ang="0">
+                <a:pos x="connsiteX33" y="connsiteY33"/>
+              </a:cxn>
+              <a:cxn ang="0">
+                <a:pos x="connsiteX34" y="connsiteY34"/>
+              </a:cxn>
+              <a:cxn ang="0">
+                <a:pos x="connsiteX35" y="connsiteY35"/>
+              </a:cxn>
+              <a:cxn ang="0">
+                <a:pos x="connsiteX36" y="connsiteY36"/>
+              </a:cxn>
+              <a:cxn ang="0">
+                <a:pos x="connsiteX37" y="connsiteY37"/>
+              </a:cxn>
+              <a:cxn ang="0">
+                <a:pos x="connsiteX38" y="connsiteY38"/>
+              </a:cxn>
+              <a:cxn ang="0">
+                <a:pos x="connsiteX39" y="connsiteY39"/>
+              </a:cxn>
+              <a:cxn ang="0">
+                <a:pos x="connsiteX40" y="connsiteY40"/>
+              </a:cxn>
+              <a:cxn ang="0">
+                <a:pos x="connsiteX41" y="connsiteY41"/>
+              </a:cxn>
+              <a:cxn ang="0">
+                <a:pos x="connsiteX42" y="connsiteY42"/>
+              </a:cxn>
+              <a:cxn ang="0">
+                <a:pos x="connsiteX43" y="connsiteY43"/>
+              </a:cxn>
+              <a:cxn ang="0">
+                <a:pos x="connsiteX44" y="connsiteY44"/>
+              </a:cxn>
+              <a:cxn ang="0">
+                <a:pos x="connsiteX45" y="connsiteY45"/>
+              </a:cxn>
+              <a:cxn ang="0">
+                <a:pos x="connsiteX46" y="connsiteY46"/>
+              </a:cxn>
+              <a:cxn ang="0">
+                <a:pos x="connsiteX47" y="connsiteY47"/>
+              </a:cxn>
+              <a:cxn ang="0">
+                <a:pos x="connsiteX48" y="connsiteY48"/>
+              </a:cxn>
+            </a:cxnLst>
+            <a:rect l="l" t="t" r="r" b="b"/>
+            <a:pathLst>
+              <a:path w="2346014" h="1113406">
+                <a:moveTo>
+                  <a:pt x="132521" y="331304"/>
+                </a:moveTo>
+                <a:lnTo>
+                  <a:pt x="0" y="675861"/>
+                </a:lnTo>
+                <a:cubicBezTo>
+                  <a:pt x="30922" y="702365"/>
+                  <a:pt x="60963" y="729932"/>
+                  <a:pt x="92765" y="755374"/>
+                </a:cubicBezTo>
+                <a:cubicBezTo>
+                  <a:pt x="136196" y="790119"/>
+                  <a:pt x="132521" y="764345"/>
+                  <a:pt x="132521" y="795130"/>
+                </a:cubicBezTo>
+                <a:lnTo>
+                  <a:pt x="357808" y="980661"/>
+                </a:lnTo>
+                <a:lnTo>
+                  <a:pt x="715617" y="1099930"/>
+                </a:lnTo>
+                <a:cubicBezTo>
+                  <a:pt x="980844" y="1108771"/>
+                  <a:pt x="1183076" y="1125228"/>
+                  <a:pt x="1444487" y="1099930"/>
+                </a:cubicBezTo>
+                <a:cubicBezTo>
+                  <a:pt x="1472295" y="1097239"/>
+                  <a:pt x="1497240" y="1081454"/>
+                  <a:pt x="1524000" y="1073426"/>
+                </a:cubicBezTo>
+                <a:cubicBezTo>
+                  <a:pt x="1541445" y="1068193"/>
+                  <a:pt x="1559496" y="1065178"/>
+                  <a:pt x="1577008" y="1060174"/>
+                </a:cubicBezTo>
+                <a:cubicBezTo>
+                  <a:pt x="1590440" y="1056336"/>
+                  <a:pt x="1603288" y="1050597"/>
+                  <a:pt x="1616765" y="1046921"/>
+                </a:cubicBezTo>
+                <a:cubicBezTo>
+                  <a:pt x="1651908" y="1037336"/>
+                  <a:pt x="1687443" y="1029252"/>
+                  <a:pt x="1722782" y="1020417"/>
+                </a:cubicBezTo>
+                <a:cubicBezTo>
+                  <a:pt x="1740452" y="1016000"/>
+                  <a:pt x="1758880" y="1013929"/>
+                  <a:pt x="1775791" y="1007165"/>
+                </a:cubicBezTo>
+                <a:cubicBezTo>
+                  <a:pt x="1827865" y="986336"/>
+                  <a:pt x="1879264" y="964256"/>
+                  <a:pt x="1934817" y="954156"/>
+                </a:cubicBezTo>
+                <a:cubicBezTo>
+                  <a:pt x="1965549" y="948568"/>
+                  <a:pt x="1996660" y="945321"/>
+                  <a:pt x="2027582" y="940904"/>
+                </a:cubicBezTo>
+                <a:cubicBezTo>
+                  <a:pt x="2031999" y="923234"/>
+                  <a:pt x="2032689" y="904186"/>
+                  <a:pt x="2040834" y="887895"/>
+                </a:cubicBezTo>
+                <a:cubicBezTo>
+                  <a:pt x="2046422" y="876720"/>
+                  <a:pt x="2059534" y="871147"/>
+                  <a:pt x="2067339" y="861391"/>
+                </a:cubicBezTo>
+                <a:cubicBezTo>
+                  <a:pt x="2077289" y="848954"/>
+                  <a:pt x="2083262" y="833538"/>
+                  <a:pt x="2093843" y="821634"/>
+                </a:cubicBezTo>
+                <a:cubicBezTo>
+                  <a:pt x="2118745" y="793619"/>
+                  <a:pt x="2152564" y="773309"/>
+                  <a:pt x="2173356" y="742121"/>
+                </a:cubicBezTo>
+                <a:cubicBezTo>
+                  <a:pt x="2182191" y="728869"/>
+                  <a:pt x="2188598" y="713627"/>
+                  <a:pt x="2199860" y="702365"/>
+                </a:cubicBezTo>
+                <a:cubicBezTo>
+                  <a:pt x="2211122" y="691103"/>
+                  <a:pt x="2227524" y="686226"/>
+                  <a:pt x="2239617" y="675861"/>
+                </a:cubicBezTo>
+                <a:cubicBezTo>
+                  <a:pt x="2258590" y="659599"/>
+                  <a:pt x="2292626" y="622852"/>
+                  <a:pt x="2292626" y="622852"/>
+                </a:cubicBezTo>
+                <a:cubicBezTo>
+                  <a:pt x="2297043" y="609600"/>
+                  <a:pt x="2297152" y="594003"/>
+                  <a:pt x="2305878" y="583095"/>
+                </a:cubicBezTo>
+                <a:cubicBezTo>
+                  <a:pt x="2315827" y="570658"/>
+                  <a:pt x="2343659" y="572395"/>
+                  <a:pt x="2345634" y="556591"/>
+                </a:cubicBezTo>
+                <a:cubicBezTo>
+                  <a:pt x="2349099" y="528869"/>
+                  <a:pt x="2327965" y="503582"/>
+                  <a:pt x="2319130" y="477078"/>
+                </a:cubicBezTo>
+                <a:lnTo>
+                  <a:pt x="2305878" y="437321"/>
+                </a:lnTo>
+                <a:cubicBezTo>
+                  <a:pt x="2289214" y="387328"/>
+                  <a:pt x="2285185" y="363620"/>
+                  <a:pt x="2239617" y="318052"/>
+                </a:cubicBezTo>
+                <a:cubicBezTo>
+                  <a:pt x="2221947" y="300382"/>
+                  <a:pt x="2200469" y="285835"/>
+                  <a:pt x="2186608" y="265043"/>
+                </a:cubicBezTo>
+                <a:cubicBezTo>
+                  <a:pt x="2177773" y="251791"/>
+                  <a:pt x="2173356" y="234122"/>
+                  <a:pt x="2160104" y="225287"/>
+                </a:cubicBezTo>
+                <a:cubicBezTo>
+                  <a:pt x="2144949" y="215184"/>
+                  <a:pt x="2124765" y="216452"/>
+                  <a:pt x="2107095" y="212034"/>
+                </a:cubicBezTo>
+                <a:cubicBezTo>
+                  <a:pt x="2058704" y="179773"/>
+                  <a:pt x="2021453" y="152565"/>
+                  <a:pt x="1961321" y="132521"/>
+                </a:cubicBezTo>
+                <a:lnTo>
+                  <a:pt x="1921565" y="119269"/>
+                </a:lnTo>
+                <a:cubicBezTo>
+                  <a:pt x="1908313" y="106017"/>
+                  <a:pt x="1898191" y="88615"/>
+                  <a:pt x="1881808" y="79513"/>
+                </a:cubicBezTo>
+                <a:cubicBezTo>
+                  <a:pt x="1801226" y="34745"/>
+                  <a:pt x="1662598" y="44277"/>
+                  <a:pt x="1590260" y="39756"/>
+                </a:cubicBezTo>
+                <a:cubicBezTo>
+                  <a:pt x="1577008" y="35339"/>
+                  <a:pt x="1563981" y="30179"/>
+                  <a:pt x="1550504" y="26504"/>
+                </a:cubicBezTo>
+                <a:cubicBezTo>
+                  <a:pt x="1515361" y="16920"/>
+                  <a:pt x="1444487" y="0"/>
+                  <a:pt x="1444487" y="0"/>
+                </a:cubicBezTo>
+                <a:cubicBezTo>
+                  <a:pt x="1357053" y="2572"/>
+                  <a:pt x="893845" y="12711"/>
+                  <a:pt x="742121" y="26504"/>
+                </a:cubicBezTo>
+                <a:cubicBezTo>
+                  <a:pt x="728210" y="27769"/>
+                  <a:pt x="715796" y="35919"/>
+                  <a:pt x="702365" y="39756"/>
+                </a:cubicBezTo>
+                <a:cubicBezTo>
+                  <a:pt x="684852" y="44760"/>
+                  <a:pt x="667136" y="49057"/>
+                  <a:pt x="649356" y="53008"/>
+                </a:cubicBezTo>
+                <a:cubicBezTo>
+                  <a:pt x="627368" y="57894"/>
+                  <a:pt x="604947" y="60798"/>
+                  <a:pt x="583095" y="66261"/>
+                </a:cubicBezTo>
+                <a:cubicBezTo>
+                  <a:pt x="569543" y="69649"/>
+                  <a:pt x="556891" y="76125"/>
+                  <a:pt x="543339" y="79513"/>
+                </a:cubicBezTo>
+                <a:cubicBezTo>
+                  <a:pt x="521487" y="84976"/>
+                  <a:pt x="498809" y="86839"/>
+                  <a:pt x="477078" y="92765"/>
+                </a:cubicBezTo>
+                <a:cubicBezTo>
+                  <a:pt x="450124" y="100116"/>
+                  <a:pt x="424069" y="110434"/>
+                  <a:pt x="397565" y="119269"/>
+                </a:cubicBezTo>
+                <a:lnTo>
+                  <a:pt x="357808" y="132521"/>
+                </a:lnTo>
+                <a:cubicBezTo>
+                  <a:pt x="344556" y="141356"/>
+                  <a:pt x="332298" y="151903"/>
+                  <a:pt x="318052" y="159026"/>
+                </a:cubicBezTo>
+                <a:cubicBezTo>
+                  <a:pt x="305558" y="165273"/>
+                  <a:pt x="289470" y="163897"/>
+                  <a:pt x="278295" y="172278"/>
+                </a:cubicBezTo>
+                <a:cubicBezTo>
+                  <a:pt x="253306" y="191019"/>
+                  <a:pt x="234121" y="216452"/>
+                  <a:pt x="212034" y="238539"/>
+                </a:cubicBezTo>
+                <a:lnTo>
+                  <a:pt x="172278" y="278295"/>
+                </a:lnTo>
+                <a:cubicBezTo>
+                  <a:pt x="163443" y="287130"/>
+                  <a:pt x="145774" y="292306"/>
+                  <a:pt x="145774" y="304800"/>
+                </a:cubicBezTo>
+                <a:lnTo>
+                  <a:pt x="132521" y="331304"/>
+                </a:lnTo>
+                <a:close/>
+              </a:path>
+            </a:pathLst>
+          </a:custGeom>
+          <a:noFill/>
+          <a:ln w="15875"/>
+        </p:spPr>
+        <p:style>
+          <a:lnRef idx="2">
+            <a:schemeClr val="accent1">
+              <a:shade val="50000"/>
+            </a:schemeClr>
+          </a:lnRef>
+          <a:fillRef idx="1">
+            <a:schemeClr val="accent1"/>
+          </a:fillRef>
+          <a:effectRef idx="0">
+            <a:schemeClr val="accent1"/>
+          </a:effectRef>
+          <a:fontRef idx="minor">
+            <a:schemeClr val="lt1"/>
+          </a:fontRef>
+        </p:style>
+        <p:txBody>
           <a:bodyPr rtlCol="0" anchor="ctr"/>
+          <a:lstStyle/>
+          <a:p>
+            <a:pPr algn="ctr" defTabSz="914377"/>
+            <a:r>
+              <a:rPr lang="en-US" sz="1333" dirty="0">
+                <a:solidFill>
+                  <a:schemeClr val="tx1"/>
+                </a:solidFill>
+                <a:latin typeface="Arial"/>
+              </a:rPr>
+              <a:t>Voyage subdomain (core)</a:t>
+            </a:r>
+          </a:p>
+        </p:txBody>
+      </p:sp>
+      <p:cxnSp>
+        <p:nvCxnSpPr>
+          <p:cNvPr id="54" name="Straight Connector 53">
+            <a:extLst>
+              <a:ext uri="{FF2B5EF4-FFF2-40B4-BE49-F238E27FC236}">
+                <a16:creationId xmlns:a16="http://schemas.microsoft.com/office/drawing/2014/main" id="{37ED6C66-C223-0C4B-8737-0565F8967140}"/>
+              </a:ext>
+            </a:extLst>
+          </p:cNvPr>
+          <p:cNvCxnSpPr>
+            <a:cxnSpLocks/>
+            <a:stCxn id="53" idx="35"/>
+            <a:endCxn id="15" idx="5"/>
+          </p:cNvCxnSpPr>
+          <p:nvPr/>
+        </p:nvCxnSpPr>
+        <p:spPr>
+          <a:xfrm flipV="1">
+            <a:off x="8628556" y="2772825"/>
+            <a:ext cx="90209" cy="453061"/>
+          </a:xfrm>
+          <a:prstGeom prst="line">
+            <a:avLst/>
+          </a:prstGeom>
+          <a:ln>
+            <a:solidFill>
+              <a:srgbClr val="0000FF"/>
+            </a:solidFill>
+          </a:ln>
+          <a:effectLst/>
+        </p:spPr>
+        <p:style>
+          <a:lnRef idx="2">
+            <a:schemeClr val="accent1"/>
+          </a:lnRef>
+          <a:fillRef idx="0">
+            <a:schemeClr val="accent1"/>
+          </a:fillRef>
+          <a:effectRef idx="1">
+            <a:schemeClr val="accent1"/>
+          </a:effectRef>
+          <a:fontRef idx="minor">
+            <a:schemeClr val="tx1"/>
+          </a:fontRef>
+        </p:style>
+      </p:cxnSp>
+      <p:sp>
+        <p:nvSpPr>
+          <p:cNvPr id="63" name="Oval 62">
+            <a:extLst>
+              <a:ext uri="{FF2B5EF4-FFF2-40B4-BE49-F238E27FC236}">
+                <a16:creationId xmlns:a16="http://schemas.microsoft.com/office/drawing/2014/main" id="{DE96E5D9-2A66-FE48-9CBC-9333E12124B8}"/>
+              </a:ext>
+            </a:extLst>
+          </p:cNvPr>
+          <p:cNvSpPr/>
+          <p:nvPr/>
+        </p:nvSpPr>
+        <p:spPr>
+          <a:xfrm>
+            <a:off x="322781" y="5388553"/>
+            <a:ext cx="2191031" cy="770026"/>
+          </a:xfrm>
+          <a:prstGeom prst="ellipse">
+            <a:avLst/>
+          </a:prstGeom>
+          <a:noFill/>
+        </p:spPr>
+        <p:style>
+          <a:lnRef idx="2">
+            <a:schemeClr val="accent1">
+              <a:shade val="50000"/>
+            </a:schemeClr>
+          </a:lnRef>
+          <a:fillRef idx="1">
+            <a:schemeClr val="accent1"/>
+          </a:fillRef>
+          <a:effectRef idx="0">
+            <a:schemeClr val="accent1"/>
+          </a:effectRef>
+          <a:fontRef idx="minor">
+            <a:schemeClr val="lt1"/>
+          </a:fontRef>
+        </p:style>
+        <p:txBody>
+          <a:bodyPr rtlCol="0" anchor="t"/>
+          <a:lstStyle/>
+          <a:p>
+            <a:pPr algn="ctr" defTabSz="914377"/>
+            <a:r>
+              <a:rPr lang="en-US" sz="1333" dirty="0">
+                <a:solidFill>
+                  <a:schemeClr val="tx1">
+                    <a:lumMod val="95000"/>
+                    <a:lumOff val="5000"/>
+                  </a:schemeClr>
+                </a:solidFill>
+                <a:latin typeface="Arial"/>
+              </a:rPr>
+              <a:t>Invoice</a:t>
+            </a:r>
+          </a:p>
+          <a:p>
+            <a:pPr algn="ctr" defTabSz="914377"/>
+            <a:r>
+              <a:rPr lang="en-US" sz="1333" dirty="0">
+                <a:solidFill>
+                  <a:schemeClr val="tx1">
+                    <a:lumMod val="95000"/>
+                    <a:lumOff val="5000"/>
+                  </a:schemeClr>
+                </a:solidFill>
+                <a:latin typeface="Arial"/>
+              </a:rPr>
+              <a:t> system</a:t>
+            </a:r>
+          </a:p>
+        </p:txBody>
+      </p:sp>
+      <p:sp>
+        <p:nvSpPr>
+          <p:cNvPr id="64" name="Oval 63">
+            <a:extLst>
+              <a:ext uri="{FF2B5EF4-FFF2-40B4-BE49-F238E27FC236}">
+                <a16:creationId xmlns:a16="http://schemas.microsoft.com/office/drawing/2014/main" id="{A7647587-0BF5-9B48-98A6-E92B2957B514}"/>
+              </a:ext>
+            </a:extLst>
+          </p:cNvPr>
+          <p:cNvSpPr/>
+          <p:nvPr/>
+        </p:nvSpPr>
+        <p:spPr>
+          <a:xfrm>
+            <a:off x="318048" y="630068"/>
+            <a:ext cx="2191031" cy="770026"/>
+          </a:xfrm>
+          <a:prstGeom prst="ellipse">
+            <a:avLst/>
+          </a:prstGeom>
+          <a:noFill/>
+        </p:spPr>
+        <p:style>
+          <a:lnRef idx="2">
+            <a:schemeClr val="accent1">
+              <a:shade val="50000"/>
+            </a:schemeClr>
+          </a:lnRef>
+          <a:fillRef idx="1">
+            <a:schemeClr val="accent1"/>
+          </a:fillRef>
+          <a:effectRef idx="0">
+            <a:schemeClr val="accent1"/>
+          </a:effectRef>
+          <a:fontRef idx="minor">
+            <a:schemeClr val="lt1"/>
+          </a:fontRef>
+        </p:style>
+        <p:txBody>
+          <a:bodyPr rtlCol="0" anchor="t"/>
+          <a:lstStyle/>
+          <a:p>
+            <a:pPr algn="ctr" defTabSz="914377"/>
+            <a:r>
+              <a:rPr lang="en-US" sz="1333" dirty="0">
+                <a:solidFill>
+                  <a:schemeClr val="tx1">
+                    <a:lumMod val="95000"/>
+                    <a:lumOff val="5000"/>
+                  </a:schemeClr>
+                </a:solidFill>
+                <a:latin typeface="Arial"/>
+              </a:rPr>
+              <a:t>Customer Relationship</a:t>
+            </a:r>
+          </a:p>
+          <a:p>
+            <a:pPr algn="ctr" defTabSz="914377"/>
+            <a:r>
+              <a:rPr lang="en-US" sz="1333" dirty="0">
+                <a:solidFill>
+                  <a:schemeClr val="tx1">
+                    <a:lumMod val="95000"/>
+                    <a:lumOff val="5000"/>
+                  </a:schemeClr>
+                </a:solidFill>
+                <a:latin typeface="Arial"/>
+              </a:rPr>
+              <a:t> system</a:t>
+            </a:r>
+          </a:p>
+        </p:txBody>
+      </p:sp>
+      <p:cxnSp>
+        <p:nvCxnSpPr>
+          <p:cNvPr id="65" name="Straight Connector 64">
+            <a:extLst>
+              <a:ext uri="{FF2B5EF4-FFF2-40B4-BE49-F238E27FC236}">
+                <a16:creationId xmlns:a16="http://schemas.microsoft.com/office/drawing/2014/main" id="{B3FCAB45-55F3-AB41-9A7F-994AFCF71335}"/>
+              </a:ext>
+            </a:extLst>
+          </p:cNvPr>
+          <p:cNvCxnSpPr>
+            <a:cxnSpLocks/>
+            <a:stCxn id="63" idx="0"/>
+            <a:endCxn id="5" idx="52"/>
+          </p:cNvCxnSpPr>
+          <p:nvPr/>
+        </p:nvCxnSpPr>
+        <p:spPr>
+          <a:xfrm flipV="1">
+            <a:off x="1418297" y="3289169"/>
+            <a:ext cx="101756" cy="2099384"/>
+          </a:xfrm>
+          <a:prstGeom prst="line">
+            <a:avLst/>
+          </a:prstGeom>
+          <a:ln>
+            <a:solidFill>
+              <a:srgbClr val="0000FF"/>
+            </a:solidFill>
+          </a:ln>
+          <a:effectLst/>
+        </p:spPr>
+        <p:style>
+          <a:lnRef idx="2">
+            <a:schemeClr val="accent1"/>
+          </a:lnRef>
+          <a:fillRef idx="0">
+            <a:schemeClr val="accent1"/>
+          </a:fillRef>
+          <a:effectRef idx="1">
+            <a:schemeClr val="accent1"/>
+          </a:effectRef>
+          <a:fontRef idx="minor">
+            <a:schemeClr val="tx1"/>
+          </a:fontRef>
+        </p:style>
+      </p:cxnSp>
+      <p:cxnSp>
+        <p:nvCxnSpPr>
+          <p:cNvPr id="70" name="Straight Connector 69">
+            <a:extLst>
+              <a:ext uri="{FF2B5EF4-FFF2-40B4-BE49-F238E27FC236}">
+                <a16:creationId xmlns:a16="http://schemas.microsoft.com/office/drawing/2014/main" id="{22A436A7-FECB-EB4D-BFAB-89ABEB82B050}"/>
+              </a:ext>
+            </a:extLst>
+          </p:cNvPr>
+          <p:cNvCxnSpPr>
+            <a:cxnSpLocks/>
+            <a:stCxn id="64" idx="4"/>
+            <a:endCxn id="5" idx="178"/>
+          </p:cNvCxnSpPr>
+          <p:nvPr/>
+        </p:nvCxnSpPr>
+        <p:spPr>
+          <a:xfrm>
+            <a:off x="1413564" y="1400094"/>
+            <a:ext cx="899758" cy="936339"/>
+          </a:xfrm>
+          <a:prstGeom prst="line">
+            <a:avLst/>
+          </a:prstGeom>
+          <a:ln>
+            <a:solidFill>
+              <a:srgbClr val="0000FF"/>
+            </a:solidFill>
+          </a:ln>
+          <a:effectLst/>
+        </p:spPr>
+        <p:style>
+          <a:lnRef idx="2">
+            <a:schemeClr val="accent1"/>
+          </a:lnRef>
+          <a:fillRef idx="0">
+            <a:schemeClr val="accent1"/>
+          </a:fillRef>
+          <a:effectRef idx="1">
+            <a:schemeClr val="accent1"/>
+          </a:effectRef>
+          <a:fontRef idx="minor">
+            <a:schemeClr val="tx1"/>
+          </a:fontRef>
+        </p:style>
+      </p:cxnSp>
+      <p:sp>
+        <p:nvSpPr>
+          <p:cNvPr id="17" name="Freeform 16">
+            <a:extLst>
+              <a:ext uri="{FF2B5EF4-FFF2-40B4-BE49-F238E27FC236}">
+                <a16:creationId xmlns:a16="http://schemas.microsoft.com/office/drawing/2014/main" id="{D64D3032-F279-7541-91D8-A84A2649B9E3}"/>
+              </a:ext>
+            </a:extLst>
+          </p:cNvPr>
+          <p:cNvSpPr/>
+          <p:nvPr/>
+        </p:nvSpPr>
+        <p:spPr>
+          <a:xfrm>
+            <a:off x="1676207" y="4276035"/>
+            <a:ext cx="3066275" cy="662378"/>
+          </a:xfrm>
+          <a:custGeom>
+            <a:avLst/>
+            <a:gdLst>
+              <a:gd name="connsiteX0" fmla="*/ 304800 w 2478156"/>
+              <a:gd name="connsiteY0" fmla="*/ 66261 h 914400"/>
+              <a:gd name="connsiteX1" fmla="*/ 304800 w 2478156"/>
+              <a:gd name="connsiteY1" fmla="*/ 66261 h 914400"/>
+              <a:gd name="connsiteX2" fmla="*/ 198782 w 2478156"/>
+              <a:gd name="connsiteY2" fmla="*/ 145774 h 914400"/>
+              <a:gd name="connsiteX3" fmla="*/ 145773 w 2478156"/>
+              <a:gd name="connsiteY3" fmla="*/ 198783 h 914400"/>
+              <a:gd name="connsiteX4" fmla="*/ 79513 w 2478156"/>
+              <a:gd name="connsiteY4" fmla="*/ 251792 h 914400"/>
+              <a:gd name="connsiteX5" fmla="*/ 66260 w 2478156"/>
+              <a:gd name="connsiteY5" fmla="*/ 318052 h 914400"/>
+              <a:gd name="connsiteX6" fmla="*/ 0 w 2478156"/>
+              <a:gd name="connsiteY6" fmla="*/ 649357 h 914400"/>
+              <a:gd name="connsiteX7" fmla="*/ 212034 w 2478156"/>
+              <a:gd name="connsiteY7" fmla="*/ 874644 h 914400"/>
+              <a:gd name="connsiteX8" fmla="*/ 662608 w 2478156"/>
+              <a:gd name="connsiteY8" fmla="*/ 914400 h 914400"/>
+              <a:gd name="connsiteX9" fmla="*/ 1815547 w 2478156"/>
+              <a:gd name="connsiteY9" fmla="*/ 834887 h 914400"/>
+              <a:gd name="connsiteX10" fmla="*/ 2345634 w 2478156"/>
+              <a:gd name="connsiteY10" fmla="*/ 781878 h 914400"/>
+              <a:gd name="connsiteX11" fmla="*/ 2478156 w 2478156"/>
+              <a:gd name="connsiteY11" fmla="*/ 556592 h 914400"/>
+              <a:gd name="connsiteX12" fmla="*/ 2305878 w 2478156"/>
+              <a:gd name="connsiteY12" fmla="*/ 304800 h 914400"/>
+              <a:gd name="connsiteX13" fmla="*/ 1987826 w 2478156"/>
+              <a:gd name="connsiteY13" fmla="*/ 159026 h 914400"/>
+              <a:gd name="connsiteX14" fmla="*/ 1643269 w 2478156"/>
+              <a:gd name="connsiteY14" fmla="*/ 53009 h 914400"/>
+              <a:gd name="connsiteX15" fmla="*/ 1245704 w 2478156"/>
+              <a:gd name="connsiteY15" fmla="*/ 39757 h 914400"/>
+              <a:gd name="connsiteX16" fmla="*/ 914400 w 2478156"/>
+              <a:gd name="connsiteY16" fmla="*/ 0 h 914400"/>
+              <a:gd name="connsiteX17" fmla="*/ 649356 w 2478156"/>
+              <a:gd name="connsiteY17" fmla="*/ 26505 h 914400"/>
+              <a:gd name="connsiteX18" fmla="*/ 304800 w 2478156"/>
+              <a:gd name="connsiteY18" fmla="*/ 66261 h 914400"/>
+            </a:gdLst>
+            <a:ahLst/>
+            <a:cxnLst>
+              <a:cxn ang="0">
+                <a:pos x="connsiteX0" y="connsiteY0"/>
+              </a:cxn>
+              <a:cxn ang="0">
+                <a:pos x="connsiteX1" y="connsiteY1"/>
+              </a:cxn>
+              <a:cxn ang="0">
+                <a:pos x="connsiteX2" y="connsiteY2"/>
+              </a:cxn>
+              <a:cxn ang="0">
+                <a:pos x="connsiteX3" y="connsiteY3"/>
+              </a:cxn>
+              <a:cxn ang="0">
+                <a:pos x="connsiteX4" y="connsiteY4"/>
+              </a:cxn>
+              <a:cxn ang="0">
+                <a:pos x="connsiteX5" y="connsiteY5"/>
+              </a:cxn>
+              <a:cxn ang="0">
+                <a:pos x="connsiteX6" y="connsiteY6"/>
+              </a:cxn>
+              <a:cxn ang="0">
+                <a:pos x="connsiteX7" y="connsiteY7"/>
+              </a:cxn>
+              <a:cxn ang="0">
+                <a:pos x="connsiteX8" y="connsiteY8"/>
+              </a:cxn>
+              <a:cxn ang="0">
+                <a:pos x="connsiteX9" y="connsiteY9"/>
+              </a:cxn>
+              <a:cxn ang="0">
+                <a:pos x="connsiteX10" y="connsiteY10"/>
+              </a:cxn>
+              <a:cxn ang="0">
+                <a:pos x="connsiteX11" y="connsiteY11"/>
+              </a:cxn>
+              <a:cxn ang="0">
+                <a:pos x="connsiteX12" y="connsiteY12"/>
+              </a:cxn>
+              <a:cxn ang="0">
+                <a:pos x="connsiteX13" y="connsiteY13"/>
+              </a:cxn>
+              <a:cxn ang="0">
+                <a:pos x="connsiteX14" y="connsiteY14"/>
+              </a:cxn>
+              <a:cxn ang="0">
+                <a:pos x="connsiteX15" y="connsiteY15"/>
+              </a:cxn>
+              <a:cxn ang="0">
+                <a:pos x="connsiteX16" y="connsiteY16"/>
+              </a:cxn>
+              <a:cxn ang="0">
+                <a:pos x="connsiteX17" y="connsiteY17"/>
+              </a:cxn>
+              <a:cxn ang="0">
+                <a:pos x="connsiteX18" y="connsiteY18"/>
+              </a:cxn>
+            </a:cxnLst>
+            <a:rect l="l" t="t" r="r" b="b"/>
+            <a:pathLst>
+              <a:path w="2478156" h="914400">
+                <a:moveTo>
+                  <a:pt x="304800" y="66261"/>
+                </a:moveTo>
+                <a:lnTo>
+                  <a:pt x="304800" y="66261"/>
+                </a:lnTo>
+                <a:cubicBezTo>
+                  <a:pt x="269461" y="92765"/>
+                  <a:pt x="232718" y="117495"/>
+                  <a:pt x="198782" y="145774"/>
+                </a:cubicBezTo>
+                <a:cubicBezTo>
+                  <a:pt x="179585" y="161771"/>
+                  <a:pt x="164746" y="182521"/>
+                  <a:pt x="145773" y="198783"/>
+                </a:cubicBezTo>
+                <a:cubicBezTo>
+                  <a:pt x="28768" y="299073"/>
+                  <a:pt x="169723" y="161578"/>
+                  <a:pt x="79513" y="251792"/>
+                </a:cubicBezTo>
+                <a:cubicBezTo>
+                  <a:pt x="63466" y="299929"/>
+                  <a:pt x="66260" y="277579"/>
+                  <a:pt x="66260" y="318052"/>
+                </a:cubicBezTo>
+                <a:lnTo>
+                  <a:pt x="0" y="649357"/>
+                </a:lnTo>
+                <a:lnTo>
+                  <a:pt x="212034" y="874644"/>
+                </a:lnTo>
+                <a:lnTo>
+                  <a:pt x="662608" y="914400"/>
+                </a:lnTo>
+                <a:lnTo>
+                  <a:pt x="1815547" y="834887"/>
+                </a:lnTo>
+                <a:lnTo>
+                  <a:pt x="2345634" y="781878"/>
+                </a:lnTo>
+                <a:lnTo>
+                  <a:pt x="2478156" y="556592"/>
+                </a:lnTo>
+                <a:lnTo>
+                  <a:pt x="2305878" y="304800"/>
+                </a:lnTo>
+                <a:lnTo>
+                  <a:pt x="1987826" y="159026"/>
+                </a:lnTo>
+                <a:lnTo>
+                  <a:pt x="1643269" y="53009"/>
+                </a:lnTo>
+                <a:lnTo>
+                  <a:pt x="1245704" y="39757"/>
+                </a:lnTo>
+                <a:lnTo>
+                  <a:pt x="914400" y="0"/>
+                </a:lnTo>
+                <a:lnTo>
+                  <a:pt x="649356" y="26505"/>
+                </a:lnTo>
+                <a:lnTo>
+                  <a:pt x="304800" y="66261"/>
+                </a:lnTo>
+                <a:close/>
+              </a:path>
+            </a:pathLst>
+          </a:custGeom>
+          <a:solidFill>
+            <a:schemeClr val="bg1"/>
+          </a:solidFill>
+          <a:ln w="19050"/>
+        </p:spPr>
+        <p:style>
+          <a:lnRef idx="2">
+            <a:schemeClr val="accent1">
+              <a:shade val="50000"/>
+            </a:schemeClr>
+          </a:lnRef>
+          <a:fillRef idx="1">
+            <a:schemeClr val="accent1"/>
+          </a:fillRef>
+          <a:effectRef idx="0">
+            <a:schemeClr val="accent1"/>
+          </a:effectRef>
+          <a:fontRef idx="minor">
+            <a:schemeClr val="lt1"/>
+          </a:fontRef>
+        </p:style>
+        <p:txBody>
+          <a:bodyPr rtlCol="0" anchor="ctr"/>
+          <a:lstStyle/>
+          <a:p>
+            <a:pPr algn="ctr"/>
+            <a:r>
+              <a:rPr lang="en-US" sz="1400" dirty="0">
+                <a:solidFill>
+                  <a:schemeClr val="tx1"/>
+                </a:solidFill>
+              </a:rPr>
+              <a:t>Contract subdomain (support)</a:t>
+            </a:r>
+          </a:p>
+        </p:txBody>
+      </p:sp>
+    </p:spTree>
+    <p:extLst>
+      <p:ext uri="{BB962C8B-B14F-4D97-AF65-F5344CB8AC3E}">
+        <p14:creationId xmlns:p14="http://schemas.microsoft.com/office/powerpoint/2010/main" val="3285602415"/>
+      </p:ext>
+    </p:extLst>
+  </p:cSld>
+  <p:clrMapOvr>
+    <a:masterClrMapping/>
+  </p:clrMapOvr>
+</p:sld>
+</file>
+
+<file path=ppt/slides/slide18.xml><?xml version="1.0" encoding="utf-8"?>
+<p:sld xmlns:a="http://schemas.openxmlformats.org/drawingml/2006/main" xmlns:r="http://schemas.openxmlformats.org/officeDocument/2006/relationships" xmlns:p="http://schemas.openxmlformats.org/presentationml/2006/main">
+  <p:cSld>
+    <p:spTree>
+      <p:nvGrpSpPr>
+        <p:cNvPr id="1" name=""/>
+        <p:cNvGrpSpPr/>
+        <p:nvPr/>
+      </p:nvGrpSpPr>
+      <p:grpSpPr>
+        <a:xfrm>
+          <a:off x="0" y="0"/>
+          <a:ext cx="0" cy="0"/>
+          <a:chOff x="0" y="0"/>
+          <a:chExt cx="0" cy="0"/>
+        </a:xfrm>
+      </p:grpSpPr>
+      <p:sp>
+        <p:nvSpPr>
+          <p:cNvPr id="2" name="Slide Number Placeholder 1">
+            <a:extLst>
+              <a:ext uri="{FF2B5EF4-FFF2-40B4-BE49-F238E27FC236}">
+                <a16:creationId xmlns:a16="http://schemas.microsoft.com/office/drawing/2014/main" id="{0D38B019-00EE-A649-AC0A-3E8CD5A46B05}"/>
+              </a:ext>
+            </a:extLst>
+          </p:cNvPr>
+          <p:cNvSpPr>
+            <a:spLocks noGrp="1"/>
+          </p:cNvSpPr>
+          <p:nvPr>
+            <p:ph type="sldNum" sz="quarter" idx="12"/>
+          </p:nvPr>
+        </p:nvSpPr>
+        <p:spPr/>
+        <p:txBody>
+          <a:bodyPr/>
+          <a:lstStyle/>
+          <a:p>
+            <a:fld id="{C565C23E-6D76-459C-BC14-A9049E4EE889}" type="slidenum">
+              <a:rPr lang="en-US" smtClean="0"/>
+              <a:t>18</a:t>
+            </a:fld>
+            <a:endParaRPr lang="en-US"/>
+          </a:p>
+        </p:txBody>
+      </p:sp>
+      <p:sp>
+        <p:nvSpPr>
+          <p:cNvPr id="10" name="Rectangle 9">
+            <a:extLst>
+              <a:ext uri="{FF2B5EF4-FFF2-40B4-BE49-F238E27FC236}">
+                <a16:creationId xmlns:a16="http://schemas.microsoft.com/office/drawing/2014/main" id="{C6FB49FE-0AC0-9240-8F38-7DD725E4E8AE}"/>
+              </a:ext>
+            </a:extLst>
+          </p:cNvPr>
+          <p:cNvSpPr/>
+          <p:nvPr/>
+        </p:nvSpPr>
+        <p:spPr>
+          <a:xfrm>
+            <a:off x="514881" y="1225365"/>
+            <a:ext cx="1626730" cy="2004532"/>
+          </a:xfrm>
+          <a:prstGeom prst="rect">
+            <a:avLst/>
+          </a:prstGeom>
+          <a:solidFill>
+            <a:schemeClr val="accent6"/>
+          </a:solidFill>
+          <a:ln>
+            <a:noFill/>
+          </a:ln>
+          <a:effectLst>
+            <a:outerShdw blurRad="50800" dist="38100" dir="5400000" algn="t" rotWithShape="0">
+              <a:prstClr val="black">
+                <a:alpha val="40000"/>
+              </a:prstClr>
+            </a:outerShdw>
+          </a:effectLst>
+        </p:spPr>
+        <p:style>
+          <a:lnRef idx="2">
+            <a:schemeClr val="accent1">
+              <a:shade val="50000"/>
+            </a:schemeClr>
+          </a:lnRef>
+          <a:fillRef idx="1">
+            <a:schemeClr val="accent1"/>
+          </a:fillRef>
+          <a:effectRef idx="0">
+            <a:schemeClr val="accent1"/>
+          </a:effectRef>
+          <a:fontRef idx="minor">
+            <a:schemeClr val="lt1"/>
+          </a:fontRef>
+        </p:style>
+        <p:txBody>
+          <a:bodyPr rtlCol="0" anchor="t"/>
           <a:lstStyle/>
           <a:p>
             <a:pPr algn="ctr"/>
@@ -16882,7 +19525,217 @@
                   <a:schemeClr val="bg1"/>
                 </a:solidFill>
               </a:rPr>
-              <a:t>Container</a:t>
+              <a:t>Shipping Order</a:t>
+            </a:r>
+          </a:p>
+          <a:p>
+            <a:pPr algn="ctr"/>
+            <a:endParaRPr lang="en-US" b="1" dirty="0">
+              <a:solidFill>
+                <a:schemeClr val="bg1"/>
+              </a:solidFill>
+            </a:endParaRPr>
+          </a:p>
+          <a:p>
+            <a:r>
+              <a:rPr lang="en-US" sz="1400" dirty="0" err="1">
+                <a:solidFill>
+                  <a:schemeClr val="bg1"/>
+                </a:solidFill>
+              </a:rPr>
+              <a:t>orderID</a:t>
+            </a:r>
+            <a:endParaRPr lang="en-US" sz="1400" dirty="0">
+              <a:solidFill>
+                <a:schemeClr val="bg1"/>
+              </a:solidFill>
+            </a:endParaRPr>
+          </a:p>
+          <a:p>
+            <a:r>
+              <a:rPr lang="en-US" sz="1400" dirty="0" err="1">
+                <a:solidFill>
+                  <a:schemeClr val="bg1"/>
+                </a:solidFill>
+              </a:rPr>
+              <a:t>orignAddress</a:t>
+            </a:r>
+            <a:endParaRPr lang="en-US" sz="1400" dirty="0">
+              <a:solidFill>
+                <a:schemeClr val="bg1"/>
+              </a:solidFill>
+            </a:endParaRPr>
+          </a:p>
+          <a:p>
+            <a:r>
+              <a:rPr lang="en-US" sz="1400" dirty="0" err="1">
+                <a:solidFill>
+                  <a:schemeClr val="bg1"/>
+                </a:solidFill>
+              </a:rPr>
+              <a:t>destinationAddress</a:t>
+            </a:r>
+            <a:endParaRPr lang="en-US" sz="1400" dirty="0">
+              <a:solidFill>
+                <a:schemeClr val="bg1"/>
+              </a:solidFill>
+            </a:endParaRPr>
+          </a:p>
+          <a:p>
+            <a:r>
+              <a:rPr lang="en-US" sz="1400" dirty="0" err="1">
+                <a:solidFill>
+                  <a:schemeClr val="bg1"/>
+                </a:solidFill>
+              </a:rPr>
+              <a:t>cargoType</a:t>
+            </a:r>
+            <a:endParaRPr lang="en-US" sz="1400" dirty="0">
+              <a:solidFill>
+                <a:schemeClr val="bg1"/>
+              </a:solidFill>
+            </a:endParaRPr>
+          </a:p>
+          <a:p>
+            <a:r>
+              <a:rPr lang="en-US" sz="1400" dirty="0">
+                <a:solidFill>
+                  <a:schemeClr val="bg1"/>
+                </a:solidFill>
+              </a:rPr>
+              <a:t>quantity</a:t>
+            </a:r>
+          </a:p>
+        </p:txBody>
+      </p:sp>
+      <p:sp>
+        <p:nvSpPr>
+          <p:cNvPr id="11" name="Rectangle 10">
+            <a:extLst>
+              <a:ext uri="{FF2B5EF4-FFF2-40B4-BE49-F238E27FC236}">
+                <a16:creationId xmlns:a16="http://schemas.microsoft.com/office/drawing/2014/main" id="{778DE887-D624-9D47-8F60-D56D3B1936E9}"/>
+              </a:ext>
+            </a:extLst>
+          </p:cNvPr>
+          <p:cNvSpPr/>
+          <p:nvPr/>
+        </p:nvSpPr>
+        <p:spPr>
+          <a:xfrm>
+            <a:off x="8264013" y="1294898"/>
+            <a:ext cx="1512657" cy="607644"/>
+          </a:xfrm>
+          <a:prstGeom prst="rect">
+            <a:avLst/>
+          </a:prstGeom>
+          <a:solidFill>
+            <a:schemeClr val="accent6"/>
+          </a:solidFill>
+          <a:ln>
+            <a:noFill/>
+          </a:ln>
+          <a:effectLst>
+            <a:outerShdw blurRad="50800" dist="38100" dir="5400000" algn="t" rotWithShape="0">
+              <a:prstClr val="black">
+                <a:alpha val="40000"/>
+              </a:prstClr>
+            </a:outerShdw>
+          </a:effectLst>
+        </p:spPr>
+        <p:style>
+          <a:lnRef idx="2">
+            <a:schemeClr val="accent1">
+              <a:shade val="50000"/>
+            </a:schemeClr>
+          </a:lnRef>
+          <a:fillRef idx="1">
+            <a:schemeClr val="accent1"/>
+          </a:fillRef>
+          <a:effectRef idx="0">
+            <a:schemeClr val="accent1"/>
+          </a:effectRef>
+          <a:fontRef idx="minor">
+            <a:schemeClr val="lt1"/>
+          </a:fontRef>
+        </p:style>
+        <p:txBody>
+          <a:bodyPr rtlCol="0" anchor="ctr"/>
+          <a:lstStyle/>
+          <a:p>
+            <a:pPr algn="ctr"/>
+            <a:r>
+              <a:rPr lang="en-US" b="1" dirty="0">
+                <a:solidFill>
+                  <a:schemeClr val="bg1"/>
+                </a:solidFill>
+              </a:rPr>
+              <a:t>Reefer Container</a:t>
+            </a:r>
+          </a:p>
+        </p:txBody>
+      </p:sp>
+      <p:sp>
+        <p:nvSpPr>
+          <p:cNvPr id="12" name="Rectangle 11">
+            <a:extLst>
+              <a:ext uri="{FF2B5EF4-FFF2-40B4-BE49-F238E27FC236}">
+                <a16:creationId xmlns:a16="http://schemas.microsoft.com/office/drawing/2014/main" id="{9833BC8C-2483-2E43-ABD8-484D2A2FE049}"/>
+              </a:ext>
+            </a:extLst>
+          </p:cNvPr>
+          <p:cNvSpPr/>
+          <p:nvPr/>
+        </p:nvSpPr>
+        <p:spPr>
+          <a:xfrm>
+            <a:off x="5080664" y="1225365"/>
+            <a:ext cx="1512657" cy="607644"/>
+          </a:xfrm>
+          <a:prstGeom prst="rect">
+            <a:avLst/>
+          </a:prstGeom>
+          <a:solidFill>
+            <a:schemeClr val="accent6"/>
+          </a:solidFill>
+          <a:ln>
+            <a:noFill/>
+          </a:ln>
+          <a:effectLst>
+            <a:outerShdw blurRad="50800" dist="38100" dir="5400000" algn="t" rotWithShape="0">
+              <a:prstClr val="black">
+                <a:alpha val="40000"/>
+              </a:prstClr>
+            </a:outerShdw>
+          </a:effectLst>
+        </p:spPr>
+        <p:style>
+          <a:lnRef idx="2">
+            <a:schemeClr val="accent1">
+              <a:shade val="50000"/>
+            </a:schemeClr>
+          </a:lnRef>
+          <a:fillRef idx="1">
+            <a:schemeClr val="accent1"/>
+          </a:fillRef>
+          <a:effectRef idx="0">
+            <a:schemeClr val="accent1"/>
+          </a:effectRef>
+          <a:fontRef idx="minor">
+            <a:schemeClr val="lt1"/>
+          </a:fontRef>
+        </p:style>
+        <p:txBody>
+          <a:bodyPr rtlCol="0" anchor="ctr"/>
+          <a:lstStyle/>
+          <a:p>
+            <a:pPr algn="ctr"/>
+            <a:r>
+              <a:rPr lang="en-US" b="1" dirty="0">
+                <a:solidFill>
+                  <a:schemeClr val="bg1"/>
+                </a:solidFill>
+              </a:rPr>
+              <a:t>Cargo</a:t>
             </a:r>
           </a:p>
         </p:txBody>
@@ -16900,7 +19753,7 @@
 </p:sld>
 </file>
 
-<file path=ppt/slides/slide18.xml><?xml version="1.0" encoding="utf-8"?>
+<file path=ppt/slides/slide19.xml><?xml version="1.0" encoding="utf-8"?>
 <p:sld xmlns:a="http://schemas.openxmlformats.org/drawingml/2006/main" xmlns:r="http://schemas.openxmlformats.org/officeDocument/2006/relationships" xmlns:p="http://schemas.openxmlformats.org/presentationml/2006/main">
   <p:cSld>
     <p:spTree>
@@ -20216,115 +23069,6 @@
 </p:sld>
 </file>
 
-<file path=ppt/slides/slide19.xml><?xml version="1.0" encoding="utf-8"?>
-<p:sld xmlns:a="http://schemas.openxmlformats.org/drawingml/2006/main" xmlns:r="http://schemas.openxmlformats.org/officeDocument/2006/relationships" xmlns:p="http://schemas.openxmlformats.org/presentationml/2006/main">
-  <p:cSld>
-    <p:spTree>
-      <p:nvGrpSpPr>
-        <p:cNvPr id="1" name=""/>
-        <p:cNvGrpSpPr/>
-        <p:nvPr/>
-      </p:nvGrpSpPr>
-      <p:grpSpPr>
-        <a:xfrm>
-          <a:off x="0" y="0"/>
-          <a:ext cx="0" cy="0"/>
-          <a:chOff x="0" y="0"/>
-          <a:chExt cx="0" cy="0"/>
-        </a:xfrm>
-      </p:grpSpPr>
-      <p:sp>
-        <p:nvSpPr>
-          <p:cNvPr id="2" name="Title 1">
-            <a:extLst>
-              <a:ext uri="{FF2B5EF4-FFF2-40B4-BE49-F238E27FC236}">
-                <a16:creationId xmlns:a16="http://schemas.microsoft.com/office/drawing/2014/main" id="{3BF2670A-2950-1340-B6EE-97587A2F9992}"/>
-              </a:ext>
-            </a:extLst>
-          </p:cNvPr>
-          <p:cNvSpPr>
-            <a:spLocks noGrp="1"/>
-          </p:cNvSpPr>
-          <p:nvPr>
-            <p:ph type="title"/>
-          </p:nvPr>
-        </p:nvSpPr>
-        <p:spPr/>
-        <p:txBody>
-          <a:bodyPr/>
-          <a:lstStyle/>
-          <a:p>
-            <a:endParaRPr lang="en-US"/>
-          </a:p>
-        </p:txBody>
-      </p:sp>
-      <p:sp>
-        <p:nvSpPr>
-          <p:cNvPr id="3" name="Content Placeholder 2">
-            <a:extLst>
-              <a:ext uri="{FF2B5EF4-FFF2-40B4-BE49-F238E27FC236}">
-                <a16:creationId xmlns:a16="http://schemas.microsoft.com/office/drawing/2014/main" id="{B9D0A971-1119-0A4C-9181-CDB26615A191}"/>
-              </a:ext>
-            </a:extLst>
-          </p:cNvPr>
-          <p:cNvSpPr>
-            <a:spLocks noGrp="1"/>
-          </p:cNvSpPr>
-          <p:nvPr>
-            <p:ph idx="1"/>
-          </p:nvPr>
-        </p:nvSpPr>
-        <p:spPr/>
-        <p:txBody>
-          <a:bodyPr/>
-          <a:lstStyle/>
-          <a:p>
-            <a:endParaRPr lang="en-US"/>
-          </a:p>
-        </p:txBody>
-      </p:sp>
-      <p:sp>
-        <p:nvSpPr>
-          <p:cNvPr id="4" name="Slide Number Placeholder 3">
-            <a:extLst>
-              <a:ext uri="{FF2B5EF4-FFF2-40B4-BE49-F238E27FC236}">
-                <a16:creationId xmlns:a16="http://schemas.microsoft.com/office/drawing/2014/main" id="{29C51F41-0CC3-7242-A398-33D1F881DFB9}"/>
-              </a:ext>
-            </a:extLst>
-          </p:cNvPr>
-          <p:cNvSpPr>
-            <a:spLocks noGrp="1"/>
-          </p:cNvSpPr>
-          <p:nvPr>
-            <p:ph type="sldNum" sz="quarter" idx="12"/>
-          </p:nvPr>
-        </p:nvSpPr>
-        <p:spPr/>
-        <p:txBody>
-          <a:bodyPr/>
-          <a:lstStyle/>
-          <a:p>
-            <a:fld id="{C565C23E-6D76-459C-BC14-A9049E4EE889}" type="slidenum">
-              <a:rPr lang="en-US" smtClean="0"/>
-              <a:t>19</a:t>
-            </a:fld>
-            <a:endParaRPr lang="en-US"/>
-          </a:p>
-        </p:txBody>
-      </p:sp>
-    </p:spTree>
-    <p:extLst>
-      <p:ext uri="{BB962C8B-B14F-4D97-AF65-F5344CB8AC3E}">
-        <p14:creationId xmlns:p14="http://schemas.microsoft.com/office/powerpoint/2010/main" val="2601410627"/>
-      </p:ext>
-    </p:extLst>
-  </p:cSld>
-  <p:clrMapOvr>
-    <a:masterClrMapping/>
-  </p:clrMapOvr>
-</p:sld>
-</file>
-
 <file path=ppt/slides/slide2.xml><?xml version="1.0" encoding="utf-8"?>
 <p:sld xmlns:a="http://schemas.openxmlformats.org/drawingml/2006/main" xmlns:r="http://schemas.openxmlformats.org/officeDocument/2006/relationships" xmlns:p="http://schemas.openxmlformats.org/presentationml/2006/main">
   <p:cSld>
@@ -20485,6 +23229,115 @@
 </file>
 
 <file path=ppt/slides/slide20.xml><?xml version="1.0" encoding="utf-8"?>
+<p:sld xmlns:a="http://schemas.openxmlformats.org/drawingml/2006/main" xmlns:r="http://schemas.openxmlformats.org/officeDocument/2006/relationships" xmlns:p="http://schemas.openxmlformats.org/presentationml/2006/main">
+  <p:cSld>
+    <p:spTree>
+      <p:nvGrpSpPr>
+        <p:cNvPr id="1" name=""/>
+        <p:cNvGrpSpPr/>
+        <p:nvPr/>
+      </p:nvGrpSpPr>
+      <p:grpSpPr>
+        <a:xfrm>
+          <a:off x="0" y="0"/>
+          <a:ext cx="0" cy="0"/>
+          <a:chOff x="0" y="0"/>
+          <a:chExt cx="0" cy="0"/>
+        </a:xfrm>
+      </p:grpSpPr>
+      <p:sp>
+        <p:nvSpPr>
+          <p:cNvPr id="2" name="Title 1">
+            <a:extLst>
+              <a:ext uri="{FF2B5EF4-FFF2-40B4-BE49-F238E27FC236}">
+                <a16:creationId xmlns:a16="http://schemas.microsoft.com/office/drawing/2014/main" id="{3BF2670A-2950-1340-B6EE-97587A2F9992}"/>
+              </a:ext>
+            </a:extLst>
+          </p:cNvPr>
+          <p:cNvSpPr>
+            <a:spLocks noGrp="1"/>
+          </p:cNvSpPr>
+          <p:nvPr>
+            <p:ph type="title"/>
+          </p:nvPr>
+        </p:nvSpPr>
+        <p:spPr/>
+        <p:txBody>
+          <a:bodyPr/>
+          <a:lstStyle/>
+          <a:p>
+            <a:endParaRPr lang="en-US"/>
+          </a:p>
+        </p:txBody>
+      </p:sp>
+      <p:sp>
+        <p:nvSpPr>
+          <p:cNvPr id="3" name="Content Placeholder 2">
+            <a:extLst>
+              <a:ext uri="{FF2B5EF4-FFF2-40B4-BE49-F238E27FC236}">
+                <a16:creationId xmlns:a16="http://schemas.microsoft.com/office/drawing/2014/main" id="{B9D0A971-1119-0A4C-9181-CDB26615A191}"/>
+              </a:ext>
+            </a:extLst>
+          </p:cNvPr>
+          <p:cNvSpPr>
+            <a:spLocks noGrp="1"/>
+          </p:cNvSpPr>
+          <p:nvPr>
+            <p:ph idx="1"/>
+          </p:nvPr>
+        </p:nvSpPr>
+        <p:spPr/>
+        <p:txBody>
+          <a:bodyPr/>
+          <a:lstStyle/>
+          <a:p>
+            <a:endParaRPr lang="en-US"/>
+          </a:p>
+        </p:txBody>
+      </p:sp>
+      <p:sp>
+        <p:nvSpPr>
+          <p:cNvPr id="4" name="Slide Number Placeholder 3">
+            <a:extLst>
+              <a:ext uri="{FF2B5EF4-FFF2-40B4-BE49-F238E27FC236}">
+                <a16:creationId xmlns:a16="http://schemas.microsoft.com/office/drawing/2014/main" id="{29C51F41-0CC3-7242-A398-33D1F881DFB9}"/>
+              </a:ext>
+            </a:extLst>
+          </p:cNvPr>
+          <p:cNvSpPr>
+            <a:spLocks noGrp="1"/>
+          </p:cNvSpPr>
+          <p:nvPr>
+            <p:ph type="sldNum" sz="quarter" idx="12"/>
+          </p:nvPr>
+        </p:nvSpPr>
+        <p:spPr/>
+        <p:txBody>
+          <a:bodyPr/>
+          <a:lstStyle/>
+          <a:p>
+            <a:fld id="{C565C23E-6D76-459C-BC14-A9049E4EE889}" type="slidenum">
+              <a:rPr lang="en-US" smtClean="0"/>
+              <a:t>20</a:t>
+            </a:fld>
+            <a:endParaRPr lang="en-US"/>
+          </a:p>
+        </p:txBody>
+      </p:sp>
+    </p:spTree>
+    <p:extLst>
+      <p:ext uri="{BB962C8B-B14F-4D97-AF65-F5344CB8AC3E}">
+        <p14:creationId xmlns:p14="http://schemas.microsoft.com/office/powerpoint/2010/main" val="2601410627"/>
+      </p:ext>
+    </p:extLst>
+  </p:cSld>
+  <p:clrMapOvr>
+    <a:masterClrMapping/>
+  </p:clrMapOvr>
+</p:sld>
+</file>
+
+<file path=ppt/slides/slide21.xml><?xml version="1.0" encoding="utf-8"?>
 <p:sld xmlns:a="http://schemas.openxmlformats.org/drawingml/2006/main" xmlns:r="http://schemas.openxmlformats.org/officeDocument/2006/relationships" xmlns:p="http://schemas.openxmlformats.org/presentationml/2006/main">
   <p:cSld>
     <p:spTree>
@@ -21757,7 +24610,7 @@
         </p:nvSpPr>
         <p:spPr>
           <a:xfrm>
-            <a:off x="1733986" y="660088"/>
+            <a:off x="1135093" y="629624"/>
             <a:ext cx="1211339" cy="1159443"/>
           </a:xfrm>
           <a:prstGeom prst="rect">
@@ -21808,7 +24661,7 @@
                   </a:schemeClr>
                 </a:solidFill>
               </a:rPr>
-              <a:t>Shipment Order Placed</a:t>
+              <a:t>Fresh Cargo Shipment Order Placed</a:t>
             </a:r>
           </a:p>
         </p:txBody>
@@ -21827,8 +24680,8 @@
         </p:nvSpPr>
         <p:spPr>
           <a:xfrm>
-            <a:off x="2020181" y="2715650"/>
-            <a:ext cx="1211339" cy="1338973"/>
+            <a:off x="1985052" y="2714454"/>
+            <a:ext cx="1211339" cy="1159442"/>
           </a:xfrm>
           <a:prstGeom prst="rect">
             <a:avLst/>
@@ -21923,8 +24776,8 @@
         </p:nvSpPr>
         <p:spPr>
           <a:xfrm>
-            <a:off x="4759945" y="2715639"/>
-            <a:ext cx="1094190" cy="1338989"/>
+            <a:off x="4759945" y="2715640"/>
+            <a:ext cx="1094190" cy="1121538"/>
           </a:xfrm>
           <a:prstGeom prst="rect">
             <a:avLst/>
@@ -22065,7 +24918,7 @@
         </p:nvCxnSpPr>
         <p:spPr>
           <a:xfrm>
-            <a:off x="272956" y="4638135"/>
+            <a:off x="272956" y="4269427"/>
             <a:ext cx="11593902" cy="0"/>
           </a:xfrm>
           <a:prstGeom prst="line">
@@ -22103,7 +24956,7 @@
         <p:spPr>
           <a:xfrm>
             <a:off x="3357087" y="2715639"/>
-            <a:ext cx="1211339" cy="1338988"/>
+            <a:ext cx="1211339" cy="1159441"/>
           </a:xfrm>
           <a:prstGeom prst="rect">
             <a:avLst/>
@@ -22185,7 +25038,7 @@
         </p:nvSpPr>
         <p:spPr>
           <a:xfrm>
-            <a:off x="208604" y="4216412"/>
+            <a:off x="208604" y="3847704"/>
             <a:ext cx="1776448" cy="369332"/>
           </a:xfrm>
           <a:prstGeom prst="rect">
@@ -22290,8 +25143,8 @@
         </p:nvSpPr>
         <p:spPr>
           <a:xfrm>
-            <a:off x="6045654" y="2769768"/>
-            <a:ext cx="1373407" cy="1159443"/>
+            <a:off x="6045654" y="2677735"/>
+            <a:ext cx="1373407" cy="1159442"/>
           </a:xfrm>
           <a:prstGeom prst="rect">
             <a:avLst/>
@@ -22360,8 +25213,8 @@
         </p:nvSpPr>
         <p:spPr>
           <a:xfrm>
-            <a:off x="9282481" y="2809428"/>
-            <a:ext cx="1211339" cy="1159443"/>
+            <a:off x="9267732" y="2714455"/>
+            <a:ext cx="1211339" cy="1122722"/>
           </a:xfrm>
           <a:prstGeom prst="rect">
             <a:avLst/>
@@ -22418,10 +25271,10 @@
       </p:sp>
       <p:sp>
         <p:nvSpPr>
-          <p:cNvPr id="22" name="Rectangle 21">
-            <a:extLst>
-              <a:ext uri="{FF2B5EF4-FFF2-40B4-BE49-F238E27FC236}">
-                <a16:creationId xmlns:a16="http://schemas.microsoft.com/office/drawing/2014/main" id="{E11C1002-03A0-6843-8ADE-26854FF3C93F}"/>
+          <p:cNvPr id="27" name="Rectangle 26">
+            <a:extLst>
+              <a:ext uri="{FF2B5EF4-FFF2-40B4-BE49-F238E27FC236}">
+                <a16:creationId xmlns:a16="http://schemas.microsoft.com/office/drawing/2014/main" id="{C6D4C02E-1B39-AB4F-A714-7840701656BB}"/>
               </a:ext>
             </a:extLst>
           </p:cNvPr>
@@ -22430,77 +25283,7 @@
         </p:nvSpPr>
         <p:spPr>
           <a:xfrm>
-            <a:off x="343938" y="645340"/>
-            <a:ext cx="1211339" cy="1159443"/>
-          </a:xfrm>
-          <a:prstGeom prst="rect">
-            <a:avLst/>
-          </a:prstGeom>
-          <a:solidFill>
-            <a:srgbClr val="FFC000"/>
-          </a:solidFill>
-          <a:ln>
-            <a:solidFill>
-              <a:srgbClr val="FFC000"/>
-            </a:solidFill>
-          </a:ln>
-          <a:effectLst>
-            <a:outerShdw blurRad="50800" dist="38100" dir="5400000" algn="t" rotWithShape="0">
-              <a:prstClr val="black">
-                <a:alpha val="40000"/>
-              </a:prstClr>
-            </a:outerShdw>
-          </a:effectLst>
-        </p:spPr>
-        <p:style>
-          <a:lnRef idx="2">
-            <a:schemeClr val="accent1">
-              <a:shade val="50000"/>
-            </a:schemeClr>
-          </a:lnRef>
-          <a:fillRef idx="1">
-            <a:schemeClr val="accent1"/>
-          </a:fillRef>
-          <a:effectRef idx="0">
-            <a:schemeClr val="accent1"/>
-          </a:effectRef>
-          <a:fontRef idx="minor">
-            <a:schemeClr val="lt1"/>
-          </a:fontRef>
-        </p:style>
-        <p:txBody>
-          <a:bodyPr rtlCol="0" anchor="ctr"/>
-          <a:lstStyle/>
-          <a:p>
-            <a:pPr algn="ctr"/>
-            <a:r>
-              <a:rPr lang="en-US" sz="1200" dirty="0">
-                <a:solidFill>
-                  <a:schemeClr val="accent1">
-                    <a:lumMod val="50000"/>
-                  </a:schemeClr>
-                </a:solidFill>
-              </a:rPr>
-              <a:t>Good  order from retailer shop received</a:t>
-            </a:r>
-          </a:p>
-        </p:txBody>
-      </p:sp>
-      <p:sp>
-        <p:nvSpPr>
-          <p:cNvPr id="27" name="Rectangle 26">
-            <a:extLst>
-              <a:ext uri="{FF2B5EF4-FFF2-40B4-BE49-F238E27FC236}">
-                <a16:creationId xmlns:a16="http://schemas.microsoft.com/office/drawing/2014/main" id="{C6D4C02E-1B39-AB4F-A714-7840701656BB}"/>
-              </a:ext>
-            </a:extLst>
-          </p:cNvPr>
-          <p:cNvSpPr/>
-          <p:nvPr/>
-        </p:nvSpPr>
-        <p:spPr>
-          <a:xfrm>
-            <a:off x="5307040" y="4849021"/>
+            <a:off x="5307040" y="4480313"/>
             <a:ext cx="1211340" cy="1249218"/>
           </a:xfrm>
           <a:prstGeom prst="rect">
@@ -22570,7 +25353,7 @@
         </p:nvSpPr>
         <p:spPr>
           <a:xfrm>
-            <a:off x="6926092" y="4849021"/>
+            <a:off x="6926092" y="4480313"/>
             <a:ext cx="1211340" cy="1249218"/>
           </a:xfrm>
           <a:prstGeom prst="rect">
@@ -22640,7 +25423,7 @@
         </p:nvSpPr>
         <p:spPr>
           <a:xfrm>
-            <a:off x="8390129" y="4817221"/>
+            <a:off x="8390129" y="4448513"/>
             <a:ext cx="1211340" cy="1249218"/>
           </a:xfrm>
           <a:prstGeom prst="rect">
@@ -22710,7 +25493,7 @@
         </p:nvSpPr>
         <p:spPr>
           <a:xfrm>
-            <a:off x="10681611" y="4849021"/>
+            <a:off x="10681611" y="4480313"/>
             <a:ext cx="1211340" cy="1249218"/>
           </a:xfrm>
           <a:prstGeom prst="rect">

</xml_diff>

<commit_message>
Deployed 511404a with MkDocs version: 1.0.4
</commit_message>
<xml_diff>
--- a/analysis/kc-eventstorming.pptx
+++ b/analysis/kc-eventstorming.pptx
@@ -5,7 +5,7 @@
     <p:sldMasterId id="2147483648" r:id="rId1"/>
   </p:sldMasterIdLst>
   <p:notesMasterIdLst>
-    <p:notesMasterId r:id="rId23"/>
+    <p:notesMasterId r:id="rId22"/>
   </p:notesMasterIdLst>
   <p:sldIdLst>
     <p:sldId id="256" r:id="rId2"/>
@@ -25,10 +25,9 @@
     <p:sldId id="2729" r:id="rId16"/>
     <p:sldId id="2731" r:id="rId17"/>
     <p:sldId id="2747" r:id="rId18"/>
-    <p:sldId id="2732" r:id="rId19"/>
-    <p:sldId id="2730" r:id="rId20"/>
-    <p:sldId id="2745" r:id="rId21"/>
-    <p:sldId id="2746" r:id="rId22"/>
+    <p:sldId id="2730" r:id="rId19"/>
+    <p:sldId id="2745" r:id="rId20"/>
+    <p:sldId id="2746" r:id="rId21"/>
   </p:sldIdLst>
   <p:sldSz cx="12192000" cy="6858000"/>
   <p:notesSz cx="6858000" cy="9144000"/>
@@ -217,7 +216,7 @@
           <a:p>
             <a:fld id="{96F7C937-84DD-4C7A-9F78-8F66F9E47283}" type="datetimeFigureOut">
               <a:rPr lang="en-US" smtClean="0"/>
-              <a:t>9/14/19</a:t>
+              <a:t>9/19/19</a:t>
             </a:fld>
             <a:endParaRPr lang="en-US"/>
           </a:p>
@@ -800,7 +799,7 @@
           <a:p>
             <a:fld id="{7B96480C-D4FF-4D5B-ABA4-4D6837D6C648}" type="datetime1">
               <a:rPr lang="en-US" smtClean="0"/>
-              <a:t>9/14/19</a:t>
+              <a:t>9/19/19</a:t>
             </a:fld>
             <a:endParaRPr lang="en-US"/>
           </a:p>
@@ -998,7 +997,7 @@
           <a:p>
             <a:fld id="{2B0CB159-0D74-4138-B60D-46734C7189CF}" type="datetime1">
               <a:rPr lang="en-US" smtClean="0"/>
-              <a:t>9/14/19</a:t>
+              <a:t>9/19/19</a:t>
             </a:fld>
             <a:endParaRPr lang="en-US"/>
           </a:p>
@@ -1206,7 +1205,7 @@
           <a:p>
             <a:fld id="{86F74E00-A3D9-49B2-92EE-F6E2B61C4694}" type="datetime1">
               <a:rPr lang="en-US" smtClean="0"/>
-              <a:t>9/14/19</a:t>
+              <a:t>9/19/19</a:t>
             </a:fld>
             <a:endParaRPr lang="en-US"/>
           </a:p>
@@ -1404,7 +1403,7 @@
           <a:p>
             <a:fld id="{A29C9B81-F5CF-4CDA-9CEC-028BA81B2A6E}" type="datetime1">
               <a:rPr lang="en-US" smtClean="0"/>
-              <a:t>9/14/19</a:t>
+              <a:t>9/19/19</a:t>
             </a:fld>
             <a:endParaRPr lang="en-US"/>
           </a:p>
@@ -1679,7 +1678,7 @@
           <a:p>
             <a:fld id="{52145163-3C70-466E-906B-2D77BA0C333D}" type="datetime1">
               <a:rPr lang="en-US" smtClean="0"/>
-              <a:t>9/14/19</a:t>
+              <a:t>9/19/19</a:t>
             </a:fld>
             <a:endParaRPr lang="en-US"/>
           </a:p>
@@ -1944,7 +1943,7 @@
           <a:p>
             <a:fld id="{9FB606A8-AA48-4381-B480-A7AEFF509F86}" type="datetime1">
               <a:rPr lang="en-US" smtClean="0"/>
-              <a:t>9/14/19</a:t>
+              <a:t>9/19/19</a:t>
             </a:fld>
             <a:endParaRPr lang="en-US"/>
           </a:p>
@@ -2356,7 +2355,7 @@
           <a:p>
             <a:fld id="{9BA70369-C48D-428A-89D3-F6AB96F8E2CB}" type="datetime1">
               <a:rPr lang="en-US" smtClean="0"/>
-              <a:t>9/14/19</a:t>
+              <a:t>9/19/19</a:t>
             </a:fld>
             <a:endParaRPr lang="en-US"/>
           </a:p>
@@ -2497,7 +2496,7 @@
           <a:p>
             <a:fld id="{E5C6C4CC-783D-487E-9A23-3CB2EC84C407}" type="datetime1">
               <a:rPr lang="en-US" smtClean="0"/>
-              <a:t>9/14/19</a:t>
+              <a:t>9/19/19</a:t>
             </a:fld>
             <a:endParaRPr lang="en-US"/>
           </a:p>
@@ -2610,7 +2609,7 @@
           <a:p>
             <a:fld id="{5FC39CF2-C652-4D61-A0C7-12EEBAD43262}" type="datetime1">
               <a:rPr lang="en-US" smtClean="0"/>
-              <a:t>9/14/19</a:t>
+              <a:t>9/19/19</a:t>
             </a:fld>
             <a:endParaRPr lang="en-US"/>
           </a:p>
@@ -2921,7 +2920,7 @@
           <a:p>
             <a:fld id="{D0117E5F-4046-4A29-BA38-71ADE6C0BF60}" type="datetime1">
               <a:rPr lang="en-US" smtClean="0"/>
-              <a:t>9/14/19</a:t>
+              <a:t>9/19/19</a:t>
             </a:fld>
             <a:endParaRPr lang="en-US"/>
           </a:p>
@@ -3209,7 +3208,7 @@
           <a:p>
             <a:fld id="{45A4B8E9-EDAD-4893-841E-969713864D5C}" type="datetime1">
               <a:rPr lang="en-US" smtClean="0"/>
-              <a:t>9/14/19</a:t>
+              <a:t>9/19/19</a:t>
             </a:fld>
             <a:endParaRPr lang="en-US"/>
           </a:p>
@@ -3450,7 +3449,7 @@
           <a:p>
             <a:fld id="{AE38EC32-B703-4DCD-92CB-6CEE84524E24}" type="datetime1">
               <a:rPr lang="en-US" smtClean="0"/>
-              <a:t>9/14/19</a:t>
+              <a:t>9/19/19</a:t>
             </a:fld>
             <a:endParaRPr lang="en-US"/>
           </a:p>
@@ -19437,341 +19436,6 @@
       </p:grpSpPr>
       <p:sp>
         <p:nvSpPr>
-          <p:cNvPr id="2" name="Slide Number Placeholder 1">
-            <a:extLst>
-              <a:ext uri="{FF2B5EF4-FFF2-40B4-BE49-F238E27FC236}">
-                <a16:creationId xmlns:a16="http://schemas.microsoft.com/office/drawing/2014/main" id="{0D38B019-00EE-A649-AC0A-3E8CD5A46B05}"/>
-              </a:ext>
-            </a:extLst>
-          </p:cNvPr>
-          <p:cNvSpPr>
-            <a:spLocks noGrp="1"/>
-          </p:cNvSpPr>
-          <p:nvPr>
-            <p:ph type="sldNum" sz="quarter" idx="12"/>
-          </p:nvPr>
-        </p:nvSpPr>
-        <p:spPr/>
-        <p:txBody>
-          <a:bodyPr/>
-          <a:lstStyle/>
-          <a:p>
-            <a:fld id="{C565C23E-6D76-459C-BC14-A9049E4EE889}" type="slidenum">
-              <a:rPr lang="en-US" smtClean="0"/>
-              <a:t>18</a:t>
-            </a:fld>
-            <a:endParaRPr lang="en-US"/>
-          </a:p>
-        </p:txBody>
-      </p:sp>
-      <p:sp>
-        <p:nvSpPr>
-          <p:cNvPr id="10" name="Rectangle 9">
-            <a:extLst>
-              <a:ext uri="{FF2B5EF4-FFF2-40B4-BE49-F238E27FC236}">
-                <a16:creationId xmlns:a16="http://schemas.microsoft.com/office/drawing/2014/main" id="{C6FB49FE-0AC0-9240-8F38-7DD725E4E8AE}"/>
-              </a:ext>
-            </a:extLst>
-          </p:cNvPr>
-          <p:cNvSpPr/>
-          <p:nvPr/>
-        </p:nvSpPr>
-        <p:spPr>
-          <a:xfrm>
-            <a:off x="514881" y="1225365"/>
-            <a:ext cx="1626730" cy="2004532"/>
-          </a:xfrm>
-          <a:prstGeom prst="rect">
-            <a:avLst/>
-          </a:prstGeom>
-          <a:solidFill>
-            <a:schemeClr val="accent6"/>
-          </a:solidFill>
-          <a:ln>
-            <a:noFill/>
-          </a:ln>
-          <a:effectLst>
-            <a:outerShdw blurRad="50800" dist="38100" dir="5400000" algn="t" rotWithShape="0">
-              <a:prstClr val="black">
-                <a:alpha val="40000"/>
-              </a:prstClr>
-            </a:outerShdw>
-          </a:effectLst>
-        </p:spPr>
-        <p:style>
-          <a:lnRef idx="2">
-            <a:schemeClr val="accent1">
-              <a:shade val="50000"/>
-            </a:schemeClr>
-          </a:lnRef>
-          <a:fillRef idx="1">
-            <a:schemeClr val="accent1"/>
-          </a:fillRef>
-          <a:effectRef idx="0">
-            <a:schemeClr val="accent1"/>
-          </a:effectRef>
-          <a:fontRef idx="minor">
-            <a:schemeClr val="lt1"/>
-          </a:fontRef>
-        </p:style>
-        <p:txBody>
-          <a:bodyPr rtlCol="0" anchor="t"/>
-          <a:lstStyle/>
-          <a:p>
-            <a:pPr algn="ctr"/>
-            <a:r>
-              <a:rPr lang="en-US" b="1" dirty="0">
-                <a:solidFill>
-                  <a:schemeClr val="bg1"/>
-                </a:solidFill>
-              </a:rPr>
-              <a:t>Shipping Order</a:t>
-            </a:r>
-          </a:p>
-          <a:p>
-            <a:pPr algn="ctr"/>
-            <a:endParaRPr lang="en-US" b="1" dirty="0">
-              <a:solidFill>
-                <a:schemeClr val="bg1"/>
-              </a:solidFill>
-            </a:endParaRPr>
-          </a:p>
-          <a:p>
-            <a:r>
-              <a:rPr lang="en-US" sz="1400" dirty="0" err="1">
-                <a:solidFill>
-                  <a:schemeClr val="bg1"/>
-                </a:solidFill>
-              </a:rPr>
-              <a:t>orderID</a:t>
-            </a:r>
-            <a:endParaRPr lang="en-US" sz="1400" dirty="0">
-              <a:solidFill>
-                <a:schemeClr val="bg1"/>
-              </a:solidFill>
-            </a:endParaRPr>
-          </a:p>
-          <a:p>
-            <a:r>
-              <a:rPr lang="en-US" sz="1400" dirty="0" err="1">
-                <a:solidFill>
-                  <a:schemeClr val="bg1"/>
-                </a:solidFill>
-              </a:rPr>
-              <a:t>orignAddress</a:t>
-            </a:r>
-            <a:endParaRPr lang="en-US" sz="1400" dirty="0">
-              <a:solidFill>
-                <a:schemeClr val="bg1"/>
-              </a:solidFill>
-            </a:endParaRPr>
-          </a:p>
-          <a:p>
-            <a:r>
-              <a:rPr lang="en-US" sz="1400" dirty="0" err="1">
-                <a:solidFill>
-                  <a:schemeClr val="bg1"/>
-                </a:solidFill>
-              </a:rPr>
-              <a:t>destinationAddress</a:t>
-            </a:r>
-            <a:endParaRPr lang="en-US" sz="1400" dirty="0">
-              <a:solidFill>
-                <a:schemeClr val="bg1"/>
-              </a:solidFill>
-            </a:endParaRPr>
-          </a:p>
-          <a:p>
-            <a:r>
-              <a:rPr lang="en-US" sz="1400" dirty="0" err="1">
-                <a:solidFill>
-                  <a:schemeClr val="bg1"/>
-                </a:solidFill>
-              </a:rPr>
-              <a:t>cargoType</a:t>
-            </a:r>
-            <a:endParaRPr lang="en-US" sz="1400" dirty="0">
-              <a:solidFill>
-                <a:schemeClr val="bg1"/>
-              </a:solidFill>
-            </a:endParaRPr>
-          </a:p>
-          <a:p>
-            <a:r>
-              <a:rPr lang="en-US" sz="1400" dirty="0">
-                <a:solidFill>
-                  <a:schemeClr val="bg1"/>
-                </a:solidFill>
-              </a:rPr>
-              <a:t>quantity</a:t>
-            </a:r>
-          </a:p>
-        </p:txBody>
-      </p:sp>
-      <p:sp>
-        <p:nvSpPr>
-          <p:cNvPr id="11" name="Rectangle 10">
-            <a:extLst>
-              <a:ext uri="{FF2B5EF4-FFF2-40B4-BE49-F238E27FC236}">
-                <a16:creationId xmlns:a16="http://schemas.microsoft.com/office/drawing/2014/main" id="{778DE887-D624-9D47-8F60-D56D3B1936E9}"/>
-              </a:ext>
-            </a:extLst>
-          </p:cNvPr>
-          <p:cNvSpPr/>
-          <p:nvPr/>
-        </p:nvSpPr>
-        <p:spPr>
-          <a:xfrm>
-            <a:off x="8264013" y="1294898"/>
-            <a:ext cx="1512657" cy="607644"/>
-          </a:xfrm>
-          <a:prstGeom prst="rect">
-            <a:avLst/>
-          </a:prstGeom>
-          <a:solidFill>
-            <a:schemeClr val="accent6"/>
-          </a:solidFill>
-          <a:ln>
-            <a:noFill/>
-          </a:ln>
-          <a:effectLst>
-            <a:outerShdw blurRad="50800" dist="38100" dir="5400000" algn="t" rotWithShape="0">
-              <a:prstClr val="black">
-                <a:alpha val="40000"/>
-              </a:prstClr>
-            </a:outerShdw>
-          </a:effectLst>
-        </p:spPr>
-        <p:style>
-          <a:lnRef idx="2">
-            <a:schemeClr val="accent1">
-              <a:shade val="50000"/>
-            </a:schemeClr>
-          </a:lnRef>
-          <a:fillRef idx="1">
-            <a:schemeClr val="accent1"/>
-          </a:fillRef>
-          <a:effectRef idx="0">
-            <a:schemeClr val="accent1"/>
-          </a:effectRef>
-          <a:fontRef idx="minor">
-            <a:schemeClr val="lt1"/>
-          </a:fontRef>
-        </p:style>
-        <p:txBody>
-          <a:bodyPr rtlCol="0" anchor="ctr"/>
-          <a:lstStyle/>
-          <a:p>
-            <a:pPr algn="ctr"/>
-            <a:r>
-              <a:rPr lang="en-US" b="1" dirty="0">
-                <a:solidFill>
-                  <a:schemeClr val="bg1"/>
-                </a:solidFill>
-              </a:rPr>
-              <a:t>Reefer Container</a:t>
-            </a:r>
-          </a:p>
-        </p:txBody>
-      </p:sp>
-      <p:sp>
-        <p:nvSpPr>
-          <p:cNvPr id="12" name="Rectangle 11">
-            <a:extLst>
-              <a:ext uri="{FF2B5EF4-FFF2-40B4-BE49-F238E27FC236}">
-                <a16:creationId xmlns:a16="http://schemas.microsoft.com/office/drawing/2014/main" id="{9833BC8C-2483-2E43-ABD8-484D2A2FE049}"/>
-              </a:ext>
-            </a:extLst>
-          </p:cNvPr>
-          <p:cNvSpPr/>
-          <p:nvPr/>
-        </p:nvSpPr>
-        <p:spPr>
-          <a:xfrm>
-            <a:off x="5080664" y="1225365"/>
-            <a:ext cx="1512657" cy="607644"/>
-          </a:xfrm>
-          <a:prstGeom prst="rect">
-            <a:avLst/>
-          </a:prstGeom>
-          <a:solidFill>
-            <a:schemeClr val="accent6"/>
-          </a:solidFill>
-          <a:ln>
-            <a:noFill/>
-          </a:ln>
-          <a:effectLst>
-            <a:outerShdw blurRad="50800" dist="38100" dir="5400000" algn="t" rotWithShape="0">
-              <a:prstClr val="black">
-                <a:alpha val="40000"/>
-              </a:prstClr>
-            </a:outerShdw>
-          </a:effectLst>
-        </p:spPr>
-        <p:style>
-          <a:lnRef idx="2">
-            <a:schemeClr val="accent1">
-              <a:shade val="50000"/>
-            </a:schemeClr>
-          </a:lnRef>
-          <a:fillRef idx="1">
-            <a:schemeClr val="accent1"/>
-          </a:fillRef>
-          <a:effectRef idx="0">
-            <a:schemeClr val="accent1"/>
-          </a:effectRef>
-          <a:fontRef idx="minor">
-            <a:schemeClr val="lt1"/>
-          </a:fontRef>
-        </p:style>
-        <p:txBody>
-          <a:bodyPr rtlCol="0" anchor="ctr"/>
-          <a:lstStyle/>
-          <a:p>
-            <a:pPr algn="ctr"/>
-            <a:r>
-              <a:rPr lang="en-US" b="1" dirty="0">
-                <a:solidFill>
-                  <a:schemeClr val="bg1"/>
-                </a:solidFill>
-              </a:rPr>
-              <a:t>Cargo</a:t>
-            </a:r>
-          </a:p>
-        </p:txBody>
-      </p:sp>
-    </p:spTree>
-    <p:extLst>
-      <p:ext uri="{BB962C8B-B14F-4D97-AF65-F5344CB8AC3E}">
-        <p14:creationId xmlns:p14="http://schemas.microsoft.com/office/powerpoint/2010/main" val="3418346959"/>
-      </p:ext>
-    </p:extLst>
-  </p:cSld>
-  <p:clrMapOvr>
-    <a:masterClrMapping/>
-  </p:clrMapOvr>
-</p:sld>
-</file>
-
-<file path=ppt/slides/slide19.xml><?xml version="1.0" encoding="utf-8"?>
-<p:sld xmlns:a="http://schemas.openxmlformats.org/drawingml/2006/main" xmlns:r="http://schemas.openxmlformats.org/officeDocument/2006/relationships" xmlns:p="http://schemas.openxmlformats.org/presentationml/2006/main">
-  <p:cSld>
-    <p:spTree>
-      <p:nvGrpSpPr>
-        <p:cNvPr id="1" name=""/>
-        <p:cNvGrpSpPr/>
-        <p:nvPr/>
-      </p:nvGrpSpPr>
-      <p:grpSpPr>
-        <a:xfrm>
-          <a:off x="0" y="0"/>
-          <a:ext cx="0" cy="0"/>
-          <a:chOff x="0" y="0"/>
-          <a:chExt cx="0" cy="0"/>
-        </a:xfrm>
-      </p:grpSpPr>
-      <p:sp>
-        <p:nvSpPr>
           <p:cNvPr id="7" name="Rectangle 6">
             <a:extLst>
               <a:ext uri="{FF2B5EF4-FFF2-40B4-BE49-F238E27FC236}">
@@ -23069,6 +22733,115 @@
 </p:sld>
 </file>
 
+<file path=ppt/slides/slide19.xml><?xml version="1.0" encoding="utf-8"?>
+<p:sld xmlns:a="http://schemas.openxmlformats.org/drawingml/2006/main" xmlns:r="http://schemas.openxmlformats.org/officeDocument/2006/relationships" xmlns:p="http://schemas.openxmlformats.org/presentationml/2006/main">
+  <p:cSld>
+    <p:spTree>
+      <p:nvGrpSpPr>
+        <p:cNvPr id="1" name=""/>
+        <p:cNvGrpSpPr/>
+        <p:nvPr/>
+      </p:nvGrpSpPr>
+      <p:grpSpPr>
+        <a:xfrm>
+          <a:off x="0" y="0"/>
+          <a:ext cx="0" cy="0"/>
+          <a:chOff x="0" y="0"/>
+          <a:chExt cx="0" cy="0"/>
+        </a:xfrm>
+      </p:grpSpPr>
+      <p:sp>
+        <p:nvSpPr>
+          <p:cNvPr id="2" name="Title 1">
+            <a:extLst>
+              <a:ext uri="{FF2B5EF4-FFF2-40B4-BE49-F238E27FC236}">
+                <a16:creationId xmlns:a16="http://schemas.microsoft.com/office/drawing/2014/main" id="{3BF2670A-2950-1340-B6EE-97587A2F9992}"/>
+              </a:ext>
+            </a:extLst>
+          </p:cNvPr>
+          <p:cNvSpPr>
+            <a:spLocks noGrp="1"/>
+          </p:cNvSpPr>
+          <p:nvPr>
+            <p:ph type="title"/>
+          </p:nvPr>
+        </p:nvSpPr>
+        <p:spPr/>
+        <p:txBody>
+          <a:bodyPr/>
+          <a:lstStyle/>
+          <a:p>
+            <a:endParaRPr lang="en-US"/>
+          </a:p>
+        </p:txBody>
+      </p:sp>
+      <p:sp>
+        <p:nvSpPr>
+          <p:cNvPr id="3" name="Content Placeholder 2">
+            <a:extLst>
+              <a:ext uri="{FF2B5EF4-FFF2-40B4-BE49-F238E27FC236}">
+                <a16:creationId xmlns:a16="http://schemas.microsoft.com/office/drawing/2014/main" id="{B9D0A971-1119-0A4C-9181-CDB26615A191}"/>
+              </a:ext>
+            </a:extLst>
+          </p:cNvPr>
+          <p:cNvSpPr>
+            <a:spLocks noGrp="1"/>
+          </p:cNvSpPr>
+          <p:nvPr>
+            <p:ph idx="1"/>
+          </p:nvPr>
+        </p:nvSpPr>
+        <p:spPr/>
+        <p:txBody>
+          <a:bodyPr/>
+          <a:lstStyle/>
+          <a:p>
+            <a:endParaRPr lang="en-US"/>
+          </a:p>
+        </p:txBody>
+      </p:sp>
+      <p:sp>
+        <p:nvSpPr>
+          <p:cNvPr id="4" name="Slide Number Placeholder 3">
+            <a:extLst>
+              <a:ext uri="{FF2B5EF4-FFF2-40B4-BE49-F238E27FC236}">
+                <a16:creationId xmlns:a16="http://schemas.microsoft.com/office/drawing/2014/main" id="{29C51F41-0CC3-7242-A398-33D1F881DFB9}"/>
+              </a:ext>
+            </a:extLst>
+          </p:cNvPr>
+          <p:cNvSpPr>
+            <a:spLocks noGrp="1"/>
+          </p:cNvSpPr>
+          <p:nvPr>
+            <p:ph type="sldNum" sz="quarter" idx="12"/>
+          </p:nvPr>
+        </p:nvSpPr>
+        <p:spPr/>
+        <p:txBody>
+          <a:bodyPr/>
+          <a:lstStyle/>
+          <a:p>
+            <a:fld id="{C565C23E-6D76-459C-BC14-A9049E4EE889}" type="slidenum">
+              <a:rPr lang="en-US" smtClean="0"/>
+              <a:t>19</a:t>
+            </a:fld>
+            <a:endParaRPr lang="en-US"/>
+          </a:p>
+        </p:txBody>
+      </p:sp>
+    </p:spTree>
+    <p:extLst>
+      <p:ext uri="{BB962C8B-B14F-4D97-AF65-F5344CB8AC3E}">
+        <p14:creationId xmlns:p14="http://schemas.microsoft.com/office/powerpoint/2010/main" val="2601410627"/>
+      </p:ext>
+    </p:extLst>
+  </p:cSld>
+  <p:clrMapOvr>
+    <a:masterClrMapping/>
+  </p:clrMapOvr>
+</p:sld>
+</file>
+
 <file path=ppt/slides/slide2.xml><?xml version="1.0" encoding="utf-8"?>
 <p:sld xmlns:a="http://schemas.openxmlformats.org/drawingml/2006/main" xmlns:r="http://schemas.openxmlformats.org/officeDocument/2006/relationships" xmlns:p="http://schemas.openxmlformats.org/presentationml/2006/main">
   <p:cSld>
@@ -23229,115 +23002,6 @@
 </file>
 
 <file path=ppt/slides/slide20.xml><?xml version="1.0" encoding="utf-8"?>
-<p:sld xmlns:a="http://schemas.openxmlformats.org/drawingml/2006/main" xmlns:r="http://schemas.openxmlformats.org/officeDocument/2006/relationships" xmlns:p="http://schemas.openxmlformats.org/presentationml/2006/main">
-  <p:cSld>
-    <p:spTree>
-      <p:nvGrpSpPr>
-        <p:cNvPr id="1" name=""/>
-        <p:cNvGrpSpPr/>
-        <p:nvPr/>
-      </p:nvGrpSpPr>
-      <p:grpSpPr>
-        <a:xfrm>
-          <a:off x="0" y="0"/>
-          <a:ext cx="0" cy="0"/>
-          <a:chOff x="0" y="0"/>
-          <a:chExt cx="0" cy="0"/>
-        </a:xfrm>
-      </p:grpSpPr>
-      <p:sp>
-        <p:nvSpPr>
-          <p:cNvPr id="2" name="Title 1">
-            <a:extLst>
-              <a:ext uri="{FF2B5EF4-FFF2-40B4-BE49-F238E27FC236}">
-                <a16:creationId xmlns:a16="http://schemas.microsoft.com/office/drawing/2014/main" id="{3BF2670A-2950-1340-B6EE-97587A2F9992}"/>
-              </a:ext>
-            </a:extLst>
-          </p:cNvPr>
-          <p:cNvSpPr>
-            <a:spLocks noGrp="1"/>
-          </p:cNvSpPr>
-          <p:nvPr>
-            <p:ph type="title"/>
-          </p:nvPr>
-        </p:nvSpPr>
-        <p:spPr/>
-        <p:txBody>
-          <a:bodyPr/>
-          <a:lstStyle/>
-          <a:p>
-            <a:endParaRPr lang="en-US"/>
-          </a:p>
-        </p:txBody>
-      </p:sp>
-      <p:sp>
-        <p:nvSpPr>
-          <p:cNvPr id="3" name="Content Placeholder 2">
-            <a:extLst>
-              <a:ext uri="{FF2B5EF4-FFF2-40B4-BE49-F238E27FC236}">
-                <a16:creationId xmlns:a16="http://schemas.microsoft.com/office/drawing/2014/main" id="{B9D0A971-1119-0A4C-9181-CDB26615A191}"/>
-              </a:ext>
-            </a:extLst>
-          </p:cNvPr>
-          <p:cNvSpPr>
-            <a:spLocks noGrp="1"/>
-          </p:cNvSpPr>
-          <p:nvPr>
-            <p:ph idx="1"/>
-          </p:nvPr>
-        </p:nvSpPr>
-        <p:spPr/>
-        <p:txBody>
-          <a:bodyPr/>
-          <a:lstStyle/>
-          <a:p>
-            <a:endParaRPr lang="en-US"/>
-          </a:p>
-        </p:txBody>
-      </p:sp>
-      <p:sp>
-        <p:nvSpPr>
-          <p:cNvPr id="4" name="Slide Number Placeholder 3">
-            <a:extLst>
-              <a:ext uri="{FF2B5EF4-FFF2-40B4-BE49-F238E27FC236}">
-                <a16:creationId xmlns:a16="http://schemas.microsoft.com/office/drawing/2014/main" id="{29C51F41-0CC3-7242-A398-33D1F881DFB9}"/>
-              </a:ext>
-            </a:extLst>
-          </p:cNvPr>
-          <p:cNvSpPr>
-            <a:spLocks noGrp="1"/>
-          </p:cNvSpPr>
-          <p:nvPr>
-            <p:ph type="sldNum" sz="quarter" idx="12"/>
-          </p:nvPr>
-        </p:nvSpPr>
-        <p:spPr/>
-        <p:txBody>
-          <a:bodyPr/>
-          <a:lstStyle/>
-          <a:p>
-            <a:fld id="{C565C23E-6D76-459C-BC14-A9049E4EE889}" type="slidenum">
-              <a:rPr lang="en-US" smtClean="0"/>
-              <a:t>20</a:t>
-            </a:fld>
-            <a:endParaRPr lang="en-US"/>
-          </a:p>
-        </p:txBody>
-      </p:sp>
-    </p:spTree>
-    <p:extLst>
-      <p:ext uri="{BB962C8B-B14F-4D97-AF65-F5344CB8AC3E}">
-        <p14:creationId xmlns:p14="http://schemas.microsoft.com/office/powerpoint/2010/main" val="2601410627"/>
-      </p:ext>
-    </p:extLst>
-  </p:cSld>
-  <p:clrMapOvr>
-    <a:masterClrMapping/>
-  </p:clrMapOvr>
-</p:sld>
-</file>
-
-<file path=ppt/slides/slide21.xml><?xml version="1.0" encoding="utf-8"?>
 <p:sld xmlns:a="http://schemas.openxmlformats.org/drawingml/2006/main" xmlns:r="http://schemas.openxmlformats.org/officeDocument/2006/relationships" xmlns:p="http://schemas.openxmlformats.org/presentationml/2006/main">
   <p:cSld>
     <p:spTree>

</xml_diff>

<commit_message>
Deployed fcd8a5b with MkDocs version: 1.0.4
</commit_message>
<xml_diff>
--- a/analysis/kc-eventstorming.pptx
+++ b/analysis/kc-eventstorming.pptx
@@ -222,7 +222,7 @@
           <a:p>
             <a:fld id="{96F7C937-84DD-4C7A-9F78-8F66F9E47283}" type="datetimeFigureOut">
               <a:rPr lang="en-US" smtClean="0"/>
-              <a:t>10/31/19</a:t>
+              <a:t>2/21/20</a:t>
             </a:fld>
             <a:endParaRPr lang="en-US"/>
           </a:p>
@@ -1585,7 +1585,7 @@
           <a:p>
             <a:fld id="{7B96480C-D4FF-4D5B-ABA4-4D6837D6C648}" type="datetime1">
               <a:rPr lang="en-US" smtClean="0"/>
-              <a:t>10/31/19</a:t>
+              <a:t>2/21/20</a:t>
             </a:fld>
             <a:endParaRPr lang="en-US"/>
           </a:p>
@@ -1783,7 +1783,7 @@
           <a:p>
             <a:fld id="{2B0CB159-0D74-4138-B60D-46734C7189CF}" type="datetime1">
               <a:rPr lang="en-US" smtClean="0"/>
-              <a:t>10/31/19</a:t>
+              <a:t>2/21/20</a:t>
             </a:fld>
             <a:endParaRPr lang="en-US"/>
           </a:p>
@@ -1991,7 +1991,7 @@
           <a:p>
             <a:fld id="{86F74E00-A3D9-49B2-92EE-F6E2B61C4694}" type="datetime1">
               <a:rPr lang="en-US" smtClean="0"/>
-              <a:t>10/31/19</a:t>
+              <a:t>2/21/20</a:t>
             </a:fld>
             <a:endParaRPr lang="en-US"/>
           </a:p>
@@ -2189,7 +2189,7 @@
           <a:p>
             <a:fld id="{A29C9B81-F5CF-4CDA-9CEC-028BA81B2A6E}" type="datetime1">
               <a:rPr lang="en-US" smtClean="0"/>
-              <a:t>10/31/19</a:t>
+              <a:t>2/21/20</a:t>
             </a:fld>
             <a:endParaRPr lang="en-US"/>
           </a:p>
@@ -2464,7 +2464,7 @@
           <a:p>
             <a:fld id="{52145163-3C70-466E-906B-2D77BA0C333D}" type="datetime1">
               <a:rPr lang="en-US" smtClean="0"/>
-              <a:t>10/31/19</a:t>
+              <a:t>2/21/20</a:t>
             </a:fld>
             <a:endParaRPr lang="en-US"/>
           </a:p>
@@ -2729,7 +2729,7 @@
           <a:p>
             <a:fld id="{9FB606A8-AA48-4381-B480-A7AEFF509F86}" type="datetime1">
               <a:rPr lang="en-US" smtClean="0"/>
-              <a:t>10/31/19</a:t>
+              <a:t>2/21/20</a:t>
             </a:fld>
             <a:endParaRPr lang="en-US"/>
           </a:p>
@@ -3141,7 +3141,7 @@
           <a:p>
             <a:fld id="{9BA70369-C48D-428A-89D3-F6AB96F8E2CB}" type="datetime1">
               <a:rPr lang="en-US" smtClean="0"/>
-              <a:t>10/31/19</a:t>
+              <a:t>2/21/20</a:t>
             </a:fld>
             <a:endParaRPr lang="en-US"/>
           </a:p>
@@ -3282,7 +3282,7 @@
           <a:p>
             <a:fld id="{E5C6C4CC-783D-487E-9A23-3CB2EC84C407}" type="datetime1">
               <a:rPr lang="en-US" smtClean="0"/>
-              <a:t>10/31/19</a:t>
+              <a:t>2/21/20</a:t>
             </a:fld>
             <a:endParaRPr lang="en-US"/>
           </a:p>
@@ -3395,7 +3395,7 @@
           <a:p>
             <a:fld id="{5FC39CF2-C652-4D61-A0C7-12EEBAD43262}" type="datetime1">
               <a:rPr lang="en-US" smtClean="0"/>
-              <a:t>10/31/19</a:t>
+              <a:t>2/21/20</a:t>
             </a:fld>
             <a:endParaRPr lang="en-US"/>
           </a:p>
@@ -3706,7 +3706,7 @@
           <a:p>
             <a:fld id="{D0117E5F-4046-4A29-BA38-71ADE6C0BF60}" type="datetime1">
               <a:rPr lang="en-US" smtClean="0"/>
-              <a:t>10/31/19</a:t>
+              <a:t>2/21/20</a:t>
             </a:fld>
             <a:endParaRPr lang="en-US"/>
           </a:p>
@@ -3994,7 +3994,7 @@
           <a:p>
             <a:fld id="{45A4B8E9-EDAD-4893-841E-969713864D5C}" type="datetime1">
               <a:rPr lang="en-US" smtClean="0"/>
-              <a:t>10/31/19</a:t>
+              <a:t>2/21/20</a:t>
             </a:fld>
             <a:endParaRPr lang="en-US"/>
           </a:p>
@@ -4235,7 +4235,7 @@
           <a:p>
             <a:fld id="{AE38EC32-B703-4DCD-92CB-6CEE84524E24}" type="datetime1">
               <a:rPr lang="en-US" smtClean="0"/>
-              <a:t>10/31/19</a:t>
+              <a:t>2/21/20</a:t>
             </a:fld>
             <a:endParaRPr lang="en-US"/>
           </a:p>
@@ -9069,8 +9069,8 @@
         </p:nvSpPr>
         <p:spPr>
           <a:xfrm>
-            <a:off x="7019073" y="4478988"/>
-            <a:ext cx="1094190" cy="1338989"/>
+            <a:off x="3971311" y="3833966"/>
+            <a:ext cx="1592075" cy="708537"/>
           </a:xfrm>
           <a:prstGeom prst="rect">
             <a:avLst/>
@@ -9139,8 +9139,8 @@
         </p:nvSpPr>
         <p:spPr>
           <a:xfrm>
-            <a:off x="4352048" y="3809495"/>
-            <a:ext cx="1211339" cy="1338988"/>
+            <a:off x="6300446" y="4448060"/>
+            <a:ext cx="1356169" cy="759734"/>
           </a:xfrm>
           <a:prstGeom prst="rect">
             <a:avLst/>
@@ -9266,7 +9266,7 @@
                   </a:schemeClr>
                 </a:solidFill>
               </a:rPr>
-              <a:t>Whenever shipment order placed, reserve voyage </a:t>
+              <a:t>Whenever shipment order placed, reserve a container </a:t>
             </a:r>
           </a:p>
         </p:txBody>
@@ -9285,7 +9285,7 @@
         </p:nvSpPr>
         <p:spPr>
           <a:xfrm>
-            <a:off x="5604526" y="3899266"/>
+            <a:off x="6283208" y="3254244"/>
             <a:ext cx="1373407" cy="1159443"/>
           </a:xfrm>
           <a:prstGeom prst="rect">
@@ -9329,7 +9329,7 @@
                   </a:schemeClr>
                 </a:solidFill>
               </a:rPr>
-              <a:t>Whenever a voyage is selected reserve reefer container</a:t>
+              <a:t>Whenever a container is selected reserve voyage</a:t>
             </a:r>
           </a:p>
         </p:txBody>
@@ -9411,7 +9411,7 @@
         </p:nvSpPr>
         <p:spPr>
           <a:xfrm>
-            <a:off x="3795909" y="5239249"/>
+            <a:off x="7770766" y="4448060"/>
             <a:ext cx="1211339" cy="556522"/>
           </a:xfrm>
           <a:prstGeom prst="rect">
@@ -9482,7 +9482,7 @@
         </p:nvSpPr>
         <p:spPr>
           <a:xfrm>
-            <a:off x="7368207" y="3809495"/>
+            <a:off x="3971311" y="4651272"/>
             <a:ext cx="1211339" cy="556522"/>
           </a:xfrm>
           <a:prstGeom prst="rect">
@@ -32758,7 +32758,7 @@
         </p:nvSpPr>
         <p:spPr>
           <a:xfrm>
-            <a:off x="10507582" y="3547318"/>
+            <a:off x="10655065" y="2925080"/>
             <a:ext cx="1211340" cy="1249218"/>
           </a:xfrm>
           <a:prstGeom prst="rect">

</xml_diff>

<commit_message>
Deployed 1b57787 with MkDocs version: 1.0.4
</commit_message>
<xml_diff>
--- a/analysis/kc-eventstorming.pptx
+++ b/analysis/kc-eventstorming.pptx
@@ -23,7 +23,7 @@
     <p:sldId id="2744" r:id="rId14"/>
     <p:sldId id="2739" r:id="rId15"/>
     <p:sldId id="2741" r:id="rId16"/>
-    <p:sldId id="2748" r:id="rId17"/>
+    <p:sldId id="141168483" r:id="rId17"/>
     <p:sldId id="2743" r:id="rId18"/>
     <p:sldId id="2740" r:id="rId19"/>
     <p:sldId id="2783" r:id="rId20"/>
@@ -222,7 +222,7 @@
           <a:p>
             <a:fld id="{96F7C937-84DD-4C7A-9F78-8F66F9E47283}" type="datetimeFigureOut">
               <a:rPr lang="en-US" smtClean="0"/>
-              <a:t>2/21/20</a:t>
+              <a:t>2/29/20</a:t>
             </a:fld>
             <a:endParaRPr lang="en-US"/>
           </a:p>
@@ -1313,6 +1313,96 @@
           <a:bodyPr/>
           <a:lstStyle/>
           <a:p>
+            <a:endParaRPr lang="en-US" dirty="0"/>
+          </a:p>
+        </p:txBody>
+      </p:sp>
+      <p:sp>
+        <p:nvSpPr>
+          <p:cNvPr id="4" name="Slide Number Placeholder 3"/>
+          <p:cNvSpPr>
+            <a:spLocks noGrp="1"/>
+          </p:cNvSpPr>
+          <p:nvPr>
+            <p:ph type="sldNum" sz="quarter" idx="5"/>
+          </p:nvPr>
+        </p:nvSpPr>
+        <p:spPr/>
+        <p:txBody>
+          <a:bodyPr/>
+          <a:lstStyle/>
+          <a:p>
+            <a:pPr>
+              <a:defRPr/>
+            </a:pPr>
+            <a:fld id="{06AAAE1B-F6B9-4FCD-B9AB-4A0AD0AFAC97}" type="slidenum">
+              <a:rPr lang="en-US" altLang="en-US" smtClean="0"/>
+              <a:pPr>
+                <a:defRPr/>
+              </a:pPr>
+              <a:t>16</a:t>
+            </a:fld>
+            <a:endParaRPr lang="en-US" altLang="en-US" dirty="0"/>
+          </a:p>
+        </p:txBody>
+      </p:sp>
+    </p:spTree>
+    <p:extLst>
+      <p:ext uri="{BB962C8B-B14F-4D97-AF65-F5344CB8AC3E}">
+        <p14:creationId xmlns:p14="http://schemas.microsoft.com/office/powerpoint/2010/main" val="1921409946"/>
+      </p:ext>
+    </p:extLst>
+  </p:cSld>
+  <p:clrMapOvr>
+    <a:masterClrMapping/>
+  </p:clrMapOvr>
+</p:notes>
+</file>
+
+<file path=ppt/notesSlides/notesSlide8.xml><?xml version="1.0" encoding="utf-8"?>
+<p:notes xmlns:a="http://schemas.openxmlformats.org/drawingml/2006/main" xmlns:r="http://schemas.openxmlformats.org/officeDocument/2006/relationships" xmlns:p="http://schemas.openxmlformats.org/presentationml/2006/main">
+  <p:cSld>
+    <p:spTree>
+      <p:nvGrpSpPr>
+        <p:cNvPr id="1" name=""/>
+        <p:cNvGrpSpPr/>
+        <p:nvPr/>
+      </p:nvGrpSpPr>
+      <p:grpSpPr>
+        <a:xfrm>
+          <a:off x="0" y="0"/>
+          <a:ext cx="0" cy="0"/>
+          <a:chOff x="0" y="0"/>
+          <a:chExt cx="0" cy="0"/>
+        </a:xfrm>
+      </p:grpSpPr>
+      <p:sp>
+        <p:nvSpPr>
+          <p:cNvPr id="2" name="Slide Image Placeholder 1"/>
+          <p:cNvSpPr>
+            <a:spLocks noGrp="1" noRot="1" noChangeAspect="1"/>
+          </p:cNvSpPr>
+          <p:nvPr>
+            <p:ph type="sldImg"/>
+          </p:nvPr>
+        </p:nvSpPr>
+        <p:spPr/>
+      </p:sp>
+      <p:sp>
+        <p:nvSpPr>
+          <p:cNvPr id="3" name="Notes Placeholder 2"/>
+          <p:cNvSpPr>
+            <a:spLocks noGrp="1"/>
+          </p:cNvSpPr>
+          <p:nvPr>
+            <p:ph type="body" idx="1"/>
+          </p:nvPr>
+        </p:nvSpPr>
+        <p:spPr/>
+        <p:txBody>
+          <a:bodyPr/>
+          <a:lstStyle/>
+          <a:p>
             <a:r>
               <a:rPr lang="en-AU" sz="7200" dirty="0">
                 <a:latin typeface="Arial" panose="020B0604020202020204" pitchFamily="34" charset="0"/>
@@ -1585,7 +1675,7 @@
           <a:p>
             <a:fld id="{7B96480C-D4FF-4D5B-ABA4-4D6837D6C648}" type="datetime1">
               <a:rPr lang="en-US" smtClean="0"/>
-              <a:t>2/21/20</a:t>
+              <a:t>2/29/20</a:t>
             </a:fld>
             <a:endParaRPr lang="en-US"/>
           </a:p>
@@ -1783,7 +1873,7 @@
           <a:p>
             <a:fld id="{2B0CB159-0D74-4138-B60D-46734C7189CF}" type="datetime1">
               <a:rPr lang="en-US" smtClean="0"/>
-              <a:t>2/21/20</a:t>
+              <a:t>2/29/20</a:t>
             </a:fld>
             <a:endParaRPr lang="en-US"/>
           </a:p>
@@ -1991,7 +2081,7 @@
           <a:p>
             <a:fld id="{86F74E00-A3D9-49B2-92EE-F6E2B61C4694}" type="datetime1">
               <a:rPr lang="en-US" smtClean="0"/>
-              <a:t>2/21/20</a:t>
+              <a:t>2/29/20</a:t>
             </a:fld>
             <a:endParaRPr lang="en-US"/>
           </a:p>
@@ -2189,7 +2279,7 @@
           <a:p>
             <a:fld id="{A29C9B81-F5CF-4CDA-9CEC-028BA81B2A6E}" type="datetime1">
               <a:rPr lang="en-US" smtClean="0"/>
-              <a:t>2/21/20</a:t>
+              <a:t>2/29/20</a:t>
             </a:fld>
             <a:endParaRPr lang="en-US"/>
           </a:p>
@@ -2464,7 +2554,7 @@
           <a:p>
             <a:fld id="{52145163-3C70-466E-906B-2D77BA0C333D}" type="datetime1">
               <a:rPr lang="en-US" smtClean="0"/>
-              <a:t>2/21/20</a:t>
+              <a:t>2/29/20</a:t>
             </a:fld>
             <a:endParaRPr lang="en-US"/>
           </a:p>
@@ -2729,7 +2819,7 @@
           <a:p>
             <a:fld id="{9FB606A8-AA48-4381-B480-A7AEFF509F86}" type="datetime1">
               <a:rPr lang="en-US" smtClean="0"/>
-              <a:t>2/21/20</a:t>
+              <a:t>2/29/20</a:t>
             </a:fld>
             <a:endParaRPr lang="en-US"/>
           </a:p>
@@ -3141,7 +3231,7 @@
           <a:p>
             <a:fld id="{9BA70369-C48D-428A-89D3-F6AB96F8E2CB}" type="datetime1">
               <a:rPr lang="en-US" smtClean="0"/>
-              <a:t>2/21/20</a:t>
+              <a:t>2/29/20</a:t>
             </a:fld>
             <a:endParaRPr lang="en-US"/>
           </a:p>
@@ -3282,7 +3372,7 @@
           <a:p>
             <a:fld id="{E5C6C4CC-783D-487E-9A23-3CB2EC84C407}" type="datetime1">
               <a:rPr lang="en-US" smtClean="0"/>
-              <a:t>2/21/20</a:t>
+              <a:t>2/29/20</a:t>
             </a:fld>
             <a:endParaRPr lang="en-US"/>
           </a:p>
@@ -3395,7 +3485,7 @@
           <a:p>
             <a:fld id="{5FC39CF2-C652-4D61-A0C7-12EEBAD43262}" type="datetime1">
               <a:rPr lang="en-US" smtClean="0"/>
-              <a:t>2/21/20</a:t>
+              <a:t>2/29/20</a:t>
             </a:fld>
             <a:endParaRPr lang="en-US"/>
           </a:p>
@@ -3706,7 +3796,7 @@
           <a:p>
             <a:fld id="{D0117E5F-4046-4A29-BA38-71ADE6C0BF60}" type="datetime1">
               <a:rPr lang="en-US" smtClean="0"/>
-              <a:t>2/21/20</a:t>
+              <a:t>2/29/20</a:t>
             </a:fld>
             <a:endParaRPr lang="en-US"/>
           </a:p>
@@ -3994,7 +4084,7 @@
           <a:p>
             <a:fld id="{45A4B8E9-EDAD-4893-841E-969713864D5C}" type="datetime1">
               <a:rPr lang="en-US" smtClean="0"/>
-              <a:t>2/21/20</a:t>
+              <a:t>2/29/20</a:t>
             </a:fld>
             <a:endParaRPr lang="en-US"/>
           </a:p>
@@ -4235,7 +4325,7 @@
           <a:p>
             <a:fld id="{AE38EC32-B703-4DCD-92CB-6CEE84524E24}" type="datetime1">
               <a:rPr lang="en-US" smtClean="0"/>
-              <a:t>2/21/20</a:t>
+              <a:t>2/29/20</a:t>
             </a:fld>
             <a:endParaRPr lang="en-US"/>
           </a:p>
@@ -8738,10 +8828,45 @@
       </p:grpSpPr>
       <p:sp>
         <p:nvSpPr>
-          <p:cNvPr id="10" name="Rectangle 9">
-            <a:extLst>
-              <a:ext uri="{FF2B5EF4-FFF2-40B4-BE49-F238E27FC236}">
-                <a16:creationId xmlns:a16="http://schemas.microsoft.com/office/drawing/2014/main" id="{94BDEBB4-111D-DD44-BA6B-821921BFC98F}"/>
+          <p:cNvPr id="31" name="TextBox 30">
+            <a:extLst>
+              <a:ext uri="{FF2B5EF4-FFF2-40B4-BE49-F238E27FC236}">
+                <a16:creationId xmlns:a16="http://schemas.microsoft.com/office/drawing/2014/main" id="{1C1278A8-FBCD-B243-9CAB-ED2D001A4B5B}"/>
+              </a:ext>
+            </a:extLst>
+          </p:cNvPr>
+          <p:cNvSpPr txBox="1"/>
+          <p:nvPr/>
+        </p:nvSpPr>
+        <p:spPr>
+          <a:xfrm>
+            <a:off x="11113252" y="6245525"/>
+            <a:ext cx="575799" cy="369332"/>
+          </a:xfrm>
+          <a:prstGeom prst="rect">
+            <a:avLst/>
+          </a:prstGeom>
+          <a:noFill/>
+        </p:spPr>
+        <p:txBody>
+          <a:bodyPr wrap="none" rtlCol="0">
+            <a:spAutoFit/>
+          </a:bodyPr>
+          <a:lstStyle/>
+          <a:p>
+            <a:r>
+              <a:rPr lang="en-US" dirty="0"/>
+              <a:t>2&gt;…</a:t>
+            </a:r>
+          </a:p>
+        </p:txBody>
+      </p:sp>
+      <p:sp>
+        <p:nvSpPr>
+          <p:cNvPr id="19" name="Rounded Rectangle 18">
+            <a:extLst>
+              <a:ext uri="{FF2B5EF4-FFF2-40B4-BE49-F238E27FC236}">
+                <a16:creationId xmlns:a16="http://schemas.microsoft.com/office/drawing/2014/main" id="{CBDC66B3-9F34-1F4A-8473-55062527034A}"/>
               </a:ext>
             </a:extLst>
           </p:cNvPr>
@@ -8750,8 +8875,127 @@
         </p:nvSpPr>
         <p:spPr>
           <a:xfrm>
-            <a:off x="1792297" y="1216191"/>
-            <a:ext cx="1211339" cy="1338973"/>
+            <a:off x="580959" y="161662"/>
+            <a:ext cx="1211338" cy="672861"/>
+          </a:xfrm>
+          <a:prstGeom prst="roundRect">
+            <a:avLst/>
+          </a:prstGeom>
+          <a:solidFill>
+            <a:srgbClr val="FFFF00"/>
+          </a:solidFill>
+          <a:ln>
+            <a:solidFill>
+              <a:srgbClr val="FFFF00"/>
+            </a:solidFill>
+          </a:ln>
+        </p:spPr>
+        <p:style>
+          <a:lnRef idx="2">
+            <a:schemeClr val="accent1">
+              <a:shade val="50000"/>
+            </a:schemeClr>
+          </a:lnRef>
+          <a:fillRef idx="1">
+            <a:schemeClr val="accent1"/>
+          </a:fillRef>
+          <a:effectRef idx="0">
+            <a:schemeClr val="accent1"/>
+          </a:effectRef>
+          <a:fontRef idx="minor">
+            <a:schemeClr val="lt1"/>
+          </a:fontRef>
+        </p:style>
+        <p:txBody>
+          <a:bodyPr rtlCol="0" anchor="ctr"/>
+          <a:lstStyle/>
+          <a:p>
+            <a:pPr algn="ctr"/>
+            <a:r>
+              <a:rPr lang="en-US" sz="1200" dirty="0">
+                <a:solidFill>
+                  <a:schemeClr val="accent1">
+                    <a:lumMod val="50000"/>
+                  </a:schemeClr>
+                </a:solidFill>
+              </a:rPr>
+              <a:t>Manufacturer</a:t>
+            </a:r>
+          </a:p>
+        </p:txBody>
+      </p:sp>
+      <p:sp>
+        <p:nvSpPr>
+          <p:cNvPr id="20" name="Rectangle 19">
+            <a:extLst>
+              <a:ext uri="{FF2B5EF4-FFF2-40B4-BE49-F238E27FC236}">
+                <a16:creationId xmlns:a16="http://schemas.microsoft.com/office/drawing/2014/main" id="{4C2B6D74-B4E0-1440-BFDE-480758CDA036}"/>
+              </a:ext>
+            </a:extLst>
+          </p:cNvPr>
+          <p:cNvSpPr/>
+          <p:nvPr/>
+        </p:nvSpPr>
+        <p:spPr>
+          <a:xfrm>
+            <a:off x="825359" y="923551"/>
+            <a:ext cx="928343" cy="1027977"/>
+          </a:xfrm>
+          <a:prstGeom prst="rect">
+            <a:avLst/>
+          </a:prstGeom>
+          <a:effectLst>
+            <a:outerShdw blurRad="50800" dist="38100" dir="5400000" algn="t" rotWithShape="0">
+              <a:prstClr val="black">
+                <a:alpha val="40000"/>
+              </a:prstClr>
+            </a:outerShdw>
+          </a:effectLst>
+        </p:spPr>
+        <p:style>
+          <a:lnRef idx="2">
+            <a:schemeClr val="accent1">
+              <a:shade val="50000"/>
+            </a:schemeClr>
+          </a:lnRef>
+          <a:fillRef idx="1">
+            <a:schemeClr val="accent1"/>
+          </a:fillRef>
+          <a:effectRef idx="0">
+            <a:schemeClr val="accent1"/>
+          </a:effectRef>
+          <a:fontRef idx="minor">
+            <a:schemeClr val="lt1"/>
+          </a:fontRef>
+        </p:style>
+        <p:txBody>
+          <a:bodyPr rtlCol="0" anchor="ctr"/>
+          <a:lstStyle/>
+          <a:p>
+            <a:pPr algn="ctr"/>
+            <a:r>
+              <a:rPr lang="en-US" sz="1200" dirty="0"/>
+              <a:t>Place Shipment Order</a:t>
+            </a:r>
+          </a:p>
+        </p:txBody>
+      </p:sp>
+      <p:sp>
+        <p:nvSpPr>
+          <p:cNvPr id="24" name="Rectangle 23">
+            <a:extLst>
+              <a:ext uri="{FF2B5EF4-FFF2-40B4-BE49-F238E27FC236}">
+                <a16:creationId xmlns:a16="http://schemas.microsoft.com/office/drawing/2014/main" id="{FEE7A74B-A8F9-D643-90C6-E1971642EF74}"/>
+              </a:ext>
+            </a:extLst>
+          </p:cNvPr>
+          <p:cNvSpPr/>
+          <p:nvPr/>
+        </p:nvSpPr>
+        <p:spPr>
+          <a:xfrm>
+            <a:off x="3342604" y="2288939"/>
+            <a:ext cx="1592075" cy="708537"/>
           </a:xfrm>
           <a:prstGeom prst="rect">
             <a:avLst/>
@@ -8801,9 +9045,66 @@
                   </a:schemeClr>
                 </a:solidFill>
               </a:rPr>
-              <a:t>New</a:t>
-            </a:r>
-          </a:p>
+              <a:t>Reefer Container Assigned  </a:t>
+            </a:r>
+          </a:p>
+        </p:txBody>
+      </p:sp>
+      <p:sp>
+        <p:nvSpPr>
+          <p:cNvPr id="26" name="Rectangle 25">
+            <a:extLst>
+              <a:ext uri="{FF2B5EF4-FFF2-40B4-BE49-F238E27FC236}">
+                <a16:creationId xmlns:a16="http://schemas.microsoft.com/office/drawing/2014/main" id="{30D41B11-6B4B-DE4D-8CC7-DF1C664DE942}"/>
+              </a:ext>
+            </a:extLst>
+          </p:cNvPr>
+          <p:cNvSpPr/>
+          <p:nvPr/>
+        </p:nvSpPr>
+        <p:spPr>
+          <a:xfrm>
+            <a:off x="5066096" y="3327394"/>
+            <a:ext cx="1356169" cy="759734"/>
+          </a:xfrm>
+          <a:prstGeom prst="rect">
+            <a:avLst/>
+          </a:prstGeom>
+          <a:solidFill>
+            <a:srgbClr val="FFC000"/>
+          </a:solidFill>
+          <a:ln>
+            <a:solidFill>
+              <a:srgbClr val="FFC000"/>
+            </a:solidFill>
+          </a:ln>
+          <a:effectLst>
+            <a:outerShdw blurRad="50800" dist="38100" dir="5400000" algn="t" rotWithShape="0">
+              <a:prstClr val="black">
+                <a:alpha val="40000"/>
+              </a:prstClr>
+            </a:outerShdw>
+          </a:effectLst>
+        </p:spPr>
+        <p:style>
+          <a:lnRef idx="2">
+            <a:schemeClr val="accent1">
+              <a:shade val="50000"/>
+            </a:schemeClr>
+          </a:lnRef>
+          <a:fillRef idx="1">
+            <a:schemeClr val="accent1"/>
+          </a:fillRef>
+          <a:effectRef idx="0">
+            <a:schemeClr val="accent1"/>
+          </a:effectRef>
+          <a:fontRef idx="minor">
+            <a:schemeClr val="lt1"/>
+          </a:fontRef>
+        </p:style>
+        <p:txBody>
+          <a:bodyPr rtlCol="0" anchor="ctr"/>
+          <a:lstStyle/>
           <a:p>
             <a:pPr algn="ctr"/>
             <a:r>
@@ -8814,52 +9115,93 @@
                   </a:schemeClr>
                 </a:solidFill>
               </a:rPr>
-              <a:t>shipment order created </a:t>
-            </a:r>
-          </a:p>
-        </p:txBody>
-      </p:sp>
-      <p:sp>
-        <p:nvSpPr>
-          <p:cNvPr id="31" name="TextBox 30">
-            <a:extLst>
-              <a:ext uri="{FF2B5EF4-FFF2-40B4-BE49-F238E27FC236}">
-                <a16:creationId xmlns:a16="http://schemas.microsoft.com/office/drawing/2014/main" id="{1C1278A8-FBCD-B243-9CAB-ED2D001A4B5B}"/>
-              </a:ext>
-            </a:extLst>
-          </p:cNvPr>
-          <p:cNvSpPr txBox="1"/>
+              <a:t>Voyage for shipment</a:t>
+            </a:r>
+          </a:p>
+          <a:p>
+            <a:pPr algn="ctr"/>
+            <a:r>
+              <a:rPr lang="en-US" sz="1200" dirty="0">
+                <a:solidFill>
+                  <a:schemeClr val="accent1">
+                    <a:lumMod val="50000"/>
+                  </a:schemeClr>
+                </a:solidFill>
+              </a:rPr>
+              <a:t>selected </a:t>
+            </a:r>
+          </a:p>
+        </p:txBody>
+      </p:sp>
+      <p:sp>
+        <p:nvSpPr>
+          <p:cNvPr id="27" name="Rectangle 26">
+            <a:extLst>
+              <a:ext uri="{FF2B5EF4-FFF2-40B4-BE49-F238E27FC236}">
+                <a16:creationId xmlns:a16="http://schemas.microsoft.com/office/drawing/2014/main" id="{923FBD7E-BF6F-354A-95E5-08ECA4919C29}"/>
+              </a:ext>
+            </a:extLst>
+          </p:cNvPr>
+          <p:cNvSpPr/>
           <p:nvPr/>
         </p:nvSpPr>
         <p:spPr>
           <a:xfrm>
-            <a:off x="11113252" y="6245525"/>
-            <a:ext cx="575799" cy="369332"/>
+            <a:off x="3318582" y="1059290"/>
+            <a:ext cx="1640121" cy="1159443"/>
           </a:xfrm>
           <a:prstGeom prst="rect">
             <a:avLst/>
           </a:prstGeom>
-          <a:noFill/>
+          <a:solidFill>
+            <a:srgbClr val="FFD1EC"/>
+          </a:solidFill>
+          <a:ln>
+            <a:solidFill>
+              <a:srgbClr val="FFD1EC"/>
+            </a:solidFill>
+          </a:ln>
         </p:spPr>
-        <p:txBody>
-          <a:bodyPr wrap="none" rtlCol="0">
-            <a:spAutoFit/>
-          </a:bodyPr>
-          <a:lstStyle/>
-          <a:p>
-            <a:r>
-              <a:rPr lang="en-US" dirty="0"/>
-              <a:t>2&gt;…</a:t>
-            </a:r>
-          </a:p>
-        </p:txBody>
-      </p:sp>
-      <p:sp>
-        <p:nvSpPr>
-          <p:cNvPr id="19" name="Rounded Rectangle 18">
-            <a:extLst>
-              <a:ext uri="{FF2B5EF4-FFF2-40B4-BE49-F238E27FC236}">
-                <a16:creationId xmlns:a16="http://schemas.microsoft.com/office/drawing/2014/main" id="{CBDC66B3-9F34-1F4A-8473-55062527034A}"/>
+        <p:style>
+          <a:lnRef idx="2">
+            <a:schemeClr val="accent1">
+              <a:shade val="50000"/>
+            </a:schemeClr>
+          </a:lnRef>
+          <a:fillRef idx="1">
+            <a:schemeClr val="accent1"/>
+          </a:fillRef>
+          <a:effectRef idx="0">
+            <a:schemeClr val="accent1"/>
+          </a:effectRef>
+          <a:fontRef idx="minor">
+            <a:schemeClr val="lt1"/>
+          </a:fontRef>
+        </p:style>
+        <p:txBody>
+          <a:bodyPr rtlCol="0" anchor="ctr"/>
+          <a:lstStyle/>
+          <a:p>
+            <a:pPr algn="ctr"/>
+            <a:r>
+              <a:rPr lang="en-US" sz="1200" dirty="0">
+                <a:solidFill>
+                  <a:schemeClr val="accent1">
+                    <a:lumMod val="50000"/>
+                  </a:schemeClr>
+                </a:solidFill>
+              </a:rPr>
+              <a:t>Whenever shipment order placed, reserve a reefer container </a:t>
+            </a:r>
+          </a:p>
+        </p:txBody>
+      </p:sp>
+      <p:sp>
+        <p:nvSpPr>
+          <p:cNvPr id="29" name="Rectangle 28">
+            <a:extLst>
+              <a:ext uri="{FF2B5EF4-FFF2-40B4-BE49-F238E27FC236}">
+                <a16:creationId xmlns:a16="http://schemas.microsoft.com/office/drawing/2014/main" id="{0E544788-0BE2-1147-8762-E80FCC3D6415}"/>
               </a:ext>
             </a:extLst>
           </p:cNvPr>
@@ -8868,7 +9210,70 @@
         </p:nvSpPr>
         <p:spPr>
           <a:xfrm>
-            <a:off x="580959" y="161662"/>
+            <a:off x="5066096" y="2288940"/>
+            <a:ext cx="1592075" cy="861800"/>
+          </a:xfrm>
+          <a:prstGeom prst="rect">
+            <a:avLst/>
+          </a:prstGeom>
+          <a:solidFill>
+            <a:srgbClr val="FFD1EC"/>
+          </a:solidFill>
+          <a:ln>
+            <a:solidFill>
+              <a:srgbClr val="FFD1EC"/>
+            </a:solidFill>
+          </a:ln>
+        </p:spPr>
+        <p:style>
+          <a:lnRef idx="2">
+            <a:schemeClr val="accent1">
+              <a:shade val="50000"/>
+            </a:schemeClr>
+          </a:lnRef>
+          <a:fillRef idx="1">
+            <a:schemeClr val="accent1"/>
+          </a:fillRef>
+          <a:effectRef idx="0">
+            <a:schemeClr val="accent1"/>
+          </a:effectRef>
+          <a:fontRef idx="minor">
+            <a:schemeClr val="lt1"/>
+          </a:fontRef>
+        </p:style>
+        <p:txBody>
+          <a:bodyPr rtlCol="0" anchor="ctr"/>
+          <a:lstStyle/>
+          <a:p>
+            <a:pPr algn="ctr"/>
+            <a:r>
+              <a:rPr lang="en-US" sz="1200" dirty="0">
+                <a:solidFill>
+                  <a:schemeClr val="accent1">
+                    <a:lumMod val="50000"/>
+                  </a:schemeClr>
+                </a:solidFill>
+              </a:rPr>
+              <a:t>Whenever a reefer container is selected reserve voyage</a:t>
+            </a:r>
+          </a:p>
+        </p:txBody>
+      </p:sp>
+      <p:sp>
+        <p:nvSpPr>
+          <p:cNvPr id="30" name="Rounded Rectangle 29">
+            <a:extLst>
+              <a:ext uri="{FF2B5EF4-FFF2-40B4-BE49-F238E27FC236}">
+                <a16:creationId xmlns:a16="http://schemas.microsoft.com/office/drawing/2014/main" id="{808259B3-214F-244D-9463-3544787BC251}"/>
+              </a:ext>
+            </a:extLst>
+          </p:cNvPr>
+          <p:cNvSpPr/>
+          <p:nvPr/>
+        </p:nvSpPr>
+        <p:spPr>
+          <a:xfrm>
+            <a:off x="7233299" y="1166841"/>
             <a:ext cx="1211338" cy="672861"/>
           </a:xfrm>
           <a:prstGeom prst="roundRect">
@@ -8912,17 +9317,17 @@
                   </a:schemeClr>
                 </a:solidFill>
               </a:rPr>
-              <a:t>Manufacturer</a:t>
-            </a:r>
-          </a:p>
-        </p:txBody>
-      </p:sp>
-      <p:sp>
-        <p:nvSpPr>
-          <p:cNvPr id="20" name="Rectangle 19">
-            <a:extLst>
-              <a:ext uri="{FF2B5EF4-FFF2-40B4-BE49-F238E27FC236}">
-                <a16:creationId xmlns:a16="http://schemas.microsoft.com/office/drawing/2014/main" id="{4C2B6D74-B4E0-1440-BFDE-480758CDA036}"/>
+              <a:t>Shipping Inc Clerk</a:t>
+            </a:r>
+          </a:p>
+        </p:txBody>
+      </p:sp>
+      <p:sp>
+        <p:nvSpPr>
+          <p:cNvPr id="12" name="Rectangle 11">
+            <a:extLst>
+              <a:ext uri="{FF2B5EF4-FFF2-40B4-BE49-F238E27FC236}">
+                <a16:creationId xmlns:a16="http://schemas.microsoft.com/office/drawing/2014/main" id="{5BB1C54D-A182-D345-A57A-C2A8EE653ECC}"/>
               </a:ext>
             </a:extLst>
           </p:cNvPr>
@@ -8931,18 +9336,28 @@
         </p:nvSpPr>
         <p:spPr>
           <a:xfrm>
-            <a:off x="825359" y="923551"/>
-            <a:ext cx="928343" cy="1027977"/>
+            <a:off x="5066096" y="4263782"/>
+            <a:ext cx="1211339" cy="556522"/>
           </a:xfrm>
           <a:prstGeom prst="rect">
             <a:avLst/>
           </a:prstGeom>
+          <a:solidFill>
+            <a:schemeClr val="accent6">
+              <a:lumMod val="60000"/>
+              <a:lumOff val="40000"/>
+            </a:schemeClr>
+          </a:solidFill>
+          <a:ln>
+            <a:noFill/>
+          </a:ln>
           <a:effectLst>
-            <a:outerShdw blurRad="50800" dist="38100" dir="5400000" algn="t" rotWithShape="0">
+            <a:outerShdw blurRad="50800" dist="63500" dir="5400000" algn="t" rotWithShape="0">
               <a:prstClr val="black">
                 <a:alpha val="40000"/>
               </a:prstClr>
             </a:outerShdw>
+            <a:reflection blurRad="6350" stA="52000" endA="300" endPos="35000" dir="5400000" sy="-100000" algn="bl" rotWithShape="0"/>
           </a:effectLst>
         </p:spPr>
         <p:style>
@@ -8965,20 +9380,25 @@
           <a:bodyPr rtlCol="0" anchor="ctr"/>
           <a:lstStyle/>
           <a:p>
-            <a:pPr algn="ctr"/>
-            <a:r>
-              <a:rPr lang="en-US" sz="1200" dirty="0"/>
-              <a:t>Place Shipment Order</a:t>
-            </a:r>
-          </a:p>
-        </p:txBody>
-      </p:sp>
-      <p:sp>
-        <p:nvSpPr>
-          <p:cNvPr id="18" name="Rectangle 17">
-            <a:extLst>
-              <a:ext uri="{FF2B5EF4-FFF2-40B4-BE49-F238E27FC236}">
-                <a16:creationId xmlns:a16="http://schemas.microsoft.com/office/drawing/2014/main" id="{C62A72E6-E197-394B-894D-754558D5A073}"/>
+            <a:r>
+              <a:rPr lang="en-US" sz="1400" dirty="0">
+                <a:solidFill>
+                  <a:schemeClr val="accent1">
+                    <a:lumMod val="75000"/>
+                  </a:schemeClr>
+                </a:solidFill>
+              </a:rPr>
+              <a:t>voyageID</a:t>
+            </a:r>
+          </a:p>
+        </p:txBody>
+      </p:sp>
+      <p:sp>
+        <p:nvSpPr>
+          <p:cNvPr id="13" name="Rectangle 12">
+            <a:extLst>
+              <a:ext uri="{FF2B5EF4-FFF2-40B4-BE49-F238E27FC236}">
+                <a16:creationId xmlns:a16="http://schemas.microsoft.com/office/drawing/2014/main" id="{3EB21076-D5C7-BA49-B56E-DEBEA6945A5C}"/>
               </a:ext>
             </a:extLst>
           </p:cNvPr>
@@ -8987,7 +9407,149 @@
         </p:nvSpPr>
         <p:spPr>
           <a:xfrm>
-            <a:off x="1753702" y="2713860"/>
+            <a:off x="3342604" y="3150739"/>
+            <a:ext cx="1211339" cy="556522"/>
+          </a:xfrm>
+          <a:prstGeom prst="rect">
+            <a:avLst/>
+          </a:prstGeom>
+          <a:solidFill>
+            <a:schemeClr val="accent6">
+              <a:lumMod val="60000"/>
+              <a:lumOff val="40000"/>
+            </a:schemeClr>
+          </a:solidFill>
+          <a:ln>
+            <a:noFill/>
+          </a:ln>
+          <a:effectLst>
+            <a:outerShdw blurRad="50800" dist="63500" dir="5400000" algn="t" rotWithShape="0">
+              <a:prstClr val="black">
+                <a:alpha val="40000"/>
+              </a:prstClr>
+            </a:outerShdw>
+            <a:reflection blurRad="6350" stA="52000" endA="300" endPos="35000" dir="5400000" sy="-100000" algn="bl" rotWithShape="0"/>
+          </a:effectLst>
+        </p:spPr>
+        <p:style>
+          <a:lnRef idx="2">
+            <a:schemeClr val="accent1">
+              <a:shade val="50000"/>
+            </a:schemeClr>
+          </a:lnRef>
+          <a:fillRef idx="1">
+            <a:schemeClr val="accent1"/>
+          </a:fillRef>
+          <a:effectRef idx="0">
+            <a:schemeClr val="accent1"/>
+          </a:effectRef>
+          <a:fontRef idx="minor">
+            <a:schemeClr val="lt1"/>
+          </a:fontRef>
+        </p:style>
+        <p:txBody>
+          <a:bodyPr rtlCol="0" anchor="ctr"/>
+          <a:lstStyle/>
+          <a:p>
+            <a:r>
+              <a:rPr lang="en-US" sz="1400" dirty="0">
+                <a:solidFill>
+                  <a:schemeClr val="accent1">
+                    <a:lumMod val="75000"/>
+                  </a:schemeClr>
+                </a:solidFill>
+              </a:rPr>
+              <a:t>containerID</a:t>
+            </a:r>
+          </a:p>
+        </p:txBody>
+      </p:sp>
+      <p:sp>
+        <p:nvSpPr>
+          <p:cNvPr id="14" name="Rectangle 13">
+            <a:extLst>
+              <a:ext uri="{FF2B5EF4-FFF2-40B4-BE49-F238E27FC236}">
+                <a16:creationId xmlns:a16="http://schemas.microsoft.com/office/drawing/2014/main" id="{30FF4AB1-92AE-2741-971D-F45257506BF7}"/>
+              </a:ext>
+            </a:extLst>
+          </p:cNvPr>
+          <p:cNvSpPr/>
+          <p:nvPr/>
+        </p:nvSpPr>
+        <p:spPr>
+          <a:xfrm>
+            <a:off x="1872903" y="923551"/>
+            <a:ext cx="1211339" cy="1159443"/>
+          </a:xfrm>
+          <a:prstGeom prst="rect">
+            <a:avLst/>
+          </a:prstGeom>
+          <a:solidFill>
+            <a:srgbClr val="FFC000"/>
+          </a:solidFill>
+          <a:ln>
+            <a:solidFill>
+              <a:srgbClr val="FFC000"/>
+            </a:solidFill>
+          </a:ln>
+          <a:effectLst>
+            <a:outerShdw blurRad="101600" dist="38100" dir="5400000" algn="t" rotWithShape="0">
+              <a:prstClr val="black">
+                <a:alpha val="40000"/>
+              </a:prstClr>
+            </a:outerShdw>
+            <a:reflection blurRad="6350" stA="52000" endA="300" endPos="35000" dir="5400000" sy="-100000" algn="bl" rotWithShape="0"/>
+          </a:effectLst>
+        </p:spPr>
+        <p:style>
+          <a:lnRef idx="2">
+            <a:schemeClr val="accent1">
+              <a:shade val="50000"/>
+            </a:schemeClr>
+          </a:lnRef>
+          <a:fillRef idx="1">
+            <a:schemeClr val="accent1"/>
+          </a:fillRef>
+          <a:effectRef idx="0">
+            <a:schemeClr val="accent1"/>
+          </a:effectRef>
+          <a:fontRef idx="minor">
+            <a:schemeClr val="lt1"/>
+          </a:fontRef>
+        </p:style>
+        <p:txBody>
+          <a:bodyPr rtlCol="0" anchor="ctr"/>
+          <a:lstStyle/>
+          <a:p>
+            <a:pPr algn="ctr"/>
+            <a:r>
+              <a:rPr lang="en-US" sz="1200" dirty="0">
+                <a:solidFill>
+                  <a:schemeClr val="accent1">
+                    <a:lumMod val="50000"/>
+                  </a:schemeClr>
+                </a:solidFill>
+              </a:rPr>
+              <a:t>Fresh Cargo Shipment Order Created</a:t>
+            </a:r>
+          </a:p>
+        </p:txBody>
+      </p:sp>
+      <p:sp>
+        <p:nvSpPr>
+          <p:cNvPr id="15" name="Rectangle 14">
+            <a:extLst>
+              <a:ext uri="{FF2B5EF4-FFF2-40B4-BE49-F238E27FC236}">
+                <a16:creationId xmlns:a16="http://schemas.microsoft.com/office/drawing/2014/main" id="{18567E30-5BC5-AB4D-8320-99DB23BB2A7C}"/>
+              </a:ext>
+            </a:extLst>
+          </p:cNvPr>
+          <p:cNvSpPr/>
+          <p:nvPr/>
+        </p:nvSpPr>
+        <p:spPr>
+          <a:xfrm>
+            <a:off x="1761444" y="2288939"/>
             <a:ext cx="1449743" cy="567232"/>
           </a:xfrm>
           <a:prstGeom prst="rect">
@@ -9050,17 +9612,29 @@
                   </a:schemeClr>
                 </a:solidFill>
               </a:rPr>
-              <a:t>: </a:t>
-            </a:r>
-          </a:p>
-        </p:txBody>
-      </p:sp>
-      <p:sp>
-        <p:nvSpPr>
-          <p:cNvPr id="24" name="Rectangle 23">
-            <a:extLst>
-              <a:ext uri="{FF2B5EF4-FFF2-40B4-BE49-F238E27FC236}">
-                <a16:creationId xmlns:a16="http://schemas.microsoft.com/office/drawing/2014/main" id="{FEE7A74B-A8F9-D643-90C6-E1971642EF74}"/>
+              <a:t>:</a:t>
+            </a:r>
+          </a:p>
+          <a:p>
+            <a:r>
+              <a:rPr lang="en-US" sz="1400" dirty="0">
+                <a:solidFill>
+                  <a:schemeClr val="accent1">
+                    <a:lumMod val="75000"/>
+                  </a:schemeClr>
+                </a:solidFill>
+              </a:rPr>
+              <a:t>OrderID </a:t>
+            </a:r>
+          </a:p>
+        </p:txBody>
+      </p:sp>
+      <p:sp>
+        <p:nvSpPr>
+          <p:cNvPr id="16" name="Rectangle 15">
+            <a:extLst>
+              <a:ext uri="{FF2B5EF4-FFF2-40B4-BE49-F238E27FC236}">
+                <a16:creationId xmlns:a16="http://schemas.microsoft.com/office/drawing/2014/main" id="{2C5F5542-B00E-7B43-A8E6-64D605F88FE2}"/>
               </a:ext>
             </a:extLst>
           </p:cNvPr>
@@ -9069,8 +9643,8 @@
         </p:nvSpPr>
         <p:spPr>
           <a:xfrm>
-            <a:off x="3971311" y="3833966"/>
-            <a:ext cx="1592075" cy="708537"/>
+            <a:off x="7233298" y="2747673"/>
+            <a:ext cx="1373407" cy="861800"/>
           </a:xfrm>
           <a:prstGeom prst="rect">
             <a:avLst/>
@@ -9083,6 +9657,89 @@
               <a:srgbClr val="FFC000"/>
             </a:solidFill>
           </a:ln>
+          <a:effectLst>
+            <a:outerShdw blurRad="88900" dist="38100" dir="3000000" algn="t" rotWithShape="0">
+              <a:prstClr val="black">
+                <a:alpha val="40000"/>
+              </a:prstClr>
+            </a:outerShdw>
+            <a:reflection blurRad="6350" stA="52000" endA="300" endPos="35000" dir="5400000" sy="-100000" algn="bl" rotWithShape="0"/>
+          </a:effectLst>
+          <a:scene3d>
+            <a:camera prst="orthographicFront"/>
+            <a:lightRig rig="threePt" dir="t"/>
+          </a:scene3d>
+          <a:sp3d>
+            <a:bevelB w="165100" prst="coolSlant"/>
+          </a:sp3d>
+        </p:spPr>
+        <p:style>
+          <a:lnRef idx="2">
+            <a:schemeClr val="accent1">
+              <a:shade val="50000"/>
+            </a:schemeClr>
+          </a:lnRef>
+          <a:fillRef idx="1">
+            <a:schemeClr val="accent1"/>
+          </a:fillRef>
+          <a:effectRef idx="0">
+            <a:schemeClr val="accent1"/>
+          </a:effectRef>
+          <a:fontRef idx="minor">
+            <a:schemeClr val="lt1"/>
+          </a:fontRef>
+        </p:style>
+        <p:txBody>
+          <a:bodyPr rtlCol="0" anchor="ctr"/>
+          <a:lstStyle/>
+          <a:p>
+            <a:pPr algn="ctr"/>
+            <a:r>
+              <a:rPr lang="en-US" sz="1200" dirty="0">
+                <a:solidFill>
+                  <a:schemeClr val="accent1">
+                    <a:lumMod val="50000"/>
+                  </a:schemeClr>
+                </a:solidFill>
+              </a:rPr>
+              <a:t>Order business conditions and SLA</a:t>
+            </a:r>
+          </a:p>
+          <a:p>
+            <a:pPr algn="ctr"/>
+            <a:r>
+              <a:rPr lang="en-US" sz="1200" dirty="0">
+                <a:solidFill>
+                  <a:schemeClr val="accent1">
+                    <a:lumMod val="50000"/>
+                  </a:schemeClr>
+                </a:solidFill>
+              </a:rPr>
+              <a:t>Emitted</a:t>
+            </a:r>
+          </a:p>
+        </p:txBody>
+      </p:sp>
+      <p:sp>
+        <p:nvSpPr>
+          <p:cNvPr id="17" name="Rectangle 16">
+            <a:extLst>
+              <a:ext uri="{FF2B5EF4-FFF2-40B4-BE49-F238E27FC236}">
+                <a16:creationId xmlns:a16="http://schemas.microsoft.com/office/drawing/2014/main" id="{9E01477C-CEC5-A24B-8F47-FB7774E5C41B}"/>
+              </a:ext>
+            </a:extLst>
+          </p:cNvPr>
+          <p:cNvSpPr/>
+          <p:nvPr/>
+        </p:nvSpPr>
+        <p:spPr>
+          <a:xfrm>
+            <a:off x="7233299" y="1951528"/>
+            <a:ext cx="1373407" cy="672861"/>
+          </a:xfrm>
+          <a:prstGeom prst="rect">
+            <a:avLst/>
+          </a:prstGeom>
           <a:effectLst>
             <a:outerShdw blurRad="50800" dist="38100" dir="5400000" algn="t" rotWithShape="0">
               <a:prstClr val="black">
@@ -9113,24 +9770,18 @@
           <a:p>
             <a:pPr algn="ctr"/>
             <a:r>
-              <a:rPr lang="en-US" sz="1200" dirty="0">
-                <a:solidFill>
-                  <a:schemeClr val="accent1">
-                    <a:lumMod val="50000"/>
-                  </a:schemeClr>
-                </a:solidFill>
-              </a:rPr>
-              <a:t>Reefer Container Assigned  </a:t>
-            </a:r>
-          </a:p>
-        </p:txBody>
-      </p:sp>
-      <p:sp>
-        <p:nvSpPr>
-          <p:cNvPr id="26" name="Rectangle 25">
-            <a:extLst>
-              <a:ext uri="{FF2B5EF4-FFF2-40B4-BE49-F238E27FC236}">
-                <a16:creationId xmlns:a16="http://schemas.microsoft.com/office/drawing/2014/main" id="{30D41B11-6B4B-DE4D-8CC7-DF1C664DE942}"/>
+              <a:rPr lang="en-US" sz="1200" dirty="0"/>
+              <a:t>Define shipping business SLA</a:t>
+            </a:r>
+          </a:p>
+        </p:txBody>
+      </p:sp>
+      <p:sp>
+        <p:nvSpPr>
+          <p:cNvPr id="21" name="Rectangle 20">
+            <a:extLst>
+              <a:ext uri="{FF2B5EF4-FFF2-40B4-BE49-F238E27FC236}">
+                <a16:creationId xmlns:a16="http://schemas.microsoft.com/office/drawing/2014/main" id="{255F3D55-EA07-CF4C-9E3C-C8F58FF341DC}"/>
               </a:ext>
             </a:extLst>
           </p:cNvPr>
@@ -9139,280 +9790,8 @@
         </p:nvSpPr>
         <p:spPr>
           <a:xfrm>
-            <a:off x="6300446" y="4448060"/>
-            <a:ext cx="1356169" cy="759734"/>
-          </a:xfrm>
-          <a:prstGeom prst="rect">
-            <a:avLst/>
-          </a:prstGeom>
-          <a:solidFill>
-            <a:srgbClr val="FFC000"/>
-          </a:solidFill>
-          <a:ln>
-            <a:solidFill>
-              <a:srgbClr val="FFC000"/>
-            </a:solidFill>
-          </a:ln>
-          <a:effectLst>
-            <a:outerShdw blurRad="50800" dist="38100" dir="5400000" algn="t" rotWithShape="0">
-              <a:prstClr val="black">
-                <a:alpha val="40000"/>
-              </a:prstClr>
-            </a:outerShdw>
-          </a:effectLst>
-        </p:spPr>
-        <p:style>
-          <a:lnRef idx="2">
-            <a:schemeClr val="accent1">
-              <a:shade val="50000"/>
-            </a:schemeClr>
-          </a:lnRef>
-          <a:fillRef idx="1">
-            <a:schemeClr val="accent1"/>
-          </a:fillRef>
-          <a:effectRef idx="0">
-            <a:schemeClr val="accent1"/>
-          </a:effectRef>
-          <a:fontRef idx="minor">
-            <a:schemeClr val="lt1"/>
-          </a:fontRef>
-        </p:style>
-        <p:txBody>
-          <a:bodyPr rtlCol="0" anchor="ctr"/>
-          <a:lstStyle/>
-          <a:p>
-            <a:pPr algn="ctr"/>
-            <a:r>
-              <a:rPr lang="en-US" sz="1200" dirty="0">
-                <a:solidFill>
-                  <a:schemeClr val="accent1">
-                    <a:lumMod val="50000"/>
-                  </a:schemeClr>
-                </a:solidFill>
-              </a:rPr>
-              <a:t>Voyage for shipment</a:t>
-            </a:r>
-          </a:p>
-          <a:p>
-            <a:pPr algn="ctr"/>
-            <a:r>
-              <a:rPr lang="en-US" sz="1200" dirty="0">
-                <a:solidFill>
-                  <a:schemeClr val="accent1">
-                    <a:lumMod val="50000"/>
-                  </a:schemeClr>
-                </a:solidFill>
-              </a:rPr>
-              <a:t>selected </a:t>
-            </a:r>
-          </a:p>
-        </p:txBody>
-      </p:sp>
-      <p:sp>
-        <p:nvSpPr>
-          <p:cNvPr id="27" name="Rectangle 26">
-            <a:extLst>
-              <a:ext uri="{FF2B5EF4-FFF2-40B4-BE49-F238E27FC236}">
-                <a16:creationId xmlns:a16="http://schemas.microsoft.com/office/drawing/2014/main" id="{923FBD7E-BF6F-354A-95E5-08ECA4919C29}"/>
-              </a:ext>
-            </a:extLst>
-          </p:cNvPr>
-          <p:cNvSpPr/>
-          <p:nvPr/>
-        </p:nvSpPr>
-        <p:spPr>
-          <a:xfrm>
-            <a:off x="3923266" y="2608230"/>
-            <a:ext cx="1640121" cy="1159443"/>
-          </a:xfrm>
-          <a:prstGeom prst="rect">
-            <a:avLst/>
-          </a:prstGeom>
-          <a:solidFill>
-            <a:srgbClr val="FFD1EC"/>
-          </a:solidFill>
-          <a:ln>
-            <a:solidFill>
-              <a:srgbClr val="FFD1EC"/>
-            </a:solidFill>
-          </a:ln>
-        </p:spPr>
-        <p:style>
-          <a:lnRef idx="2">
-            <a:schemeClr val="accent1">
-              <a:shade val="50000"/>
-            </a:schemeClr>
-          </a:lnRef>
-          <a:fillRef idx="1">
-            <a:schemeClr val="accent1"/>
-          </a:fillRef>
-          <a:effectRef idx="0">
-            <a:schemeClr val="accent1"/>
-          </a:effectRef>
-          <a:fontRef idx="minor">
-            <a:schemeClr val="lt1"/>
-          </a:fontRef>
-        </p:style>
-        <p:txBody>
-          <a:bodyPr rtlCol="0" anchor="ctr"/>
-          <a:lstStyle/>
-          <a:p>
-            <a:pPr algn="ctr"/>
-            <a:r>
-              <a:rPr lang="en-US" sz="1200" dirty="0">
-                <a:solidFill>
-                  <a:schemeClr val="accent1">
-                    <a:lumMod val="50000"/>
-                  </a:schemeClr>
-                </a:solidFill>
-              </a:rPr>
-              <a:t>Whenever shipment order placed, reserve a container </a:t>
-            </a:r>
-          </a:p>
-        </p:txBody>
-      </p:sp>
-      <p:sp>
-        <p:nvSpPr>
-          <p:cNvPr id="29" name="Rectangle 28">
-            <a:extLst>
-              <a:ext uri="{FF2B5EF4-FFF2-40B4-BE49-F238E27FC236}">
-                <a16:creationId xmlns:a16="http://schemas.microsoft.com/office/drawing/2014/main" id="{0E544788-0BE2-1147-8762-E80FCC3D6415}"/>
-              </a:ext>
-            </a:extLst>
-          </p:cNvPr>
-          <p:cNvSpPr/>
-          <p:nvPr/>
-        </p:nvSpPr>
-        <p:spPr>
-          <a:xfrm>
-            <a:off x="6283208" y="3254244"/>
-            <a:ext cx="1373407" cy="1159443"/>
-          </a:xfrm>
-          <a:prstGeom prst="rect">
-            <a:avLst/>
-          </a:prstGeom>
-          <a:solidFill>
-            <a:srgbClr val="FFD1EC"/>
-          </a:solidFill>
-          <a:ln>
-            <a:solidFill>
-              <a:srgbClr val="FFD1EC"/>
-            </a:solidFill>
-          </a:ln>
-        </p:spPr>
-        <p:style>
-          <a:lnRef idx="2">
-            <a:schemeClr val="accent1">
-              <a:shade val="50000"/>
-            </a:schemeClr>
-          </a:lnRef>
-          <a:fillRef idx="1">
-            <a:schemeClr val="accent1"/>
-          </a:fillRef>
-          <a:effectRef idx="0">
-            <a:schemeClr val="accent1"/>
-          </a:effectRef>
-          <a:fontRef idx="minor">
-            <a:schemeClr val="lt1"/>
-          </a:fontRef>
-        </p:style>
-        <p:txBody>
-          <a:bodyPr rtlCol="0" anchor="ctr"/>
-          <a:lstStyle/>
-          <a:p>
-            <a:pPr algn="ctr"/>
-            <a:r>
-              <a:rPr lang="en-US" sz="1200" dirty="0">
-                <a:solidFill>
-                  <a:schemeClr val="accent1">
-                    <a:lumMod val="50000"/>
-                  </a:schemeClr>
-                </a:solidFill>
-              </a:rPr>
-              <a:t>Whenever a container is selected reserve voyage</a:t>
-            </a:r>
-          </a:p>
-        </p:txBody>
-      </p:sp>
-      <p:sp>
-        <p:nvSpPr>
-          <p:cNvPr id="30" name="Rounded Rectangle 29">
-            <a:extLst>
-              <a:ext uri="{FF2B5EF4-FFF2-40B4-BE49-F238E27FC236}">
-                <a16:creationId xmlns:a16="http://schemas.microsoft.com/office/drawing/2014/main" id="{808259B3-214F-244D-9463-3544787BC251}"/>
-              </a:ext>
-            </a:extLst>
-          </p:cNvPr>
-          <p:cNvSpPr/>
-          <p:nvPr/>
-        </p:nvSpPr>
-        <p:spPr>
-          <a:xfrm>
-            <a:off x="6413404" y="2218733"/>
-            <a:ext cx="1211338" cy="672861"/>
-          </a:xfrm>
-          <a:prstGeom prst="roundRect">
-            <a:avLst/>
-          </a:prstGeom>
-          <a:solidFill>
-            <a:srgbClr val="FFFF00"/>
-          </a:solidFill>
-          <a:ln>
-            <a:solidFill>
-              <a:srgbClr val="FFFF00"/>
-            </a:solidFill>
-          </a:ln>
-        </p:spPr>
-        <p:style>
-          <a:lnRef idx="2">
-            <a:schemeClr val="accent1">
-              <a:shade val="50000"/>
-            </a:schemeClr>
-          </a:lnRef>
-          <a:fillRef idx="1">
-            <a:schemeClr val="accent1"/>
-          </a:fillRef>
-          <a:effectRef idx="0">
-            <a:schemeClr val="accent1"/>
-          </a:effectRef>
-          <a:fontRef idx="minor">
-            <a:schemeClr val="lt1"/>
-          </a:fontRef>
-        </p:style>
-        <p:txBody>
-          <a:bodyPr rtlCol="0" anchor="ctr"/>
-          <a:lstStyle/>
-          <a:p>
-            <a:pPr algn="ctr"/>
-            <a:r>
-              <a:rPr lang="en-US" sz="1200" dirty="0">
-                <a:solidFill>
-                  <a:schemeClr val="accent1">
-                    <a:lumMod val="50000"/>
-                  </a:schemeClr>
-                </a:solidFill>
-              </a:rPr>
-              <a:t>Shipping Inc Clerk</a:t>
-            </a:r>
-          </a:p>
-        </p:txBody>
-      </p:sp>
-      <p:sp>
-        <p:nvSpPr>
-          <p:cNvPr id="12" name="Rectangle 11">
-            <a:extLst>
-              <a:ext uri="{FF2B5EF4-FFF2-40B4-BE49-F238E27FC236}">
-                <a16:creationId xmlns:a16="http://schemas.microsoft.com/office/drawing/2014/main" id="{5BB1C54D-A182-D345-A57A-C2A8EE653ECC}"/>
-              </a:ext>
-            </a:extLst>
-          </p:cNvPr>
-          <p:cNvSpPr/>
-          <p:nvPr/>
-        </p:nvSpPr>
-        <p:spPr>
-          <a:xfrm>
-            <a:off x="7770766" y="4448060"/>
-            <a:ext cx="1211339" cy="556522"/>
+            <a:off x="7233298" y="3779500"/>
+            <a:ext cx="1373407" cy="556522"/>
           </a:xfrm>
           <a:prstGeom prst="rect">
             <a:avLst/>
@@ -9463,17 +9842,29 @@
                   </a:schemeClr>
                 </a:solidFill>
               </a:rPr>
-              <a:t>voyageID</a:t>
-            </a:r>
-          </a:p>
-        </p:txBody>
-      </p:sp>
-      <p:sp>
-        <p:nvSpPr>
-          <p:cNvPr id="13" name="Rectangle 12">
-            <a:extLst>
-              <a:ext uri="{FF2B5EF4-FFF2-40B4-BE49-F238E27FC236}">
-                <a16:creationId xmlns:a16="http://schemas.microsoft.com/office/drawing/2014/main" id="{3EB21076-D5C7-BA49-B56E-DEBEA6945A5C}"/>
+              <a:t>OrderID </a:t>
+            </a:r>
+          </a:p>
+          <a:p>
+            <a:r>
+              <a:rPr lang="en-US" sz="1400" dirty="0">
+                <a:solidFill>
+                  <a:schemeClr val="accent1">
+                    <a:lumMod val="75000"/>
+                  </a:schemeClr>
+                </a:solidFill>
+              </a:rPr>
+              <a:t>SLA conditions</a:t>
+            </a:r>
+          </a:p>
+        </p:txBody>
+      </p:sp>
+      <p:sp>
+        <p:nvSpPr>
+          <p:cNvPr id="22" name="Rounded Rectangle 21">
+            <a:extLst>
+              <a:ext uri="{FF2B5EF4-FFF2-40B4-BE49-F238E27FC236}">
+                <a16:creationId xmlns:a16="http://schemas.microsoft.com/office/drawing/2014/main" id="{98086356-847B-DC4B-834F-B3127AA1F6AC}"/>
               </a:ext>
             </a:extLst>
           </p:cNvPr>
@@ -9482,8 +9873,198 @@
         </p:nvSpPr>
         <p:spPr>
           <a:xfrm>
-            <a:off x="3971311" y="4651272"/>
-            <a:ext cx="1211339" cy="556522"/>
+            <a:off x="9713428" y="1166841"/>
+            <a:ext cx="1211338" cy="672861"/>
+          </a:xfrm>
+          <a:prstGeom prst="roundRect">
+            <a:avLst/>
+          </a:prstGeom>
+          <a:solidFill>
+            <a:srgbClr val="FFFF00"/>
+          </a:solidFill>
+          <a:ln>
+            <a:solidFill>
+              <a:srgbClr val="FFFF00"/>
+            </a:solidFill>
+          </a:ln>
+        </p:spPr>
+        <p:style>
+          <a:lnRef idx="2">
+            <a:schemeClr val="accent1">
+              <a:shade val="50000"/>
+            </a:schemeClr>
+          </a:lnRef>
+          <a:fillRef idx="1">
+            <a:schemeClr val="accent1"/>
+          </a:fillRef>
+          <a:effectRef idx="0">
+            <a:schemeClr val="accent1"/>
+          </a:effectRef>
+          <a:fontRef idx="minor">
+            <a:schemeClr val="lt1"/>
+          </a:fontRef>
+        </p:style>
+        <p:txBody>
+          <a:bodyPr rtlCol="0" anchor="ctr"/>
+          <a:lstStyle/>
+          <a:p>
+            <a:pPr algn="ctr"/>
+            <a:r>
+              <a:rPr lang="en-US" sz="1200" dirty="0">
+                <a:solidFill>
+                  <a:schemeClr val="accent1">
+                    <a:lumMod val="50000"/>
+                  </a:schemeClr>
+                </a:solidFill>
+              </a:rPr>
+              <a:t>Manufacturer</a:t>
+            </a:r>
+          </a:p>
+        </p:txBody>
+      </p:sp>
+      <p:sp>
+        <p:nvSpPr>
+          <p:cNvPr id="23" name="Rectangle 22">
+            <a:extLst>
+              <a:ext uri="{FF2B5EF4-FFF2-40B4-BE49-F238E27FC236}">
+                <a16:creationId xmlns:a16="http://schemas.microsoft.com/office/drawing/2014/main" id="{EC98F630-4D32-8D40-9E14-CD798B3B72C5}"/>
+              </a:ext>
+            </a:extLst>
+          </p:cNvPr>
+          <p:cNvSpPr/>
+          <p:nvPr/>
+        </p:nvSpPr>
+        <p:spPr>
+          <a:xfrm>
+            <a:off x="9713428" y="1951528"/>
+            <a:ext cx="1373407" cy="672861"/>
+          </a:xfrm>
+          <a:prstGeom prst="rect">
+            <a:avLst/>
+          </a:prstGeom>
+          <a:effectLst>
+            <a:outerShdw blurRad="50800" dist="38100" dir="5400000" algn="t" rotWithShape="0">
+              <a:prstClr val="black">
+                <a:alpha val="40000"/>
+              </a:prstClr>
+            </a:outerShdw>
+          </a:effectLst>
+        </p:spPr>
+        <p:style>
+          <a:lnRef idx="2">
+            <a:schemeClr val="accent1">
+              <a:shade val="50000"/>
+            </a:schemeClr>
+          </a:lnRef>
+          <a:fillRef idx="1">
+            <a:schemeClr val="accent1"/>
+          </a:fillRef>
+          <a:effectRef idx="0">
+            <a:schemeClr val="accent1"/>
+          </a:effectRef>
+          <a:fontRef idx="minor">
+            <a:schemeClr val="lt1"/>
+          </a:fontRef>
+        </p:style>
+        <p:txBody>
+          <a:bodyPr rtlCol="0" anchor="ctr"/>
+          <a:lstStyle/>
+          <a:p>
+            <a:pPr algn="ctr"/>
+            <a:r>
+              <a:rPr lang="en-US" sz="1200" dirty="0"/>
+              <a:t>Accept business SLA</a:t>
+            </a:r>
+          </a:p>
+        </p:txBody>
+      </p:sp>
+      <p:sp>
+        <p:nvSpPr>
+          <p:cNvPr id="25" name="Rectangle 24">
+            <a:extLst>
+              <a:ext uri="{FF2B5EF4-FFF2-40B4-BE49-F238E27FC236}">
+                <a16:creationId xmlns:a16="http://schemas.microsoft.com/office/drawing/2014/main" id="{F634A71E-F323-7049-B33D-A2478A695466}"/>
+              </a:ext>
+            </a:extLst>
+          </p:cNvPr>
+          <p:cNvSpPr/>
+          <p:nvPr/>
+        </p:nvSpPr>
+        <p:spPr>
+          <a:xfrm>
+            <a:off x="9739845" y="2747673"/>
+            <a:ext cx="1373407" cy="861800"/>
+          </a:xfrm>
+          <a:prstGeom prst="rect">
+            <a:avLst/>
+          </a:prstGeom>
+          <a:solidFill>
+            <a:srgbClr val="FFC000"/>
+          </a:solidFill>
+          <a:ln>
+            <a:solidFill>
+              <a:srgbClr val="FFC000"/>
+            </a:solidFill>
+          </a:ln>
+          <a:effectLst>
+            <a:outerShdw blurRad="101600" dist="38100" dir="5400000" algn="t" rotWithShape="0">
+              <a:prstClr val="black">
+                <a:alpha val="40000"/>
+              </a:prstClr>
+            </a:outerShdw>
+            <a:reflection blurRad="6350" stA="52000" endA="300" endPos="35000" dir="5400000" sy="-100000" algn="bl" rotWithShape="0"/>
+          </a:effectLst>
+        </p:spPr>
+        <p:style>
+          <a:lnRef idx="2">
+            <a:schemeClr val="accent1">
+              <a:shade val="50000"/>
+            </a:schemeClr>
+          </a:lnRef>
+          <a:fillRef idx="1">
+            <a:schemeClr val="accent1"/>
+          </a:fillRef>
+          <a:effectRef idx="0">
+            <a:schemeClr val="accent1"/>
+          </a:effectRef>
+          <a:fontRef idx="minor">
+            <a:schemeClr val="lt1"/>
+          </a:fontRef>
+        </p:style>
+        <p:txBody>
+          <a:bodyPr rtlCol="0" anchor="ctr"/>
+          <a:lstStyle/>
+          <a:p>
+            <a:pPr algn="ctr"/>
+            <a:r>
+              <a:rPr lang="en-US" sz="1200" dirty="0">
+                <a:solidFill>
+                  <a:schemeClr val="accent1">
+                    <a:lumMod val="50000"/>
+                  </a:schemeClr>
+                </a:solidFill>
+              </a:rPr>
+              <a:t>Order Confirmed accepting business conditions and SLA</a:t>
+            </a:r>
+          </a:p>
+        </p:txBody>
+      </p:sp>
+      <p:sp>
+        <p:nvSpPr>
+          <p:cNvPr id="28" name="Rectangle 27">
+            <a:extLst>
+              <a:ext uri="{FF2B5EF4-FFF2-40B4-BE49-F238E27FC236}">
+                <a16:creationId xmlns:a16="http://schemas.microsoft.com/office/drawing/2014/main" id="{4E3A28C7-18D5-1D40-B7A8-B31964166D1E}"/>
+              </a:ext>
+            </a:extLst>
+          </p:cNvPr>
+          <p:cNvSpPr/>
+          <p:nvPr/>
+        </p:nvSpPr>
+        <p:spPr>
+          <a:xfrm>
+            <a:off x="9721988" y="3808867"/>
+            <a:ext cx="1373407" cy="556522"/>
           </a:xfrm>
           <a:prstGeom prst="rect">
             <a:avLst/>
@@ -9534,7 +10115,113 @@
                   </a:schemeClr>
                 </a:solidFill>
               </a:rPr>
-              <a:t>containerID</a:t>
+              <a:t>OrderID </a:t>
+            </a:r>
+          </a:p>
+          <a:p>
+            <a:r>
+              <a:rPr lang="en-US" sz="1400" dirty="0">
+                <a:solidFill>
+                  <a:schemeClr val="accent1">
+                    <a:lumMod val="75000"/>
+                  </a:schemeClr>
+                </a:solidFill>
+              </a:rPr>
+              <a:t>SLA conditions</a:t>
+            </a:r>
+          </a:p>
+        </p:txBody>
+      </p:sp>
+      <p:sp>
+        <p:nvSpPr>
+          <p:cNvPr id="32" name="Rectangle 31">
+            <a:extLst>
+              <a:ext uri="{FF2B5EF4-FFF2-40B4-BE49-F238E27FC236}">
+                <a16:creationId xmlns:a16="http://schemas.microsoft.com/office/drawing/2014/main" id="{A2BAEC50-9D7B-AB4F-9E56-9D7679F7FA83}"/>
+              </a:ext>
+            </a:extLst>
+          </p:cNvPr>
+          <p:cNvSpPr/>
+          <p:nvPr/>
+        </p:nvSpPr>
+        <p:spPr>
+          <a:xfrm>
+            <a:off x="9683819" y="4564783"/>
+            <a:ext cx="1449743" cy="567232"/>
+          </a:xfrm>
+          <a:prstGeom prst="rect">
+            <a:avLst/>
+          </a:prstGeom>
+          <a:solidFill>
+            <a:schemeClr val="accent6">
+              <a:lumMod val="60000"/>
+              <a:lumOff val="40000"/>
+            </a:schemeClr>
+          </a:solidFill>
+          <a:ln>
+            <a:noFill/>
+          </a:ln>
+          <a:effectLst>
+            <a:outerShdw blurRad="50800" dist="63500" dir="5400000" algn="t" rotWithShape="0">
+              <a:prstClr val="black">
+                <a:alpha val="40000"/>
+              </a:prstClr>
+            </a:outerShdw>
+            <a:reflection blurRad="6350" stA="52000" endA="300" endPos="35000" dir="5400000" sy="-100000" algn="bl" rotWithShape="0"/>
+          </a:effectLst>
+        </p:spPr>
+        <p:style>
+          <a:lnRef idx="2">
+            <a:schemeClr val="accent1">
+              <a:shade val="50000"/>
+            </a:schemeClr>
+          </a:lnRef>
+          <a:fillRef idx="1">
+            <a:schemeClr val="accent1"/>
+          </a:fillRef>
+          <a:effectRef idx="0">
+            <a:schemeClr val="accent1"/>
+          </a:effectRef>
+          <a:fontRef idx="minor">
+            <a:schemeClr val="lt1"/>
+          </a:fontRef>
+        </p:style>
+        <p:txBody>
+          <a:bodyPr rtlCol="0" anchor="ctr"/>
+          <a:lstStyle/>
+          <a:p>
+            <a:pPr algn="ctr"/>
+            <a:r>
+              <a:rPr lang="en-US" sz="1400" u="sng" dirty="0">
+                <a:solidFill>
+                  <a:schemeClr val="accent1">
+                    <a:lumMod val="75000"/>
+                  </a:schemeClr>
+                </a:solidFill>
+              </a:rPr>
+              <a:t>Order</a:t>
+            </a:r>
+            <a:r>
+              <a:rPr lang="en-US" sz="1400" dirty="0">
+                <a:solidFill>
+                  <a:schemeClr val="accent1">
+                    <a:lumMod val="75000"/>
+                  </a:schemeClr>
+                </a:solidFill>
+              </a:rPr>
+              <a:t>:</a:t>
+            </a:r>
+          </a:p>
+          <a:p>
+            <a:r>
+              <a:rPr lang="en-US" sz="1400" dirty="0">
+                <a:solidFill>
+                  <a:schemeClr val="accent1">
+                    <a:lumMod val="75000"/>
+                  </a:schemeClr>
+                </a:solidFill>
+              </a:rPr>
+              <a:t>OrderID </a:t>
             </a:r>
           </a:p>
         </p:txBody>
@@ -9571,10 +10258,45 @@
       </p:grpSpPr>
       <p:sp>
         <p:nvSpPr>
-          <p:cNvPr id="10" name="Rectangle 9">
-            <a:extLst>
-              <a:ext uri="{FF2B5EF4-FFF2-40B4-BE49-F238E27FC236}">
-                <a16:creationId xmlns:a16="http://schemas.microsoft.com/office/drawing/2014/main" id="{94BDEBB4-111D-DD44-BA6B-821921BFC98F}"/>
+          <p:cNvPr id="6" name="Title 5">
+            <a:extLst>
+              <a:ext uri="{FF2B5EF4-FFF2-40B4-BE49-F238E27FC236}">
+                <a16:creationId xmlns:a16="http://schemas.microsoft.com/office/drawing/2014/main" id="{29A30EFF-9F58-644A-BD06-3468747591DC}"/>
+              </a:ext>
+            </a:extLst>
+          </p:cNvPr>
+          <p:cNvSpPr>
+            <a:spLocks noGrp="1"/>
+          </p:cNvSpPr>
+          <p:nvPr>
+            <p:ph type="title"/>
+          </p:nvPr>
+        </p:nvSpPr>
+        <p:spPr>
+          <a:xfrm>
+            <a:off x="838200" y="365125"/>
+            <a:ext cx="10515600" cy="400689"/>
+          </a:xfrm>
+        </p:spPr>
+        <p:txBody>
+          <a:bodyPr>
+            <a:normAutofit fontScale="90000"/>
+          </a:bodyPr>
+          <a:lstStyle/>
+          <a:p>
+            <a:r>
+              <a:rPr lang="en-US" dirty="0"/>
+              <a:t>Grouping</a:t>
+            </a:r>
+          </a:p>
+        </p:txBody>
+      </p:sp>
+      <p:sp>
+        <p:nvSpPr>
+          <p:cNvPr id="8" name="Rectangle 7">
+            <a:extLst>
+              <a:ext uri="{FF2B5EF4-FFF2-40B4-BE49-F238E27FC236}">
+                <a16:creationId xmlns:a16="http://schemas.microsoft.com/office/drawing/2014/main" id="{614C5C78-74E9-7E46-A3A2-84840FE21C18}"/>
               </a:ext>
             </a:extLst>
           </p:cNvPr>
@@ -9583,8 +10305,8 @@
         </p:nvSpPr>
         <p:spPr>
           <a:xfrm>
-            <a:off x="1792297" y="1216191"/>
-            <a:ext cx="1211339" cy="1338973"/>
+            <a:off x="86938" y="2503548"/>
+            <a:ext cx="1001927" cy="851936"/>
           </a:xfrm>
           <a:prstGeom prst="rect">
             <a:avLst/>
@@ -9627,37 +10349,24 @@
           <a:p>
             <a:pPr algn="ctr"/>
             <a:r>
-              <a:rPr lang="en-US" sz="1200" dirty="0">
+              <a:rPr lang="en-US" sz="1067" dirty="0">
                 <a:solidFill>
                   <a:schemeClr val="accent1">
                     <a:lumMod val="50000"/>
                   </a:schemeClr>
                 </a:solidFill>
               </a:rPr>
-              <a:t>New</a:t>
-            </a:r>
-          </a:p>
-          <a:p>
-            <a:pPr algn="ctr"/>
-            <a:r>
-              <a:rPr lang="en-US" sz="1200" dirty="0">
-                <a:solidFill>
-                  <a:schemeClr val="accent1">
-                    <a:lumMod val="50000"/>
-                  </a:schemeClr>
-                </a:solidFill>
-              </a:rPr>
-              <a:t>shipment order created </a:t>
-            </a:r>
-          </a:p>
-        </p:txBody>
-      </p:sp>
-      <p:sp>
-        <p:nvSpPr>
-          <p:cNvPr id="12" name="Rectangle 11">
-            <a:extLst>
-              <a:ext uri="{FF2B5EF4-FFF2-40B4-BE49-F238E27FC236}">
-                <a16:creationId xmlns:a16="http://schemas.microsoft.com/office/drawing/2014/main" id="{9AD07653-A2A9-3046-B7EB-2CEC95B06163}"/>
+              <a:t>Fresh cargo shipment order placed</a:t>
+            </a:r>
+          </a:p>
+        </p:txBody>
+      </p:sp>
+      <p:sp>
+        <p:nvSpPr>
+          <p:cNvPr id="10" name="Rectangle 9">
+            <a:extLst>
+              <a:ext uri="{FF2B5EF4-FFF2-40B4-BE49-F238E27FC236}">
+                <a16:creationId xmlns:a16="http://schemas.microsoft.com/office/drawing/2014/main" id="{DB91DBB3-8D77-FF42-A692-BE79F08BD1D1}"/>
               </a:ext>
             </a:extLst>
           </p:cNvPr>
@@ -9666,8 +10375,8 @@
         </p:nvSpPr>
         <p:spPr>
           <a:xfrm>
-            <a:off x="3790098" y="4491198"/>
-            <a:ext cx="1094190" cy="1338989"/>
+            <a:off x="7633296" y="2754805"/>
+            <a:ext cx="905031" cy="824084"/>
           </a:xfrm>
           <a:prstGeom prst="rect">
             <a:avLst/>
@@ -9710,69 +10419,34 @@
           <a:p>
             <a:pPr algn="ctr"/>
             <a:r>
-              <a:rPr lang="en-US" sz="1200" dirty="0">
+              <a:rPr lang="en-US" sz="1067" dirty="0">
                 <a:solidFill>
                   <a:schemeClr val="accent1">
                     <a:lumMod val="50000"/>
                   </a:schemeClr>
                 </a:solidFill>
               </a:rPr>
-              <a:t>Container Assigned  </a:t>
-            </a:r>
-          </a:p>
-        </p:txBody>
-      </p:sp>
-      <p:sp>
-        <p:nvSpPr>
-          <p:cNvPr id="31" name="TextBox 30">
-            <a:extLst>
-              <a:ext uri="{FF2B5EF4-FFF2-40B4-BE49-F238E27FC236}">
-                <a16:creationId xmlns:a16="http://schemas.microsoft.com/office/drawing/2014/main" id="{1C1278A8-FBCD-B243-9CAB-ED2D001A4B5B}"/>
-              </a:ext>
-            </a:extLst>
-          </p:cNvPr>
-          <p:cNvSpPr txBox="1"/>
+              <a:t>Reefer container assigned  </a:t>
+            </a:r>
+          </a:p>
+        </p:txBody>
+      </p:sp>
+      <p:sp>
+        <p:nvSpPr>
+          <p:cNvPr id="13" name="Rectangle 12">
+            <a:extLst>
+              <a:ext uri="{FF2B5EF4-FFF2-40B4-BE49-F238E27FC236}">
+                <a16:creationId xmlns:a16="http://schemas.microsoft.com/office/drawing/2014/main" id="{D6A3732D-858C-B74C-ADED-EA6E3CB7D0EF}"/>
+              </a:ext>
+            </a:extLst>
+          </p:cNvPr>
+          <p:cNvSpPr/>
           <p:nvPr/>
         </p:nvSpPr>
         <p:spPr>
           <a:xfrm>
-            <a:off x="11113252" y="6245525"/>
-            <a:ext cx="575799" cy="369332"/>
-          </a:xfrm>
-          <a:prstGeom prst="rect">
-            <a:avLst/>
-          </a:prstGeom>
-          <a:noFill/>
-        </p:spPr>
-        <p:txBody>
-          <a:bodyPr wrap="none" rtlCol="0">
-            <a:spAutoFit/>
-          </a:bodyPr>
-          <a:lstStyle/>
-          <a:p>
-            <a:r>
-              <a:rPr lang="en-US" dirty="0"/>
-              <a:t>3&gt;…</a:t>
-            </a:r>
-          </a:p>
-        </p:txBody>
-      </p:sp>
-      <p:sp>
-        <p:nvSpPr>
-          <p:cNvPr id="28" name="Rectangle 27">
-            <a:extLst>
-              <a:ext uri="{FF2B5EF4-FFF2-40B4-BE49-F238E27FC236}">
-                <a16:creationId xmlns:a16="http://schemas.microsoft.com/office/drawing/2014/main" id="{1E54BC24-62CE-3643-9A72-0A5B9E1C7D47}"/>
-              </a:ext>
-            </a:extLst>
-          </p:cNvPr>
-          <p:cNvSpPr/>
-          <p:nvPr/>
-        </p:nvSpPr>
-        <p:spPr>
-          <a:xfrm>
-            <a:off x="1123073" y="3821705"/>
-            <a:ext cx="1211339" cy="1338988"/>
+            <a:off x="6321065" y="2754805"/>
+            <a:ext cx="1001927" cy="851935"/>
           </a:xfrm>
           <a:prstGeom prst="rect">
             <a:avLst/>
@@ -9815,7 +10489,7 @@
           <a:p>
             <a:pPr algn="ctr"/>
             <a:r>
-              <a:rPr lang="en-US" sz="1200" dirty="0">
+              <a:rPr lang="en-US" sz="1067" dirty="0">
                 <a:solidFill>
                   <a:schemeClr val="accent1">
                     <a:lumMod val="50000"/>
@@ -9828,7 +10502,7 @@
           <a:p>
             <a:pPr algn="ctr"/>
             <a:r>
-              <a:rPr lang="en-US" sz="1200" dirty="0">
+              <a:rPr lang="en-US" sz="1067" dirty="0">
                 <a:solidFill>
                   <a:schemeClr val="accent1">
                     <a:lumMod val="50000"/>
@@ -9842,10 +10516,10 @@
       </p:sp>
       <p:sp>
         <p:nvSpPr>
-          <p:cNvPr id="23" name="Rectangle 22">
-            <a:extLst>
-              <a:ext uri="{FF2B5EF4-FFF2-40B4-BE49-F238E27FC236}">
-                <a16:creationId xmlns:a16="http://schemas.microsoft.com/office/drawing/2014/main" id="{30DA95EA-7952-F340-A061-896AB0710C29}"/>
+          <p:cNvPr id="16" name="Rectangle 15">
+            <a:extLst>
+              <a:ext uri="{FF2B5EF4-FFF2-40B4-BE49-F238E27FC236}">
+                <a16:creationId xmlns:a16="http://schemas.microsoft.com/office/drawing/2014/main" id="{9E143729-F4D8-2A45-9B0E-219FA4393D22}"/>
               </a:ext>
             </a:extLst>
           </p:cNvPr>
@@ -9854,8 +10528,8 @@
         </p:nvSpPr>
         <p:spPr>
           <a:xfrm>
-            <a:off x="10426548" y="4391488"/>
-            <a:ext cx="1373407" cy="1159443"/>
+            <a:off x="2523572" y="2505878"/>
+            <a:ext cx="1355208" cy="851936"/>
           </a:xfrm>
           <a:prstGeom prst="rect">
             <a:avLst/>
@@ -9898,24 +10572,24 @@
           <a:p>
             <a:pPr algn="ctr"/>
             <a:r>
-              <a:rPr lang="en-US" sz="1200" dirty="0">
+              <a:rPr lang="en-US" sz="1067" dirty="0">
                 <a:solidFill>
                   <a:schemeClr val="accent1">
                     <a:lumMod val="50000"/>
                   </a:schemeClr>
                 </a:solidFill>
               </a:rPr>
-              <a:t>Order Confirmed accepting business conditions and SLA</a:t>
-            </a:r>
-          </a:p>
-        </p:txBody>
-      </p:sp>
-      <p:sp>
-        <p:nvSpPr>
-          <p:cNvPr id="19" name="Rounded Rectangle 18">
-            <a:extLst>
-              <a:ext uri="{FF2B5EF4-FFF2-40B4-BE49-F238E27FC236}">
-                <a16:creationId xmlns:a16="http://schemas.microsoft.com/office/drawing/2014/main" id="{CBDC66B3-9F34-1F4A-8473-55062527034A}"/>
+              <a:t>Order confirmed accepting business conditions and SLA</a:t>
+            </a:r>
+          </a:p>
+        </p:txBody>
+      </p:sp>
+      <p:sp>
+        <p:nvSpPr>
+          <p:cNvPr id="23" name="Rounded Rectangle 22">
+            <a:extLst>
+              <a:ext uri="{FF2B5EF4-FFF2-40B4-BE49-F238E27FC236}">
+                <a16:creationId xmlns:a16="http://schemas.microsoft.com/office/drawing/2014/main" id="{88972E8B-AD97-E846-8FE9-44C78FA39D32}"/>
               </a:ext>
             </a:extLst>
           </p:cNvPr>
@@ -9924,8 +10598,8 @@
         </p:nvSpPr>
         <p:spPr>
           <a:xfrm>
-            <a:off x="580959" y="161662"/>
-            <a:ext cx="1211338" cy="672861"/>
+            <a:off x="86938" y="1176946"/>
+            <a:ext cx="1211338" cy="256545"/>
           </a:xfrm>
           <a:prstGeom prst="roundRect">
             <a:avLst/>
@@ -9968,17 +10642,17 @@
                   </a:schemeClr>
                 </a:solidFill>
               </a:rPr>
-              <a:t>Manufacturer</a:t>
-            </a:r>
-          </a:p>
-        </p:txBody>
-      </p:sp>
-      <p:sp>
-        <p:nvSpPr>
-          <p:cNvPr id="20" name="Rectangle 19">
-            <a:extLst>
-              <a:ext uri="{FF2B5EF4-FFF2-40B4-BE49-F238E27FC236}">
-                <a16:creationId xmlns:a16="http://schemas.microsoft.com/office/drawing/2014/main" id="{4C2B6D74-B4E0-1440-BFDE-480758CDA036}"/>
+              <a:t>Customer</a:t>
+            </a:r>
+          </a:p>
+        </p:txBody>
+      </p:sp>
+      <p:sp>
+        <p:nvSpPr>
+          <p:cNvPr id="24" name="Rectangle 23">
+            <a:extLst>
+              <a:ext uri="{FF2B5EF4-FFF2-40B4-BE49-F238E27FC236}">
+                <a16:creationId xmlns:a16="http://schemas.microsoft.com/office/drawing/2014/main" id="{860AB600-0204-FB49-87F5-D366133C77D8}"/>
               </a:ext>
             </a:extLst>
           </p:cNvPr>
@@ -9987,12 +10661,18 @@
         </p:nvSpPr>
         <p:spPr>
           <a:xfrm>
-            <a:off x="825359" y="923551"/>
-            <a:ext cx="928343" cy="1027977"/>
+            <a:off x="86938" y="1528851"/>
+            <a:ext cx="928343" cy="851937"/>
           </a:xfrm>
           <a:prstGeom prst="rect">
             <a:avLst/>
           </a:prstGeom>
+          <a:solidFill>
+            <a:srgbClr val="0070C0"/>
+          </a:solidFill>
+          <a:ln>
+            <a:noFill/>
+          </a:ln>
           <a:effectLst>
             <a:outerShdw blurRad="50800" dist="38100" dir="5400000" algn="t" rotWithShape="0">
               <a:prstClr val="black">
@@ -10031,10 +10711,10 @@
       </p:sp>
       <p:sp>
         <p:nvSpPr>
-          <p:cNvPr id="25" name="Rectangle 24">
-            <a:extLst>
-              <a:ext uri="{FF2B5EF4-FFF2-40B4-BE49-F238E27FC236}">
-                <a16:creationId xmlns:a16="http://schemas.microsoft.com/office/drawing/2014/main" id="{6178CA54-88BC-8C47-94C3-FA853E19C956}"/>
+          <p:cNvPr id="26" name="Rectangle 25">
+            <a:extLst>
+              <a:ext uri="{FF2B5EF4-FFF2-40B4-BE49-F238E27FC236}">
+                <a16:creationId xmlns:a16="http://schemas.microsoft.com/office/drawing/2014/main" id="{FC69CA96-DE2E-DF4D-9642-1F8E247040A3}"/>
               </a:ext>
             </a:extLst>
           </p:cNvPr>
@@ -10043,12 +10723,18 @@
         </p:nvSpPr>
         <p:spPr>
           <a:xfrm>
-            <a:off x="6275928" y="3149987"/>
+            <a:off x="5167657" y="1573760"/>
             <a:ext cx="928343" cy="1027977"/>
           </a:xfrm>
           <a:prstGeom prst="rect">
             <a:avLst/>
           </a:prstGeom>
+          <a:solidFill>
+            <a:srgbClr val="0070C0"/>
+          </a:solidFill>
+          <a:ln>
+            <a:noFill/>
+          </a:ln>
           <a:effectLst>
             <a:outerShdw blurRad="50800" dist="38100" dir="5400000" algn="t" rotWithShape="0">
               <a:prstClr val="black">
@@ -10087,10 +10773,10 @@
       </p:sp>
       <p:sp>
         <p:nvSpPr>
-          <p:cNvPr id="34" name="Rounded Rectangle 33">
-            <a:extLst>
-              <a:ext uri="{FF2B5EF4-FFF2-40B4-BE49-F238E27FC236}">
-                <a16:creationId xmlns:a16="http://schemas.microsoft.com/office/drawing/2014/main" id="{7650C00B-64D2-7F44-B415-8954234C5B68}"/>
+          <p:cNvPr id="27" name="Rounded Rectangle 26">
+            <a:extLst>
+              <a:ext uri="{FF2B5EF4-FFF2-40B4-BE49-F238E27FC236}">
+                <a16:creationId xmlns:a16="http://schemas.microsoft.com/office/drawing/2014/main" id="{EE4ACF7C-96C8-8B4F-A42F-D6D83C3D9776}"/>
               </a:ext>
             </a:extLst>
           </p:cNvPr>
@@ -10099,8 +10785,8 @@
         </p:nvSpPr>
         <p:spPr>
           <a:xfrm>
-            <a:off x="5034119" y="3148844"/>
-            <a:ext cx="1211338" cy="672861"/>
+            <a:off x="7288265" y="765814"/>
+            <a:ext cx="1069821" cy="536305"/>
           </a:xfrm>
           <a:prstGeom prst="roundRect">
             <a:avLst/>
@@ -10150,10 +10836,10 @@
       </p:sp>
       <p:sp>
         <p:nvSpPr>
-          <p:cNvPr id="36" name="Rectangle 35">
-            <a:extLst>
-              <a:ext uri="{FF2B5EF4-FFF2-40B4-BE49-F238E27FC236}">
-                <a16:creationId xmlns:a16="http://schemas.microsoft.com/office/drawing/2014/main" id="{4D2BEF67-482B-4646-99F1-A31B28299549}"/>
+          <p:cNvPr id="28" name="Rectangle 27">
+            <a:extLst>
+              <a:ext uri="{FF2B5EF4-FFF2-40B4-BE49-F238E27FC236}">
+                <a16:creationId xmlns:a16="http://schemas.microsoft.com/office/drawing/2014/main" id="{1AF82783-EFBC-2441-8FD6-E00EC1B56C77}"/>
               </a:ext>
             </a:extLst>
           </p:cNvPr>
@@ -10162,8 +10848,258 @@
         </p:nvSpPr>
         <p:spPr>
           <a:xfrm>
-            <a:off x="7345769" y="3200161"/>
-            <a:ext cx="1373407" cy="987593"/>
+            <a:off x="4726998" y="5054963"/>
+            <a:ext cx="2534576" cy="1159443"/>
+          </a:xfrm>
+          <a:prstGeom prst="rect">
+            <a:avLst/>
+          </a:prstGeom>
+          <a:solidFill>
+            <a:srgbClr val="FFD1EC"/>
+          </a:solidFill>
+          <a:ln>
+            <a:solidFill>
+              <a:srgbClr val="FFD1EC"/>
+            </a:solidFill>
+          </a:ln>
+        </p:spPr>
+        <p:style>
+          <a:lnRef idx="2">
+            <a:schemeClr val="accent1">
+              <a:shade val="50000"/>
+            </a:schemeClr>
+          </a:lnRef>
+          <a:fillRef idx="1">
+            <a:schemeClr val="accent1"/>
+          </a:fillRef>
+          <a:effectRef idx="0">
+            <a:schemeClr val="accent1"/>
+          </a:effectRef>
+          <a:fontRef idx="minor">
+            <a:schemeClr val="lt1"/>
+          </a:fontRef>
+        </p:style>
+        <p:txBody>
+          <a:bodyPr rtlCol="0" anchor="ctr"/>
+          <a:lstStyle/>
+          <a:p>
+            <a:pPr algn="ctr"/>
+            <a:r>
+              <a:rPr lang="en-US" sz="1200" dirty="0">
+                <a:solidFill>
+                  <a:schemeClr val="accent1">
+                    <a:lumMod val="50000"/>
+                  </a:schemeClr>
+                </a:solidFill>
+              </a:rPr>
+              <a:t>Whenever shipment order placed, trigger adjust confirmation penalty clauses </a:t>
+            </a:r>
+          </a:p>
+        </p:txBody>
+      </p:sp>
+      <p:sp>
+        <p:nvSpPr>
+          <p:cNvPr id="29" name="Rectangle 28">
+            <a:extLst>
+              <a:ext uri="{FF2B5EF4-FFF2-40B4-BE49-F238E27FC236}">
+                <a16:creationId xmlns:a16="http://schemas.microsoft.com/office/drawing/2014/main" id="{CC87F7E7-78A4-1C44-961E-CFC0F160DCF0}"/>
+              </a:ext>
+            </a:extLst>
+          </p:cNvPr>
+          <p:cNvSpPr/>
+          <p:nvPr/>
+        </p:nvSpPr>
+        <p:spPr>
+          <a:xfrm>
+            <a:off x="4726998" y="3917300"/>
+            <a:ext cx="3062684" cy="981543"/>
+          </a:xfrm>
+          <a:prstGeom prst="rect">
+            <a:avLst/>
+          </a:prstGeom>
+          <a:solidFill>
+            <a:srgbClr val="FFD1EC"/>
+          </a:solidFill>
+          <a:ln>
+            <a:solidFill>
+              <a:srgbClr val="FFD1EC"/>
+            </a:solidFill>
+          </a:ln>
+        </p:spPr>
+        <p:style>
+          <a:lnRef idx="2">
+            <a:schemeClr val="accent1">
+              <a:shade val="50000"/>
+            </a:schemeClr>
+          </a:lnRef>
+          <a:fillRef idx="1">
+            <a:schemeClr val="accent1"/>
+          </a:fillRef>
+          <a:effectRef idx="0">
+            <a:schemeClr val="accent1"/>
+          </a:effectRef>
+          <a:fontRef idx="minor">
+            <a:schemeClr val="lt1"/>
+          </a:fontRef>
+        </p:style>
+        <p:txBody>
+          <a:bodyPr rtlCol="0" anchor="ctr"/>
+          <a:lstStyle/>
+          <a:p>
+            <a:pPr algn="ctr"/>
+            <a:r>
+              <a:rPr lang="en-US" sz="1200" dirty="0">
+                <a:solidFill>
+                  <a:schemeClr val="accent1">
+                    <a:lumMod val="50000"/>
+                  </a:schemeClr>
+                </a:solidFill>
+              </a:rPr>
+              <a:t>Whenever shipment order placed, reserve voyage and Reefer container</a:t>
+            </a:r>
+          </a:p>
+        </p:txBody>
+      </p:sp>
+      <p:sp>
+        <p:nvSpPr>
+          <p:cNvPr id="17" name="Rectangle 16">
+            <a:extLst>
+              <a:ext uri="{FF2B5EF4-FFF2-40B4-BE49-F238E27FC236}">
+                <a16:creationId xmlns:a16="http://schemas.microsoft.com/office/drawing/2014/main" id="{D7AC4898-69E1-E94E-A07C-67CF2FC7DBCD}"/>
+              </a:ext>
+            </a:extLst>
+          </p:cNvPr>
+          <p:cNvSpPr/>
+          <p:nvPr/>
+        </p:nvSpPr>
+        <p:spPr>
+          <a:xfrm>
+            <a:off x="2484569" y="1512713"/>
+            <a:ext cx="928343" cy="851937"/>
+          </a:xfrm>
+          <a:prstGeom prst="rect">
+            <a:avLst/>
+          </a:prstGeom>
+          <a:solidFill>
+            <a:srgbClr val="0070C0"/>
+          </a:solidFill>
+          <a:ln>
+            <a:noFill/>
+          </a:ln>
+          <a:effectLst>
+            <a:outerShdw blurRad="50800" dist="38100" dir="5400000" algn="t" rotWithShape="0">
+              <a:prstClr val="black">
+                <a:alpha val="40000"/>
+              </a:prstClr>
+            </a:outerShdw>
+          </a:effectLst>
+        </p:spPr>
+        <p:style>
+          <a:lnRef idx="2">
+            <a:schemeClr val="accent1">
+              <a:shade val="50000"/>
+            </a:schemeClr>
+          </a:lnRef>
+          <a:fillRef idx="1">
+            <a:schemeClr val="accent1"/>
+          </a:fillRef>
+          <a:effectRef idx="0">
+            <a:schemeClr val="accent1"/>
+          </a:effectRef>
+          <a:fontRef idx="minor">
+            <a:schemeClr val="lt1"/>
+          </a:fontRef>
+        </p:style>
+        <p:txBody>
+          <a:bodyPr rtlCol="0" anchor="ctr"/>
+          <a:lstStyle/>
+          <a:p>
+            <a:pPr algn="ctr"/>
+            <a:r>
+              <a:rPr lang="en-US" sz="1200" dirty="0"/>
+              <a:t>Confirm Shipment Order</a:t>
+            </a:r>
+          </a:p>
+        </p:txBody>
+      </p:sp>
+      <p:sp>
+        <p:nvSpPr>
+          <p:cNvPr id="18" name="Rectangle 17">
+            <a:extLst>
+              <a:ext uri="{FF2B5EF4-FFF2-40B4-BE49-F238E27FC236}">
+                <a16:creationId xmlns:a16="http://schemas.microsoft.com/office/drawing/2014/main" id="{76B65D53-5A3F-014D-AC3A-C0585DECAA62}"/>
+              </a:ext>
+            </a:extLst>
+          </p:cNvPr>
+          <p:cNvSpPr/>
+          <p:nvPr/>
+        </p:nvSpPr>
+        <p:spPr>
+          <a:xfrm>
+            <a:off x="1259273" y="1528851"/>
+            <a:ext cx="928343" cy="851937"/>
+          </a:xfrm>
+          <a:prstGeom prst="rect">
+            <a:avLst/>
+          </a:prstGeom>
+          <a:solidFill>
+            <a:srgbClr val="0070C0"/>
+          </a:solidFill>
+          <a:ln>
+            <a:noFill/>
+          </a:ln>
+          <a:effectLst>
+            <a:outerShdw blurRad="50800" dist="38100" dir="5400000" algn="t" rotWithShape="0">
+              <a:prstClr val="black">
+                <a:alpha val="40000"/>
+              </a:prstClr>
+            </a:outerShdw>
+          </a:effectLst>
+        </p:spPr>
+        <p:style>
+          <a:lnRef idx="2">
+            <a:schemeClr val="accent1">
+              <a:shade val="50000"/>
+            </a:schemeClr>
+          </a:lnRef>
+          <a:fillRef idx="1">
+            <a:schemeClr val="accent1"/>
+          </a:fillRef>
+          <a:effectRef idx="0">
+            <a:schemeClr val="accent1"/>
+          </a:effectRef>
+          <a:fontRef idx="minor">
+            <a:schemeClr val="lt1"/>
+          </a:fontRef>
+        </p:style>
+        <p:txBody>
+          <a:bodyPr rtlCol="0" anchor="ctr"/>
+          <a:lstStyle/>
+          <a:p>
+            <a:pPr algn="ctr"/>
+            <a:r>
+              <a:rPr lang="en-US" sz="1200" dirty="0"/>
+              <a:t>Update Shipment Order</a:t>
+            </a:r>
+          </a:p>
+        </p:txBody>
+      </p:sp>
+      <p:sp>
+        <p:nvSpPr>
+          <p:cNvPr id="19" name="Rectangle 18">
+            <a:extLst>
+              <a:ext uri="{FF2B5EF4-FFF2-40B4-BE49-F238E27FC236}">
+                <a16:creationId xmlns:a16="http://schemas.microsoft.com/office/drawing/2014/main" id="{4BF906AE-FF62-8B47-95A9-4DE01D1BD765}"/>
+              </a:ext>
+            </a:extLst>
+          </p:cNvPr>
+          <p:cNvSpPr/>
+          <p:nvPr/>
+        </p:nvSpPr>
+        <p:spPr>
+          <a:xfrm>
+            <a:off x="1259273" y="2505878"/>
+            <a:ext cx="1001927" cy="851936"/>
           </a:xfrm>
           <a:prstGeom prst="rect">
             <a:avLst/>
@@ -10206,37 +11142,24 @@
           <a:p>
             <a:pPr algn="ctr"/>
             <a:r>
-              <a:rPr lang="en-US" sz="1200" dirty="0">
+              <a:rPr lang="en-US" sz="1067" dirty="0">
                 <a:solidFill>
                   <a:schemeClr val="accent1">
                     <a:lumMod val="50000"/>
                   </a:schemeClr>
                 </a:solidFill>
               </a:rPr>
-              <a:t>Order business conditions and SLA</a:t>
-            </a:r>
-          </a:p>
-          <a:p>
-            <a:pPr algn="ctr"/>
-            <a:r>
-              <a:rPr lang="en-US" sz="1200" dirty="0">
-                <a:solidFill>
-                  <a:schemeClr val="accent1">
-                    <a:lumMod val="50000"/>
-                  </a:schemeClr>
-                </a:solidFill>
-              </a:rPr>
-              <a:t>Received</a:t>
-            </a:r>
-          </a:p>
-        </p:txBody>
-      </p:sp>
-      <p:sp>
-        <p:nvSpPr>
-          <p:cNvPr id="37" name="Rounded Rectangle 36">
-            <a:extLst>
-              <a:ext uri="{FF2B5EF4-FFF2-40B4-BE49-F238E27FC236}">
-                <a16:creationId xmlns:a16="http://schemas.microsoft.com/office/drawing/2014/main" id="{D13CD505-7A2F-EB49-B6B0-9E5319E5CB74}"/>
+              <a:t>Shipment order updated</a:t>
+            </a:r>
+          </a:p>
+        </p:txBody>
+      </p:sp>
+      <p:sp>
+        <p:nvSpPr>
+          <p:cNvPr id="20" name="Rectangle 19">
+            <a:extLst>
+              <a:ext uri="{FF2B5EF4-FFF2-40B4-BE49-F238E27FC236}">
+                <a16:creationId xmlns:a16="http://schemas.microsoft.com/office/drawing/2014/main" id="{A5A33B81-EFE7-8346-B69F-D8AB37304A87}"/>
               </a:ext>
             </a:extLst>
           </p:cNvPr>
@@ -10245,75 +11168,18 @@
         </p:nvSpPr>
         <p:spPr>
           <a:xfrm>
-            <a:off x="10373890" y="2475983"/>
-            <a:ext cx="1211338" cy="672861"/>
-          </a:xfrm>
-          <a:prstGeom prst="roundRect">
-            <a:avLst/>
-          </a:prstGeom>
-          <a:solidFill>
-            <a:srgbClr val="FFFF00"/>
-          </a:solidFill>
-          <a:ln>
-            <a:solidFill>
-              <a:srgbClr val="FFFF00"/>
-            </a:solidFill>
-          </a:ln>
-        </p:spPr>
-        <p:style>
-          <a:lnRef idx="2">
-            <a:schemeClr val="accent1">
-              <a:shade val="50000"/>
-            </a:schemeClr>
-          </a:lnRef>
-          <a:fillRef idx="1">
-            <a:schemeClr val="accent1"/>
-          </a:fillRef>
-          <a:effectRef idx="0">
-            <a:schemeClr val="accent1"/>
-          </a:effectRef>
-          <a:fontRef idx="minor">
-            <a:schemeClr val="lt1"/>
-          </a:fontRef>
-        </p:style>
-        <p:txBody>
-          <a:bodyPr rtlCol="0" anchor="ctr"/>
-          <a:lstStyle/>
-          <a:p>
-            <a:pPr algn="ctr"/>
-            <a:r>
-              <a:rPr lang="en-US" sz="1200" dirty="0">
-                <a:solidFill>
-                  <a:schemeClr val="accent1">
-                    <a:lumMod val="50000"/>
-                  </a:schemeClr>
-                </a:solidFill>
-              </a:rPr>
-              <a:t>Manufacturer</a:t>
-            </a:r>
-          </a:p>
-        </p:txBody>
-      </p:sp>
-      <p:sp>
-        <p:nvSpPr>
-          <p:cNvPr id="38" name="Rectangle 37">
-            <a:extLst>
-              <a:ext uri="{FF2B5EF4-FFF2-40B4-BE49-F238E27FC236}">
-                <a16:creationId xmlns:a16="http://schemas.microsoft.com/office/drawing/2014/main" id="{6A607C85-D6FB-F74E-9D7F-F04188C9F402}"/>
-              </a:ext>
-            </a:extLst>
-          </p:cNvPr>
-          <p:cNvSpPr/>
-          <p:nvPr/>
-        </p:nvSpPr>
-        <p:spPr>
-          <a:xfrm>
-            <a:off x="10426548" y="3307716"/>
+            <a:off x="6394649" y="1573760"/>
             <a:ext cx="928343" cy="1027977"/>
           </a:xfrm>
           <a:prstGeom prst="rect">
             <a:avLst/>
           </a:prstGeom>
+          <a:solidFill>
+            <a:srgbClr val="0070C0"/>
+          </a:solidFill>
+          <a:ln>
+            <a:noFill/>
+          </a:ln>
           <a:effectLst>
             <a:outerShdw blurRad="50800" dist="38100" dir="5400000" algn="t" rotWithShape="0">
               <a:prstClr val="black">
@@ -10345,7 +11211,14 @@
             <a:pPr algn="ctr"/>
             <a:r>
               <a:rPr lang="en-US" sz="1200" dirty="0"/>
-              <a:t>Confirm Order</a:t>
+              <a:t>Assign</a:t>
+            </a:r>
+          </a:p>
+          <a:p>
+            <a:pPr algn="ctr"/>
+            <a:r>
+              <a:rPr lang="en-US" sz="1200" dirty="0"/>
+              <a:t>Voyage</a:t>
             </a:r>
           </a:p>
         </p:txBody>
@@ -10355,7 +11228,7 @@
           <p:cNvPr id="21" name="Rectangle 20">
             <a:extLst>
               <a:ext uri="{FF2B5EF4-FFF2-40B4-BE49-F238E27FC236}">
-                <a16:creationId xmlns:a16="http://schemas.microsoft.com/office/drawing/2014/main" id="{CBAC4DE6-D549-9046-8314-8D6C8D170BC9}"/>
+                <a16:creationId xmlns:a16="http://schemas.microsoft.com/office/drawing/2014/main" id="{05AB4953-8365-CD43-AF9C-2C8CED5C0843}"/>
               </a:ext>
             </a:extLst>
           </p:cNvPr>
@@ -10364,19 +11237,427 @@
         </p:nvSpPr>
         <p:spPr>
           <a:xfrm>
-            <a:off x="6339974" y="4392601"/>
-            <a:ext cx="1429349" cy="1159443"/>
+            <a:off x="7621641" y="1573760"/>
+            <a:ext cx="928343" cy="1027977"/>
           </a:xfrm>
           <a:prstGeom prst="rect">
             <a:avLst/>
           </a:prstGeom>
           <a:solidFill>
-            <a:srgbClr val="FFD1EC"/>
+            <a:srgbClr val="0070C0"/>
+          </a:solidFill>
+          <a:ln>
+            <a:noFill/>
+          </a:ln>
+          <a:effectLst>
+            <a:outerShdw blurRad="50800" dist="38100" dir="5400000" algn="t" rotWithShape="0">
+              <a:prstClr val="black">
+                <a:alpha val="40000"/>
+              </a:prstClr>
+            </a:outerShdw>
+          </a:effectLst>
+        </p:spPr>
+        <p:style>
+          <a:lnRef idx="2">
+            <a:schemeClr val="accent1">
+              <a:shade val="50000"/>
+            </a:schemeClr>
+          </a:lnRef>
+          <a:fillRef idx="1">
+            <a:schemeClr val="accent1"/>
+          </a:fillRef>
+          <a:effectRef idx="0">
+            <a:schemeClr val="accent1"/>
+          </a:effectRef>
+          <a:fontRef idx="minor">
+            <a:schemeClr val="lt1"/>
+          </a:fontRef>
+        </p:style>
+        <p:txBody>
+          <a:bodyPr rtlCol="0" anchor="ctr"/>
+          <a:lstStyle/>
+          <a:p>
+            <a:pPr algn="ctr"/>
+            <a:r>
+              <a:rPr lang="en-US" sz="1200" dirty="0"/>
+              <a:t>Assign</a:t>
+            </a:r>
+          </a:p>
+          <a:p>
+            <a:pPr algn="ctr"/>
+            <a:r>
+              <a:rPr lang="en-US" sz="1200" dirty="0"/>
+              <a:t>Reefer</a:t>
+            </a:r>
+          </a:p>
+        </p:txBody>
+      </p:sp>
+      <p:sp>
+        <p:nvSpPr>
+          <p:cNvPr id="30" name="Rectangle 29">
+            <a:extLst>
+              <a:ext uri="{FF2B5EF4-FFF2-40B4-BE49-F238E27FC236}">
+                <a16:creationId xmlns:a16="http://schemas.microsoft.com/office/drawing/2014/main" id="{BAF1E437-1D4C-F04D-8D40-18A2137C9A0D}"/>
+              </a:ext>
+            </a:extLst>
+          </p:cNvPr>
+          <p:cNvSpPr/>
+          <p:nvPr/>
+        </p:nvSpPr>
+        <p:spPr>
+          <a:xfrm>
+            <a:off x="4740792" y="2745661"/>
+            <a:ext cx="1355208" cy="851936"/>
+          </a:xfrm>
+          <a:prstGeom prst="rect">
+            <a:avLst/>
+          </a:prstGeom>
+          <a:solidFill>
+            <a:srgbClr val="FFC000"/>
           </a:solidFill>
           <a:ln>
             <a:solidFill>
-              <a:srgbClr val="FFD1EC"/>
+              <a:srgbClr val="FFC000"/>
             </a:solidFill>
+          </a:ln>
+          <a:effectLst>
+            <a:outerShdw blurRad="50800" dist="38100" dir="5400000" algn="t" rotWithShape="0">
+              <a:prstClr val="black">
+                <a:alpha val="40000"/>
+              </a:prstClr>
+            </a:outerShdw>
+          </a:effectLst>
+        </p:spPr>
+        <p:style>
+          <a:lnRef idx="2">
+            <a:schemeClr val="accent1">
+              <a:shade val="50000"/>
+            </a:schemeClr>
+          </a:lnRef>
+          <a:fillRef idx="1">
+            <a:schemeClr val="accent1"/>
+          </a:fillRef>
+          <a:effectRef idx="0">
+            <a:schemeClr val="accent1"/>
+          </a:effectRef>
+          <a:fontRef idx="minor">
+            <a:schemeClr val="lt1"/>
+          </a:fontRef>
+        </p:style>
+        <p:txBody>
+          <a:bodyPr rtlCol="0" anchor="ctr"/>
+          <a:lstStyle/>
+          <a:p>
+            <a:pPr algn="ctr"/>
+            <a:r>
+              <a:rPr lang="en-US" sz="1067" dirty="0">
+                <a:solidFill>
+                  <a:schemeClr val="accent1">
+                    <a:lumMod val="50000"/>
+                  </a:schemeClr>
+                </a:solidFill>
+              </a:rPr>
+              <a:t>business conditions and SLA sent</a:t>
+            </a:r>
+          </a:p>
+        </p:txBody>
+      </p:sp>
+      <p:sp>
+        <p:nvSpPr>
+          <p:cNvPr id="31" name="Rectangle 30">
+            <a:extLst>
+              <a:ext uri="{FF2B5EF4-FFF2-40B4-BE49-F238E27FC236}">
+                <a16:creationId xmlns:a16="http://schemas.microsoft.com/office/drawing/2014/main" id="{7092FED0-B43E-DE49-9068-6210DD5F398C}"/>
+              </a:ext>
+            </a:extLst>
+          </p:cNvPr>
+          <p:cNvSpPr/>
+          <p:nvPr/>
+        </p:nvSpPr>
+        <p:spPr>
+          <a:xfrm>
+            <a:off x="8774475" y="1573760"/>
+            <a:ext cx="928343" cy="1027977"/>
+          </a:xfrm>
+          <a:prstGeom prst="rect">
+            <a:avLst/>
+          </a:prstGeom>
+          <a:solidFill>
+            <a:srgbClr val="0070C0"/>
+          </a:solidFill>
+          <a:ln>
+            <a:noFill/>
+          </a:ln>
+          <a:effectLst>
+            <a:outerShdw blurRad="50800" dist="38100" dir="5400000" algn="t" rotWithShape="0">
+              <a:prstClr val="black">
+                <a:alpha val="40000"/>
+              </a:prstClr>
+            </a:outerShdw>
+          </a:effectLst>
+        </p:spPr>
+        <p:style>
+          <a:lnRef idx="2">
+            <a:schemeClr val="accent1">
+              <a:shade val="50000"/>
+            </a:schemeClr>
+          </a:lnRef>
+          <a:fillRef idx="1">
+            <a:schemeClr val="accent1"/>
+          </a:fillRef>
+          <a:effectRef idx="0">
+            <a:schemeClr val="accent1"/>
+          </a:effectRef>
+          <a:fontRef idx="minor">
+            <a:schemeClr val="lt1"/>
+          </a:fontRef>
+        </p:style>
+        <p:txBody>
+          <a:bodyPr rtlCol="0" anchor="ctr"/>
+          <a:lstStyle/>
+          <a:p>
+            <a:pPr algn="ctr"/>
+            <a:r>
+              <a:rPr lang="en-US" sz="1200" dirty="0"/>
+              <a:t>Cancel</a:t>
+            </a:r>
+          </a:p>
+          <a:p>
+            <a:pPr algn="ctr"/>
+            <a:r>
+              <a:rPr lang="en-US" sz="1200" dirty="0"/>
+              <a:t>Order</a:t>
+            </a:r>
+          </a:p>
+        </p:txBody>
+      </p:sp>
+      <p:sp>
+        <p:nvSpPr>
+          <p:cNvPr id="32" name="Rectangle 31">
+            <a:extLst>
+              <a:ext uri="{FF2B5EF4-FFF2-40B4-BE49-F238E27FC236}">
+                <a16:creationId xmlns:a16="http://schemas.microsoft.com/office/drawing/2014/main" id="{B382C255-8B06-FE4C-B2DD-F106CE7CE61D}"/>
+              </a:ext>
+            </a:extLst>
+          </p:cNvPr>
+          <p:cNvSpPr/>
+          <p:nvPr/>
+        </p:nvSpPr>
+        <p:spPr>
+          <a:xfrm>
+            <a:off x="9859350" y="1587995"/>
+            <a:ext cx="1204890" cy="1027977"/>
+          </a:xfrm>
+          <a:prstGeom prst="rect">
+            <a:avLst/>
+          </a:prstGeom>
+          <a:solidFill>
+            <a:srgbClr val="0070C0"/>
+          </a:solidFill>
+          <a:ln>
+            <a:noFill/>
+          </a:ln>
+          <a:effectLst>
+            <a:outerShdw blurRad="50800" dist="38100" dir="5400000" algn="t" rotWithShape="0">
+              <a:prstClr val="black">
+                <a:alpha val="40000"/>
+              </a:prstClr>
+            </a:outerShdw>
+          </a:effectLst>
+        </p:spPr>
+        <p:style>
+          <a:lnRef idx="2">
+            <a:schemeClr val="accent1">
+              <a:shade val="50000"/>
+            </a:schemeClr>
+          </a:lnRef>
+          <a:fillRef idx="1">
+            <a:schemeClr val="accent1"/>
+          </a:fillRef>
+          <a:effectRef idx="0">
+            <a:schemeClr val="accent1"/>
+          </a:effectRef>
+          <a:fontRef idx="minor">
+            <a:schemeClr val="lt1"/>
+          </a:fontRef>
+        </p:style>
+        <p:txBody>
+          <a:bodyPr rtlCol="0" anchor="ctr"/>
+          <a:lstStyle/>
+          <a:p>
+            <a:pPr algn="ctr"/>
+            <a:r>
+              <a:rPr lang="en-US" sz="1200" dirty="0"/>
+              <a:t>Initiate land transportation</a:t>
+            </a:r>
+          </a:p>
+        </p:txBody>
+      </p:sp>
+      <p:sp>
+        <p:nvSpPr>
+          <p:cNvPr id="33" name="Rectangle 32">
+            <a:extLst>
+              <a:ext uri="{FF2B5EF4-FFF2-40B4-BE49-F238E27FC236}">
+                <a16:creationId xmlns:a16="http://schemas.microsoft.com/office/drawing/2014/main" id="{EE50C35E-5F5D-A24D-AF81-4B23F4D7D563}"/>
+              </a:ext>
+            </a:extLst>
+          </p:cNvPr>
+          <p:cNvSpPr/>
+          <p:nvPr/>
+        </p:nvSpPr>
+        <p:spPr>
+          <a:xfrm>
+            <a:off x="8786130" y="2754805"/>
+            <a:ext cx="905031" cy="824084"/>
+          </a:xfrm>
+          <a:prstGeom prst="rect">
+            <a:avLst/>
+          </a:prstGeom>
+          <a:solidFill>
+            <a:srgbClr val="FFC000"/>
+          </a:solidFill>
+          <a:ln>
+            <a:solidFill>
+              <a:srgbClr val="FFC000"/>
+            </a:solidFill>
+          </a:ln>
+          <a:effectLst>
+            <a:outerShdw blurRad="50800" dist="38100" dir="5400000" algn="t" rotWithShape="0">
+              <a:prstClr val="black">
+                <a:alpha val="40000"/>
+              </a:prstClr>
+            </a:outerShdw>
+          </a:effectLst>
+        </p:spPr>
+        <p:style>
+          <a:lnRef idx="2">
+            <a:schemeClr val="accent1">
+              <a:shade val="50000"/>
+            </a:schemeClr>
+          </a:lnRef>
+          <a:fillRef idx="1">
+            <a:schemeClr val="accent1"/>
+          </a:fillRef>
+          <a:effectRef idx="0">
+            <a:schemeClr val="accent1"/>
+          </a:effectRef>
+          <a:fontRef idx="minor">
+            <a:schemeClr val="lt1"/>
+          </a:fontRef>
+        </p:style>
+        <p:txBody>
+          <a:bodyPr rtlCol="0" anchor="ctr"/>
+          <a:lstStyle/>
+          <a:p>
+            <a:pPr algn="ctr"/>
+            <a:r>
+              <a:rPr lang="en-US" sz="1067" dirty="0">
+                <a:solidFill>
+                  <a:schemeClr val="accent1">
+                    <a:lumMod val="50000"/>
+                  </a:schemeClr>
+                </a:solidFill>
+              </a:rPr>
+              <a:t>Order cancelled</a:t>
+            </a:r>
+          </a:p>
+        </p:txBody>
+      </p:sp>
+      <p:sp>
+        <p:nvSpPr>
+          <p:cNvPr id="34" name="Rectangle 33">
+            <a:extLst>
+              <a:ext uri="{FF2B5EF4-FFF2-40B4-BE49-F238E27FC236}">
+                <a16:creationId xmlns:a16="http://schemas.microsoft.com/office/drawing/2014/main" id="{9DF98E72-4740-1245-A3DC-D4A2B4D976B2}"/>
+              </a:ext>
+            </a:extLst>
+          </p:cNvPr>
+          <p:cNvSpPr/>
+          <p:nvPr/>
+        </p:nvSpPr>
+        <p:spPr>
+          <a:xfrm>
+            <a:off x="9895926" y="2782656"/>
+            <a:ext cx="1073377" cy="824084"/>
+          </a:xfrm>
+          <a:prstGeom prst="rect">
+            <a:avLst/>
+          </a:prstGeom>
+          <a:solidFill>
+            <a:srgbClr val="FFC000"/>
+          </a:solidFill>
+          <a:ln>
+            <a:solidFill>
+              <a:srgbClr val="FFC000"/>
+            </a:solidFill>
+          </a:ln>
+          <a:effectLst>
+            <a:outerShdw blurRad="50800" dist="38100" dir="5400000" algn="t" rotWithShape="0">
+              <a:prstClr val="black">
+                <a:alpha val="40000"/>
+              </a:prstClr>
+            </a:outerShdw>
+          </a:effectLst>
+        </p:spPr>
+        <p:style>
+          <a:lnRef idx="2">
+            <a:schemeClr val="accent1">
+              <a:shade val="50000"/>
+            </a:schemeClr>
+          </a:lnRef>
+          <a:fillRef idx="1">
+            <a:schemeClr val="accent1"/>
+          </a:fillRef>
+          <a:effectRef idx="0">
+            <a:schemeClr val="accent1"/>
+          </a:effectRef>
+          <a:fontRef idx="minor">
+            <a:schemeClr val="lt1"/>
+          </a:fontRef>
+        </p:style>
+        <p:txBody>
+          <a:bodyPr rtlCol="0" anchor="ctr"/>
+          <a:lstStyle/>
+          <a:p>
+            <a:pPr algn="ctr"/>
+            <a:r>
+              <a:rPr lang="en-US" sz="1067" dirty="0">
+                <a:solidFill>
+                  <a:schemeClr val="accent1">
+                    <a:lumMod val="50000"/>
+                  </a:schemeClr>
+                </a:solidFill>
+              </a:rPr>
+              <a:t>Land transportation initiated </a:t>
+            </a:r>
+          </a:p>
+        </p:txBody>
+      </p:sp>
+      <p:sp>
+        <p:nvSpPr>
+          <p:cNvPr id="25" name="Rectangle 24">
+            <a:extLst>
+              <a:ext uri="{FF2B5EF4-FFF2-40B4-BE49-F238E27FC236}">
+                <a16:creationId xmlns:a16="http://schemas.microsoft.com/office/drawing/2014/main" id="{0632AA14-4BD0-8640-9A29-7878DDE4F562}"/>
+              </a:ext>
+            </a:extLst>
+          </p:cNvPr>
+          <p:cNvSpPr/>
+          <p:nvPr/>
+        </p:nvSpPr>
+        <p:spPr>
+          <a:xfrm>
+            <a:off x="393008" y="3926845"/>
+            <a:ext cx="1868192" cy="1517779"/>
+          </a:xfrm>
+          <a:prstGeom prst="rect">
+            <a:avLst/>
+          </a:prstGeom>
+          <a:solidFill>
+            <a:srgbClr val="92D050"/>
+          </a:solidFill>
+          <a:ln>
+            <a:noFill/>
           </a:ln>
         </p:spPr>
         <p:style>
@@ -10396,145 +11677,101 @@
           </a:fontRef>
         </p:style>
         <p:txBody>
-          <a:bodyPr rtlCol="0" anchor="ctr"/>
+          <a:bodyPr rtlCol="0" anchor="t"/>
           <a:lstStyle/>
           <a:p>
             <a:pPr algn="ctr"/>
             <a:r>
-              <a:rPr lang="en-US" sz="1200" dirty="0">
+              <a:rPr lang="en-US" sz="1050" u="sng" dirty="0">
                 <a:solidFill>
-                  <a:schemeClr val="accent1">
-                    <a:lumMod val="50000"/>
+                  <a:schemeClr val="accent2">
+                    <a:lumMod val="25000"/>
                   </a:schemeClr>
                 </a:solidFill>
               </a:rPr>
-              <a:t>Whenever shipment order placed, trigger adjust confirmation penalty clauses </a:t>
-            </a:r>
-          </a:p>
-        </p:txBody>
-      </p:sp>
-      <p:sp>
-        <p:nvSpPr>
-          <p:cNvPr id="22" name="Rectangle 21">
-            <a:extLst>
-              <a:ext uri="{FF2B5EF4-FFF2-40B4-BE49-F238E27FC236}">
-                <a16:creationId xmlns:a16="http://schemas.microsoft.com/office/drawing/2014/main" id="{D0D92930-C9F7-7F45-850A-256CCBAB57EA}"/>
-              </a:ext>
-            </a:extLst>
-          </p:cNvPr>
-          <p:cNvSpPr/>
-          <p:nvPr/>
-        </p:nvSpPr>
-        <p:spPr>
-          <a:xfrm>
-            <a:off x="694291" y="2620440"/>
-            <a:ext cx="1640121" cy="1159443"/>
-          </a:xfrm>
-          <a:prstGeom prst="rect">
-            <a:avLst/>
-          </a:prstGeom>
-          <a:solidFill>
-            <a:srgbClr val="FFD1EC"/>
-          </a:solidFill>
-          <a:ln>
-            <a:solidFill>
-              <a:srgbClr val="FFD1EC"/>
-            </a:solidFill>
-          </a:ln>
-        </p:spPr>
-        <p:style>
-          <a:lnRef idx="2">
-            <a:schemeClr val="accent1">
-              <a:shade val="50000"/>
-            </a:schemeClr>
-          </a:lnRef>
-          <a:fillRef idx="1">
-            <a:schemeClr val="accent1"/>
-          </a:fillRef>
-          <a:effectRef idx="0">
-            <a:schemeClr val="accent1"/>
-          </a:effectRef>
-          <a:fontRef idx="minor">
-            <a:schemeClr val="lt1"/>
-          </a:fontRef>
-        </p:style>
-        <p:txBody>
-          <a:bodyPr rtlCol="0" anchor="ctr"/>
-          <a:lstStyle/>
-          <a:p>
-            <a:pPr algn="ctr"/>
-            <a:r>
-              <a:rPr lang="en-US" sz="1200" dirty="0">
+              <a:t>Order</a:t>
+            </a:r>
+            <a:r>
+              <a:rPr lang="en-US" sz="1050" dirty="0">
                 <a:solidFill>
-                  <a:schemeClr val="accent1">
-                    <a:lumMod val="50000"/>
+                  <a:schemeClr val="accent2">
+                    <a:lumMod val="25000"/>
                   </a:schemeClr>
                 </a:solidFill>
               </a:rPr>
-              <a:t>Whenever shipment order placed, reserve voyage </a:t>
-            </a:r>
-          </a:p>
-        </p:txBody>
-      </p:sp>
-      <p:sp>
-        <p:nvSpPr>
-          <p:cNvPr id="17" name="Rectangle 16">
-            <a:extLst>
-              <a:ext uri="{FF2B5EF4-FFF2-40B4-BE49-F238E27FC236}">
-                <a16:creationId xmlns:a16="http://schemas.microsoft.com/office/drawing/2014/main" id="{C0071B95-AEC6-A34C-99D1-2772BEBDC131}"/>
-              </a:ext>
-            </a:extLst>
-          </p:cNvPr>
-          <p:cNvSpPr/>
-          <p:nvPr/>
-        </p:nvSpPr>
-        <p:spPr>
-          <a:xfrm>
-            <a:off x="2375551" y="3911476"/>
-            <a:ext cx="1373407" cy="1159443"/>
-          </a:xfrm>
-          <a:prstGeom prst="rect">
-            <a:avLst/>
-          </a:prstGeom>
-          <a:solidFill>
-            <a:srgbClr val="FFD1EC"/>
-          </a:solidFill>
-          <a:ln>
-            <a:solidFill>
-              <a:srgbClr val="FFD1EC"/>
-            </a:solidFill>
-          </a:ln>
-        </p:spPr>
-        <p:style>
-          <a:lnRef idx="2">
-            <a:schemeClr val="accent1">
-              <a:shade val="50000"/>
-            </a:schemeClr>
-          </a:lnRef>
-          <a:fillRef idx="1">
-            <a:schemeClr val="accent1"/>
-          </a:fillRef>
-          <a:effectRef idx="0">
-            <a:schemeClr val="accent1"/>
-          </a:effectRef>
-          <a:fontRef idx="minor">
-            <a:schemeClr val="lt1"/>
-          </a:fontRef>
-        </p:style>
-        <p:txBody>
-          <a:bodyPr rtlCol="0" anchor="ctr"/>
-          <a:lstStyle/>
-          <a:p>
-            <a:pPr algn="ctr"/>
-            <a:r>
-              <a:rPr lang="en-US" sz="1200" dirty="0">
+              <a:t>: </a:t>
+            </a:r>
+          </a:p>
+          <a:p>
+            <a:r>
+              <a:rPr lang="en-US" sz="1050" dirty="0">
                 <a:solidFill>
-                  <a:schemeClr val="accent1">
-                    <a:lumMod val="50000"/>
+                  <a:schemeClr val="accent2">
+                    <a:lumMod val="25000"/>
                   </a:schemeClr>
                 </a:solidFill>
               </a:rPr>
-              <a:t>Whenever a voyage is selected reserve container</a:t>
+              <a:t>Estimate delivery date</a:t>
+            </a:r>
+          </a:p>
+          <a:p>
+            <a:r>
+              <a:rPr lang="en-US" sz="1050" dirty="0">
+                <a:solidFill>
+                  <a:schemeClr val="accent2">
+                    <a:lumMod val="25000"/>
+                  </a:schemeClr>
+                </a:solidFill>
+              </a:rPr>
+              <a:t>Destination Address</a:t>
+            </a:r>
+          </a:p>
+          <a:p>
+            <a:r>
+              <a:rPr lang="en-US" sz="1050" dirty="0">
+                <a:solidFill>
+                  <a:schemeClr val="accent2">
+                    <a:lumMod val="25000"/>
+                  </a:schemeClr>
+                </a:solidFill>
+              </a:rPr>
+              <a:t>Pickup Address</a:t>
+            </a:r>
+          </a:p>
+          <a:p>
+            <a:r>
+              <a:rPr lang="en-US" sz="1050" dirty="0">
+                <a:solidFill>
+                  <a:schemeClr val="accent2">
+                    <a:lumMod val="25000"/>
+                  </a:schemeClr>
+                </a:solidFill>
+              </a:rPr>
+              <a:t>Pickup date</a:t>
+            </a:r>
+          </a:p>
+          <a:p>
+            <a:r>
+              <a:rPr lang="en-US" sz="1050" dirty="0">
+                <a:solidFill>
+                  <a:schemeClr val="accent2">
+                    <a:lumMod val="25000"/>
+                  </a:schemeClr>
+                </a:solidFill>
+              </a:rPr>
+              <a:t>Product ID</a:t>
+            </a:r>
+          </a:p>
+          <a:p>
+            <a:r>
+              <a:rPr lang="en-US" sz="1050" dirty="0">
+                <a:solidFill>
+                  <a:schemeClr val="accent2">
+                    <a:lumMod val="25000"/>
+                  </a:schemeClr>
+                </a:solidFill>
+              </a:rPr>
+              <a:t>Quantity to ship</a:t>
             </a:r>
           </a:p>
         </p:txBody>
@@ -10542,7 +11779,7 @@
     </p:spTree>
     <p:extLst>
       <p:ext uri="{BB962C8B-B14F-4D97-AF65-F5344CB8AC3E}">
-        <p14:creationId xmlns:p14="http://schemas.microsoft.com/office/powerpoint/2010/main" val="1096111119"/>
+        <p14:creationId xmlns:p14="http://schemas.microsoft.com/office/powerpoint/2010/main" val="2942386986"/>
       </p:ext>
     </p:extLst>
   </p:cSld>
@@ -12011,6 +13248,18 @@
                   </a:schemeClr>
                 </a:solidFill>
               </a:rPr>
+              <a:t>containerID</a:t>
+            </a:r>
+          </a:p>
+          <a:p>
+            <a:r>
+              <a:rPr lang="en-US" sz="1400" dirty="0">
+                <a:solidFill>
+                  <a:schemeClr val="accent1">
+                    <a:lumMod val="75000"/>
+                  </a:schemeClr>
+                </a:solidFill>
+              </a:rPr>
               <a:t>Type</a:t>
             </a:r>
           </a:p>
@@ -12617,7 +13866,7 @@
         </p:nvSpPr>
         <p:spPr>
           <a:xfrm>
-            <a:off x="1965038" y="2014520"/>
+            <a:off x="2009282" y="1675308"/>
             <a:ext cx="1211338" cy="692297"/>
           </a:xfrm>
           <a:prstGeom prst="rect">
@@ -15213,7 +16462,7 @@
         </p:nvSpPr>
         <p:spPr>
           <a:xfrm>
-            <a:off x="1965038" y="2953783"/>
+            <a:off x="2009282" y="2614571"/>
             <a:ext cx="1211339" cy="692296"/>
           </a:xfrm>
           <a:prstGeom prst="rect">
@@ -15246,7 +16495,7 @@
             <a:pPr algn="ctr"/>
             <a:r>
               <a:rPr lang="en-US" sz="1200" dirty="0"/>
-              <a:t>Assign voyage to order</a:t>
+              <a:t>Confirm Order</a:t>
             </a:r>
           </a:p>
         </p:txBody>
@@ -15265,7 +16514,7 @@
         </p:nvSpPr>
         <p:spPr>
           <a:xfrm>
-            <a:off x="1965037" y="3875408"/>
+            <a:off x="2009281" y="3536196"/>
             <a:ext cx="1211339" cy="692296"/>
           </a:xfrm>
           <a:prstGeom prst="rect">
@@ -15298,7 +16547,7 @@
             <a:pPr algn="ctr"/>
             <a:r>
               <a:rPr lang="en-US" sz="1200" dirty="0"/>
-              <a:t>Assign Reefer to order</a:t>
+              <a:t>Cancel Order</a:t>
             </a:r>
           </a:p>
         </p:txBody>
@@ -15562,7 +16811,111 @@
                   <a:schemeClr val="tx1"/>
                 </a:solidFill>
               </a:rPr>
-              <a:t>Command</a:t>
+              <a:t>Commands</a:t>
+            </a:r>
+          </a:p>
+        </p:txBody>
+      </p:sp>
+      <p:sp>
+        <p:nvSpPr>
+          <p:cNvPr id="27" name="Rectangle 26">
+            <a:extLst>
+              <a:ext uri="{FF2B5EF4-FFF2-40B4-BE49-F238E27FC236}">
+                <a16:creationId xmlns:a16="http://schemas.microsoft.com/office/drawing/2014/main" id="{193ABD07-0494-4F4C-A779-3BC5B5F57489}"/>
+              </a:ext>
+            </a:extLst>
+          </p:cNvPr>
+          <p:cNvSpPr/>
+          <p:nvPr/>
+        </p:nvSpPr>
+        <p:spPr>
+          <a:xfrm>
+            <a:off x="2009280" y="4397420"/>
+            <a:ext cx="1211339" cy="692296"/>
+          </a:xfrm>
+          <a:prstGeom prst="rect">
+            <a:avLst/>
+          </a:prstGeom>
+          <a:ln>
+            <a:noFill/>
+          </a:ln>
+        </p:spPr>
+        <p:style>
+          <a:lnRef idx="2">
+            <a:schemeClr val="accent1">
+              <a:shade val="50000"/>
+            </a:schemeClr>
+          </a:lnRef>
+          <a:fillRef idx="1">
+            <a:schemeClr val="accent1"/>
+          </a:fillRef>
+          <a:effectRef idx="0">
+            <a:schemeClr val="accent1"/>
+          </a:effectRef>
+          <a:fontRef idx="minor">
+            <a:schemeClr val="lt1"/>
+          </a:fontRef>
+        </p:style>
+        <p:txBody>
+          <a:bodyPr rtlCol="0" anchor="ctr"/>
+          <a:lstStyle/>
+          <a:p>
+            <a:pPr algn="ctr"/>
+            <a:r>
+              <a:rPr lang="en-US" sz="1200" dirty="0"/>
+              <a:t>Update Order</a:t>
+            </a:r>
+          </a:p>
+        </p:txBody>
+      </p:sp>
+      <p:sp>
+        <p:nvSpPr>
+          <p:cNvPr id="28" name="Rectangle 27">
+            <a:extLst>
+              <a:ext uri="{FF2B5EF4-FFF2-40B4-BE49-F238E27FC236}">
+                <a16:creationId xmlns:a16="http://schemas.microsoft.com/office/drawing/2014/main" id="{0A65AE56-76B4-634A-B982-1F80C3599EB6}"/>
+              </a:ext>
+            </a:extLst>
+          </p:cNvPr>
+          <p:cNvSpPr/>
+          <p:nvPr/>
+        </p:nvSpPr>
+        <p:spPr>
+          <a:xfrm>
+            <a:off x="1971185" y="5155195"/>
+            <a:ext cx="1211339" cy="692296"/>
+          </a:xfrm>
+          <a:prstGeom prst="rect">
+            <a:avLst/>
+          </a:prstGeom>
+          <a:ln>
+            <a:noFill/>
+          </a:ln>
+        </p:spPr>
+        <p:style>
+          <a:lnRef idx="2">
+            <a:schemeClr val="accent1">
+              <a:shade val="50000"/>
+            </a:schemeClr>
+          </a:lnRef>
+          <a:fillRef idx="1">
+            <a:schemeClr val="accent1"/>
+          </a:fillRef>
+          <a:effectRef idx="0">
+            <a:schemeClr val="accent1"/>
+          </a:effectRef>
+          <a:fontRef idx="minor">
+            <a:schemeClr val="lt1"/>
+          </a:fontRef>
+        </p:style>
+        <p:txBody>
+          <a:bodyPr rtlCol="0" anchor="ctr"/>
+          <a:lstStyle/>
+          <a:p>
+            <a:pPr algn="ctr"/>
+            <a:r>
+              <a:rPr lang="en-US" sz="1200" dirty="0"/>
+              <a:t>Review Order Status</a:t>
             </a:r>
           </a:p>
         </p:txBody>
@@ -26334,6 +27687,38 @@
               <a:rPr lang="en-US" smtClean="0"/>
               <a:t>23</a:t>
             </a:fld>
+            <a:endParaRPr lang="en-US"/>
+          </a:p>
+        </p:txBody>
+      </p:sp>
+      <p:sp>
+        <p:nvSpPr>
+          <p:cNvPr id="5" name="TextBox 4">
+            <a:extLst>
+              <a:ext uri="{FF2B5EF4-FFF2-40B4-BE49-F238E27FC236}">
+                <a16:creationId xmlns:a16="http://schemas.microsoft.com/office/drawing/2014/main" id="{CA7A2C72-44B7-D842-9A65-26025E403C72}"/>
+              </a:ext>
+            </a:extLst>
+          </p:cNvPr>
+          <p:cNvSpPr txBox="1"/>
+          <p:nvPr/>
+        </p:nvSpPr>
+        <p:spPr>
+          <a:xfrm>
+            <a:off x="11459497" y="6931742"/>
+            <a:ext cx="184731" cy="369332"/>
+          </a:xfrm>
+          <a:prstGeom prst="rect">
+            <a:avLst/>
+          </a:prstGeom>
+          <a:noFill/>
+        </p:spPr>
+        <p:txBody>
+          <a:bodyPr wrap="none" rtlCol="0">
+            <a:spAutoFit/>
+          </a:bodyPr>
+          <a:lstStyle/>
+          <a:p>
             <a:endParaRPr lang="en-US"/>
           </a:p>
         </p:txBody>

</xml_diff>